<commit_message>
Minors Changes to Technical Docs
~ Minor change to technical docs
</commit_message>
<xml_diff>
--- a/EI Diagrams2.pptx
+++ b/EI Diagrams2.pptx
@@ -4,6 +4,9 @@
   <p:sldMasterIdLst>
     <p:sldMasterId id="2147483648" r:id="rId1"/>
   </p:sldMasterIdLst>
+  <p:notesMasterIdLst>
+    <p:notesMasterId r:id="rId4"/>
+  </p:notesMasterIdLst>
   <p:sldIdLst>
     <p:sldId id="256" r:id="rId2"/>
     <p:sldId id="257" r:id="rId3"/>
@@ -111,6 +114,439 @@
     </p:ext>
   </p:extLst>
 </p:presentation>
+</file>
+
+<file path=ppt/notesMasters/notesMaster1.xml><?xml version="1.0" encoding="utf-8"?>
+<p:notesMaster xmlns:a="http://schemas.openxmlformats.org/drawingml/2006/main" xmlns:r="http://schemas.openxmlformats.org/officeDocument/2006/relationships" xmlns:p="http://schemas.openxmlformats.org/presentationml/2006/main">
+  <p:cSld>
+    <p:bg>
+      <p:bgRef idx="1001">
+        <a:schemeClr val="bg1"/>
+      </p:bgRef>
+    </p:bg>
+    <p:spTree>
+      <p:nvGrpSpPr>
+        <p:cNvPr id="1" name=""/>
+        <p:cNvGrpSpPr/>
+        <p:nvPr/>
+      </p:nvGrpSpPr>
+      <p:grpSpPr>
+        <a:xfrm>
+          <a:off x="0" y="0"/>
+          <a:ext cx="0" cy="0"/>
+          <a:chOff x="0" y="0"/>
+          <a:chExt cx="0" cy="0"/>
+        </a:xfrm>
+      </p:grpSpPr>
+      <p:sp>
+        <p:nvSpPr>
+          <p:cNvPr id="2" name="Header Placeholder 1"/>
+          <p:cNvSpPr>
+            <a:spLocks noGrp="1"/>
+          </p:cNvSpPr>
+          <p:nvPr>
+            <p:ph type="hdr" sz="quarter"/>
+          </p:nvPr>
+        </p:nvSpPr>
+        <p:spPr>
+          <a:xfrm>
+            <a:off x="0" y="0"/>
+            <a:ext cx="2971800" cy="458788"/>
+          </a:xfrm>
+          <a:prstGeom prst="rect">
+            <a:avLst/>
+          </a:prstGeom>
+        </p:spPr>
+        <p:txBody>
+          <a:bodyPr vert="horz" lIns="91440" tIns="45720" rIns="91440" bIns="45720" rtlCol="0"/>
+          <a:lstStyle>
+            <a:lvl1pPr algn="l">
+              <a:defRPr sz="1200"/>
+            </a:lvl1pPr>
+          </a:lstStyle>
+          <a:p>
+            <a:endParaRPr lang="en-US"/>
+          </a:p>
+        </p:txBody>
+      </p:sp>
+      <p:sp>
+        <p:nvSpPr>
+          <p:cNvPr id="3" name="Date Placeholder 2"/>
+          <p:cNvSpPr>
+            <a:spLocks noGrp="1"/>
+          </p:cNvSpPr>
+          <p:nvPr>
+            <p:ph type="dt" idx="1"/>
+          </p:nvPr>
+        </p:nvSpPr>
+        <p:spPr>
+          <a:xfrm>
+            <a:off x="3884613" y="0"/>
+            <a:ext cx="2971800" cy="458788"/>
+          </a:xfrm>
+          <a:prstGeom prst="rect">
+            <a:avLst/>
+          </a:prstGeom>
+        </p:spPr>
+        <p:txBody>
+          <a:bodyPr vert="horz" lIns="91440" tIns="45720" rIns="91440" bIns="45720" rtlCol="0"/>
+          <a:lstStyle>
+            <a:lvl1pPr algn="r">
+              <a:defRPr sz="1200"/>
+            </a:lvl1pPr>
+          </a:lstStyle>
+          <a:p>
+            <a:fld id="{2969D29A-BED7-4F52-827A-C7D8A439955D}" type="datetimeFigureOut">
+              <a:rPr lang="en-US" smtClean="0"/>
+              <a:t>17-Mar-18</a:t>
+            </a:fld>
+            <a:endParaRPr lang="en-US"/>
+          </a:p>
+        </p:txBody>
+      </p:sp>
+      <p:sp>
+        <p:nvSpPr>
+          <p:cNvPr id="4" name="Slide Image Placeholder 3"/>
+          <p:cNvSpPr>
+            <a:spLocks noGrp="1" noRot="1" noChangeAspect="1"/>
+          </p:cNvSpPr>
+          <p:nvPr>
+            <p:ph type="sldImg" idx="2"/>
+          </p:nvPr>
+        </p:nvSpPr>
+        <p:spPr>
+          <a:xfrm>
+            <a:off x="685800" y="1143000"/>
+            <a:ext cx="5486400" cy="3086100"/>
+          </a:xfrm>
+          <a:prstGeom prst="rect">
+            <a:avLst/>
+          </a:prstGeom>
+          <a:noFill/>
+          <a:ln w="12700">
+            <a:solidFill>
+              <a:prstClr val="black"/>
+            </a:solidFill>
+          </a:ln>
+        </p:spPr>
+        <p:txBody>
+          <a:bodyPr vert="horz" lIns="91440" tIns="45720" rIns="91440" bIns="45720" rtlCol="0" anchor="ctr"/>
+          <a:lstStyle/>
+          <a:p>
+            <a:endParaRPr lang="en-US"/>
+          </a:p>
+        </p:txBody>
+      </p:sp>
+      <p:sp>
+        <p:nvSpPr>
+          <p:cNvPr id="5" name="Notes Placeholder 4"/>
+          <p:cNvSpPr>
+            <a:spLocks noGrp="1"/>
+          </p:cNvSpPr>
+          <p:nvPr>
+            <p:ph type="body" sz="quarter" idx="3"/>
+          </p:nvPr>
+        </p:nvSpPr>
+        <p:spPr>
+          <a:xfrm>
+            <a:off x="685800" y="4400550"/>
+            <a:ext cx="5486400" cy="3600450"/>
+          </a:xfrm>
+          <a:prstGeom prst="rect">
+            <a:avLst/>
+          </a:prstGeom>
+        </p:spPr>
+        <p:txBody>
+          <a:bodyPr vert="horz" lIns="91440" tIns="45720" rIns="91440" bIns="45720" rtlCol="0"/>
+          <a:lstStyle/>
+          <a:p>
+            <a:pPr lvl="0"/>
+            <a:r>
+              <a:rPr lang="en-US"/>
+              <a:t>Edit Master text styles</a:t>
+            </a:r>
+          </a:p>
+          <a:p>
+            <a:pPr lvl="1"/>
+            <a:r>
+              <a:rPr lang="en-US"/>
+              <a:t>Second level</a:t>
+            </a:r>
+          </a:p>
+          <a:p>
+            <a:pPr lvl="2"/>
+            <a:r>
+              <a:rPr lang="en-US"/>
+              <a:t>Third level</a:t>
+            </a:r>
+          </a:p>
+          <a:p>
+            <a:pPr lvl="3"/>
+            <a:r>
+              <a:rPr lang="en-US"/>
+              <a:t>Fourth level</a:t>
+            </a:r>
+          </a:p>
+          <a:p>
+            <a:pPr lvl="4"/>
+            <a:r>
+              <a:rPr lang="en-US"/>
+              <a:t>Fifth level</a:t>
+            </a:r>
+          </a:p>
+        </p:txBody>
+      </p:sp>
+      <p:sp>
+        <p:nvSpPr>
+          <p:cNvPr id="6" name="Footer Placeholder 5"/>
+          <p:cNvSpPr>
+            <a:spLocks noGrp="1"/>
+          </p:cNvSpPr>
+          <p:nvPr>
+            <p:ph type="ftr" sz="quarter" idx="4"/>
+          </p:nvPr>
+        </p:nvSpPr>
+        <p:spPr>
+          <a:xfrm>
+            <a:off x="0" y="8685213"/>
+            <a:ext cx="2971800" cy="458787"/>
+          </a:xfrm>
+          <a:prstGeom prst="rect">
+            <a:avLst/>
+          </a:prstGeom>
+        </p:spPr>
+        <p:txBody>
+          <a:bodyPr vert="horz" lIns="91440" tIns="45720" rIns="91440" bIns="45720" rtlCol="0" anchor="b"/>
+          <a:lstStyle>
+            <a:lvl1pPr algn="l">
+              <a:defRPr sz="1200"/>
+            </a:lvl1pPr>
+          </a:lstStyle>
+          <a:p>
+            <a:endParaRPr lang="en-US"/>
+          </a:p>
+        </p:txBody>
+      </p:sp>
+      <p:sp>
+        <p:nvSpPr>
+          <p:cNvPr id="7" name="Slide Number Placeholder 6"/>
+          <p:cNvSpPr>
+            <a:spLocks noGrp="1"/>
+          </p:cNvSpPr>
+          <p:nvPr>
+            <p:ph type="sldNum" sz="quarter" idx="5"/>
+          </p:nvPr>
+        </p:nvSpPr>
+        <p:spPr>
+          <a:xfrm>
+            <a:off x="3884613" y="8685213"/>
+            <a:ext cx="2971800" cy="458787"/>
+          </a:xfrm>
+          <a:prstGeom prst="rect">
+            <a:avLst/>
+          </a:prstGeom>
+        </p:spPr>
+        <p:txBody>
+          <a:bodyPr vert="horz" lIns="91440" tIns="45720" rIns="91440" bIns="45720" rtlCol="0" anchor="b"/>
+          <a:lstStyle>
+            <a:lvl1pPr algn="r">
+              <a:defRPr sz="1200"/>
+            </a:lvl1pPr>
+          </a:lstStyle>
+          <a:p>
+            <a:fld id="{2ED0950B-CCD5-4407-A111-A6EE205BBF47}" type="slidenum">
+              <a:rPr lang="en-US" smtClean="0"/>
+              <a:t>‹#›</a:t>
+            </a:fld>
+            <a:endParaRPr lang="en-US"/>
+          </a:p>
+        </p:txBody>
+      </p:sp>
+    </p:spTree>
+    <p:extLst>
+      <p:ext uri="{BB962C8B-B14F-4D97-AF65-F5344CB8AC3E}">
+        <p14:creationId xmlns:p14="http://schemas.microsoft.com/office/powerpoint/2010/main" val="2091237526"/>
+      </p:ext>
+    </p:extLst>
+  </p:cSld>
+  <p:clrMap bg1="lt1" tx1="dk1" bg2="lt2" tx2="dk2" accent1="accent1" accent2="accent2" accent3="accent3" accent4="accent4" accent5="accent5" accent6="accent6" hlink="hlink" folHlink="folHlink"/>
+  <p:notesStyle>
+    <a:lvl1pPr marL="0" algn="l" defTabSz="914400" rtl="0" eaLnBrk="1" latinLnBrk="0" hangingPunct="1">
+      <a:defRPr sz="1200" kern="1200">
+        <a:solidFill>
+          <a:schemeClr val="tx1"/>
+        </a:solidFill>
+        <a:latin typeface="+mn-lt"/>
+        <a:ea typeface="+mn-ea"/>
+        <a:cs typeface="+mn-cs"/>
+      </a:defRPr>
+    </a:lvl1pPr>
+    <a:lvl2pPr marL="457200" algn="l" defTabSz="914400" rtl="0" eaLnBrk="1" latinLnBrk="0" hangingPunct="1">
+      <a:defRPr sz="1200" kern="1200">
+        <a:solidFill>
+          <a:schemeClr val="tx1"/>
+        </a:solidFill>
+        <a:latin typeface="+mn-lt"/>
+        <a:ea typeface="+mn-ea"/>
+        <a:cs typeface="+mn-cs"/>
+      </a:defRPr>
+    </a:lvl2pPr>
+    <a:lvl3pPr marL="914400" algn="l" defTabSz="914400" rtl="0" eaLnBrk="1" latinLnBrk="0" hangingPunct="1">
+      <a:defRPr sz="1200" kern="1200">
+        <a:solidFill>
+          <a:schemeClr val="tx1"/>
+        </a:solidFill>
+        <a:latin typeface="+mn-lt"/>
+        <a:ea typeface="+mn-ea"/>
+        <a:cs typeface="+mn-cs"/>
+      </a:defRPr>
+    </a:lvl3pPr>
+    <a:lvl4pPr marL="1371600" algn="l" defTabSz="914400" rtl="0" eaLnBrk="1" latinLnBrk="0" hangingPunct="1">
+      <a:defRPr sz="1200" kern="1200">
+        <a:solidFill>
+          <a:schemeClr val="tx1"/>
+        </a:solidFill>
+        <a:latin typeface="+mn-lt"/>
+        <a:ea typeface="+mn-ea"/>
+        <a:cs typeface="+mn-cs"/>
+      </a:defRPr>
+    </a:lvl4pPr>
+    <a:lvl5pPr marL="1828800" algn="l" defTabSz="914400" rtl="0" eaLnBrk="1" latinLnBrk="0" hangingPunct="1">
+      <a:defRPr sz="1200" kern="1200">
+        <a:solidFill>
+          <a:schemeClr val="tx1"/>
+        </a:solidFill>
+        <a:latin typeface="+mn-lt"/>
+        <a:ea typeface="+mn-ea"/>
+        <a:cs typeface="+mn-cs"/>
+      </a:defRPr>
+    </a:lvl5pPr>
+    <a:lvl6pPr marL="2286000" algn="l" defTabSz="914400" rtl="0" eaLnBrk="1" latinLnBrk="0" hangingPunct="1">
+      <a:defRPr sz="1200" kern="1200">
+        <a:solidFill>
+          <a:schemeClr val="tx1"/>
+        </a:solidFill>
+        <a:latin typeface="+mn-lt"/>
+        <a:ea typeface="+mn-ea"/>
+        <a:cs typeface="+mn-cs"/>
+      </a:defRPr>
+    </a:lvl6pPr>
+    <a:lvl7pPr marL="2743200" algn="l" defTabSz="914400" rtl="0" eaLnBrk="1" latinLnBrk="0" hangingPunct="1">
+      <a:defRPr sz="1200" kern="1200">
+        <a:solidFill>
+          <a:schemeClr val="tx1"/>
+        </a:solidFill>
+        <a:latin typeface="+mn-lt"/>
+        <a:ea typeface="+mn-ea"/>
+        <a:cs typeface="+mn-cs"/>
+      </a:defRPr>
+    </a:lvl7pPr>
+    <a:lvl8pPr marL="3200400" algn="l" defTabSz="914400" rtl="0" eaLnBrk="1" latinLnBrk="0" hangingPunct="1">
+      <a:defRPr sz="1200" kern="1200">
+        <a:solidFill>
+          <a:schemeClr val="tx1"/>
+        </a:solidFill>
+        <a:latin typeface="+mn-lt"/>
+        <a:ea typeface="+mn-ea"/>
+        <a:cs typeface="+mn-cs"/>
+      </a:defRPr>
+    </a:lvl8pPr>
+    <a:lvl9pPr marL="3657600" algn="l" defTabSz="914400" rtl="0" eaLnBrk="1" latinLnBrk="0" hangingPunct="1">
+      <a:defRPr sz="1200" kern="1200">
+        <a:solidFill>
+          <a:schemeClr val="tx1"/>
+        </a:solidFill>
+        <a:latin typeface="+mn-lt"/>
+        <a:ea typeface="+mn-ea"/>
+        <a:cs typeface="+mn-cs"/>
+      </a:defRPr>
+    </a:lvl9pPr>
+  </p:notesStyle>
+</p:notesMaster>
+</file>
+
+<file path=ppt/notesSlides/notesSlide1.xml><?xml version="1.0" encoding="utf-8"?>
+<p:notes xmlns:a="http://schemas.openxmlformats.org/drawingml/2006/main" xmlns:r="http://schemas.openxmlformats.org/officeDocument/2006/relationships" xmlns:p="http://schemas.openxmlformats.org/presentationml/2006/main">
+  <p:cSld>
+    <p:spTree>
+      <p:nvGrpSpPr>
+        <p:cNvPr id="1" name=""/>
+        <p:cNvGrpSpPr/>
+        <p:nvPr/>
+      </p:nvGrpSpPr>
+      <p:grpSpPr>
+        <a:xfrm>
+          <a:off x="0" y="0"/>
+          <a:ext cx="0" cy="0"/>
+          <a:chOff x="0" y="0"/>
+          <a:chExt cx="0" cy="0"/>
+        </a:xfrm>
+      </p:grpSpPr>
+      <p:sp>
+        <p:nvSpPr>
+          <p:cNvPr id="2" name="Slide Image Placeholder 1"/>
+          <p:cNvSpPr>
+            <a:spLocks noGrp="1" noRot="1" noChangeAspect="1"/>
+          </p:cNvSpPr>
+          <p:nvPr>
+            <p:ph type="sldImg"/>
+          </p:nvPr>
+        </p:nvSpPr>
+        <p:spPr/>
+      </p:sp>
+      <p:sp>
+        <p:nvSpPr>
+          <p:cNvPr id="3" name="Notes Placeholder 2"/>
+          <p:cNvSpPr>
+            <a:spLocks noGrp="1"/>
+          </p:cNvSpPr>
+          <p:nvPr>
+            <p:ph type="body" idx="1"/>
+          </p:nvPr>
+        </p:nvSpPr>
+        <p:spPr/>
+        <p:txBody>
+          <a:bodyPr/>
+          <a:lstStyle/>
+          <a:p>
+            <a:endParaRPr lang="en-US" dirty="0"/>
+          </a:p>
+        </p:txBody>
+      </p:sp>
+      <p:sp>
+        <p:nvSpPr>
+          <p:cNvPr id="4" name="Slide Number Placeholder 3"/>
+          <p:cNvSpPr>
+            <a:spLocks noGrp="1"/>
+          </p:cNvSpPr>
+          <p:nvPr>
+            <p:ph type="sldNum" sz="quarter" idx="10"/>
+          </p:nvPr>
+        </p:nvSpPr>
+        <p:spPr/>
+        <p:txBody>
+          <a:bodyPr/>
+          <a:lstStyle/>
+          <a:p>
+            <a:fld id="{2ED0950B-CCD5-4407-A111-A6EE205BBF47}" type="slidenum">
+              <a:rPr lang="en-US" smtClean="0"/>
+              <a:t>2</a:t>
+            </a:fld>
+            <a:endParaRPr lang="en-US"/>
+          </a:p>
+        </p:txBody>
+      </p:sp>
+    </p:spTree>
+    <p:extLst>
+      <p:ext uri="{BB962C8B-B14F-4D97-AF65-F5344CB8AC3E}">
+        <p14:creationId xmlns:p14="http://schemas.microsoft.com/office/powerpoint/2010/main" val="972113235"/>
+      </p:ext>
+    </p:extLst>
+  </p:cSld>
+  <p:clrMapOvr>
+    <a:masterClrMapping/>
+  </p:clrMapOvr>
+</p:notes>
 </file>
 
 <file path=ppt/slideLayouts/slideLayout1.xml><?xml version="1.0" encoding="utf-8"?>
@@ -3341,10 +3777,10 @@
         </p:nvGrpSpPr>
         <p:grpSpPr>
           <a:xfrm>
-            <a:off x="645004" y="828819"/>
-            <a:ext cx="3030381" cy="1099066"/>
-            <a:chOff x="583994" y="833284"/>
-            <a:chExt cx="3030381" cy="1099066"/>
+            <a:off x="324851" y="828819"/>
+            <a:ext cx="3670685" cy="1126898"/>
+            <a:chOff x="263841" y="833284"/>
+            <a:chExt cx="3670685" cy="1126898"/>
           </a:xfrm>
         </p:grpSpPr>
         <p:pic>
@@ -3400,8 +3836,8 @@
           </p:nvSpPr>
           <p:spPr>
             <a:xfrm>
-              <a:off x="583994" y="1563018"/>
-              <a:ext cx="3030381" cy="369332"/>
+              <a:off x="263841" y="1590850"/>
+              <a:ext cx="3670685" cy="369332"/>
             </a:xfrm>
             <a:prstGeom prst="rect">
               <a:avLst/>
@@ -3416,7 +3852,15 @@
             <a:p>
               <a:r>
                 <a:rPr lang="en-US" dirty="0"/>
-                <a:t>Bus Management System (C#)</a:t>
+                <a:t>Bus Depots Deploy </a:t>
+              </a:r>
+              <a:r>
+                <a:rPr lang="en-US" dirty="0" err="1"/>
+                <a:t>Mgmt</a:t>
+              </a:r>
+              <a:r>
+                <a:rPr lang="en-US" dirty="0"/>
+                <a:t> System(C#)</a:t>
               </a:r>
             </a:p>
           </p:txBody>
@@ -3991,102 +4435,6 @@
           </a:p>
         </p:txBody>
       </p:sp>
-      <mc:AlternateContent xmlns:mc="http://schemas.openxmlformats.org/markup-compatibility/2006">
-        <mc:Choice xmlns:pslz="http://schemas.microsoft.com/office/powerpoint/2016/slidezoom" Requires="pslz">
-          <p:graphicFrame>
-            <p:nvGraphicFramePr>
-              <p:cNvPr id="8" name="Slide Zoom 7">
-                <a:extLst>
-                  <a:ext uri="{FF2B5EF4-FFF2-40B4-BE49-F238E27FC236}">
-                    <a16:creationId xmlns:a16="http://schemas.microsoft.com/office/drawing/2014/main" id="{98E9F224-2CEF-4296-A392-858537A4FA54}"/>
-                  </a:ext>
-                </a:extLst>
-              </p:cNvPr>
-              <p:cNvGraphicFramePr>
-                <a:graphicFrameLocks noChangeAspect="1"/>
-              </p:cNvGraphicFramePr>
-              <p:nvPr>
-                <p:extLst>
-                  <p:ext uri="{D42A27DB-BD31-4B8C-83A1-F6EECF244321}">
-                    <p14:modId xmlns:p14="http://schemas.microsoft.com/office/powerpoint/2010/main" val="3301756235"/>
-                  </p:ext>
-                </p:extLst>
-              </p:nvPr>
-            </p:nvGraphicFramePr>
-            <p:xfrm>
-              <a:off x="-1715652" y="529098"/>
-              <a:ext cx="3048000" cy="1714500"/>
-            </p:xfrm>
-            <a:graphic>
-              <a:graphicData uri="http://schemas.microsoft.com/office/powerpoint/2016/slidezoom">
-                <pslz:sldZm>
-                  <pslz:sldZmObj sldId="257" cId="576619051">
-                    <pslz:zmPr id="{DE3F7829-CD38-4272-9E0C-E088EFC94482}" returnToParent="0" transitionDur="1000">
-                      <p166:blipFill xmlns:p166="http://schemas.microsoft.com/office/powerpoint/2016/6/main">
-                        <a:blip r:embed="rId8"/>
-                        <a:stretch>
-                          <a:fillRect/>
-                        </a:stretch>
-                      </p166:blipFill>
-                      <p166:spPr xmlns:p166="http://schemas.microsoft.com/office/powerpoint/2016/6/main">
-                        <a:xfrm>
-                          <a:off x="0" y="0"/>
-                          <a:ext cx="3048000" cy="1714500"/>
-                        </a:xfrm>
-                        <a:prstGeom prst="rect">
-                          <a:avLst/>
-                        </a:prstGeom>
-                        <a:ln w="3175">
-                          <a:solidFill>
-                            <a:prstClr val="ltGray"/>
-                          </a:solidFill>
-                        </a:ln>
-                      </p166:spPr>
-                    </pslz:zmPr>
-                  </pslz:sldZmObj>
-                </pslz:sldZm>
-              </a:graphicData>
-            </a:graphic>
-          </p:graphicFrame>
-        </mc:Choice>
-        <mc:Fallback>
-          <p:pic>
-            <p:nvPicPr>
-              <p:cNvPr id="8" name="Slide Zoom 7">
-                <a:extLst>
-                  <a:ext uri="{FF2B5EF4-FFF2-40B4-BE49-F238E27FC236}">
-                    <a16:creationId xmlns:a16="http://schemas.microsoft.com/office/drawing/2014/main" id="{98E9F224-2CEF-4296-A392-858537A4FA54}"/>
-                  </a:ext>
-                </a:extLst>
-              </p:cNvPr>
-              <p:cNvPicPr>
-                <a:picLocks noGrp="1" noRot="1" noChangeAspect="1" noMove="1" noResize="1" noEditPoints="1" noAdjustHandles="1" noChangeArrowheads="1" noChangeShapeType="1"/>
-              </p:cNvPicPr>
-              <p:nvPr/>
-            </p:nvPicPr>
-            <p:blipFill>
-              <a:blip r:embed="rId8"/>
-              <a:stretch>
-                <a:fillRect/>
-              </a:stretch>
-            </p:blipFill>
-            <p:spPr>
-              <a:xfrm>
-                <a:off x="-1715652" y="529098"/>
-                <a:ext cx="3048000" cy="1714500"/>
-              </a:xfrm>
-              <a:prstGeom prst="rect">
-                <a:avLst/>
-              </a:prstGeom>
-              <a:ln w="3175">
-                <a:solidFill>
-                  <a:prstClr val="ltGray"/>
-                </a:solidFill>
-              </a:ln>
-            </p:spPr>
-          </p:pic>
-        </mc:Fallback>
-      </mc:AlternateContent>
     </p:spTree>
     <p:extLst>
       <p:ext uri="{BB962C8B-B14F-4D97-AF65-F5344CB8AC3E}">
@@ -4169,7 +4517,7 @@
           <a:p>
             <a:pPr algn="ctr"/>
             <a:r>
-              <a:rPr lang="en-US" sz="2400" dirty="0">
+              <a:rPr lang="en-US" sz="2400" b="1" dirty="0">
                 <a:solidFill>
                   <a:sysClr val="windowText" lastClr="000000"/>
                 </a:solidFill>
@@ -4180,7 +4528,7 @@
           <a:p>
             <a:pPr algn="ctr"/>
             <a:r>
-              <a:rPr lang="en-US" sz="2400" dirty="0">
+              <a:rPr lang="en-US" sz="2400" b="1" dirty="0">
                 <a:solidFill>
                   <a:sysClr val="windowText" lastClr="000000"/>
                 </a:solidFill>
@@ -4220,6 +4568,52 @@
               </a:solidFill>
             </a:endParaRPr>
           </a:p>
+          <a:p>
+            <a:pPr algn="ctr"/>
+            <a:r>
+              <a:rPr lang="en-US" sz="1600" dirty="0" err="1">
+                <a:solidFill>
+                  <a:sysClr val="windowText" lastClr="000000"/>
+                </a:solidFill>
+              </a:rPr>
+              <a:t>q.depot</a:t>
+            </a:r>
+            <a:r>
+              <a:rPr lang="en-US" sz="1600" dirty="0">
+                <a:solidFill>
+                  <a:sysClr val="windowText" lastClr="000000"/>
+                </a:solidFill>
+              </a:rPr>
+              <a:t>.&lt;dynamic&gt;</a:t>
+            </a:r>
+          </a:p>
+          <a:p>
+            <a:pPr algn="ctr"/>
+            <a:r>
+              <a:rPr lang="en-US" sz="1600" dirty="0" err="1">
+                <a:solidFill>
+                  <a:sysClr val="windowText" lastClr="000000"/>
+                </a:solidFill>
+              </a:rPr>
+              <a:t>t.weather</a:t>
+            </a:r>
+            <a:endParaRPr lang="en-US" sz="1600" dirty="0">
+              <a:solidFill>
+                <a:sysClr val="windowText" lastClr="000000"/>
+              </a:solidFill>
+            </a:endParaRPr>
+          </a:p>
+          <a:p>
+            <a:pPr algn="ctr"/>
+            <a:r>
+              <a:rPr lang="en-US" sz="1600" dirty="0">
+                <a:solidFill>
+                  <a:sysClr val="windowText" lastClr="000000"/>
+                </a:solidFill>
+              </a:rPr>
+              <a:t>t.&lt;dynamic&gt;.listener</a:t>
+            </a:r>
+          </a:p>
         </p:txBody>
       </p:sp>
       <p:grpSp>
@@ -4236,10 +4630,10 @@
         </p:nvGrpSpPr>
         <p:grpSpPr>
           <a:xfrm>
-            <a:off x="0" y="585782"/>
-            <a:ext cx="3260573" cy="1105709"/>
+            <a:off x="61537" y="-29546"/>
+            <a:ext cx="3668055" cy="1105709"/>
             <a:chOff x="468900" y="833284"/>
-            <a:chExt cx="3260573" cy="1105709"/>
+            <a:chExt cx="3668055" cy="1105709"/>
           </a:xfrm>
         </p:grpSpPr>
         <p:pic>
@@ -4257,13 +4651,13 @@
             <p:nvPr/>
           </p:nvPicPr>
           <p:blipFill>
-            <a:blip r:embed="rId2">
+            <a:blip r:embed="rId3">
               <a:extLst>
                 <a:ext uri="{28A0092B-C50C-407E-A947-70E740481C1C}">
                   <a14:useLocalDpi xmlns:a14="http://schemas.microsoft.com/office/drawing/2010/main" val="0"/>
                 </a:ext>
                 <a:ext uri="{96DAC541-7B7A-43D3-8B79-37D633B846F1}">
-                  <asvg:svgBlip xmlns:asvg="http://schemas.microsoft.com/office/drawing/2016/SVG/main" r:embed="rId3"/>
+                  <asvg:svgBlip xmlns:asvg="http://schemas.microsoft.com/office/drawing/2016/SVG/main" r:embed="rId4"/>
                 </a:ext>
               </a:extLst>
             </a:blip>
@@ -4296,7 +4690,7 @@
           <p:spPr>
             <a:xfrm>
               <a:off x="468900" y="1569661"/>
-              <a:ext cx="3260573" cy="369332"/>
+              <a:ext cx="3668055" cy="369332"/>
             </a:xfrm>
             <a:prstGeom prst="rect">
               <a:avLst/>
@@ -4311,7 +4705,15 @@
             <a:p>
               <a:r>
                 <a:rPr lang="en-US" dirty="0"/>
-                <a:t>Train Management System (Java)</a:t>
+                <a:t>Train </a:t>
+              </a:r>
+              <a:r>
+                <a:rPr lang="en-US" dirty="0" err="1"/>
+                <a:t>Mgmt</a:t>
+              </a:r>
+              <a:r>
+                <a:rPr lang="en-US" dirty="0"/>
+                <a:t> Messaging System (Java)</a:t>
               </a:r>
             </a:p>
           </p:txBody>
@@ -4328,14 +4730,269 @@
           </p:cNvPr>
           <p:cNvCxnSpPr>
             <a:cxnSpLocks/>
-            <a:stCxn id="7" idx="2"/>
           </p:cNvCxnSpPr>
           <p:nvPr/>
         </p:nvCxnSpPr>
         <p:spPr>
-          <a:xfrm rot="16200000" flipH="1">
-            <a:off x="2636457" y="685321"/>
-            <a:ext cx="1479412" cy="3491752"/>
+          <a:xfrm>
+            <a:off x="1551223" y="1106394"/>
+            <a:ext cx="3570806" cy="2162181"/>
+          </a:xfrm>
+          <a:prstGeom prst="bentConnector3">
+            <a:avLst>
+              <a:gd name="adj1" fmla="val 24"/>
+            </a:avLst>
+          </a:prstGeom>
+          <a:ln>
+            <a:tailEnd type="triangle"/>
+          </a:ln>
+        </p:spPr>
+        <p:style>
+          <a:lnRef idx="1">
+            <a:schemeClr val="dk1"/>
+          </a:lnRef>
+          <a:fillRef idx="0">
+            <a:schemeClr val="dk1"/>
+          </a:fillRef>
+          <a:effectRef idx="0">
+            <a:schemeClr val="dk1"/>
+          </a:effectRef>
+          <a:fontRef idx="minor">
+            <a:schemeClr val="tx1"/>
+          </a:fontRef>
+        </p:style>
+      </p:cxnSp>
+      <p:sp>
+        <p:nvSpPr>
+          <p:cNvPr id="10" name="TextBox 9">
+            <a:extLst>
+              <a:ext uri="{FF2B5EF4-FFF2-40B4-BE49-F238E27FC236}">
+                <a16:creationId xmlns:a16="http://schemas.microsoft.com/office/drawing/2014/main" id="{9800C6B1-C350-4C6A-92E3-AAD83D06D33A}"/>
+              </a:ext>
+            </a:extLst>
+          </p:cNvPr>
+          <p:cNvSpPr txBox="1"/>
+          <p:nvPr/>
+        </p:nvSpPr>
+        <p:spPr>
+          <a:xfrm>
+            <a:off x="2465717" y="2838132"/>
+            <a:ext cx="1983235" cy="369332"/>
+          </a:xfrm>
+          <a:prstGeom prst="rect">
+            <a:avLst/>
+          </a:prstGeom>
+          <a:noFill/>
+        </p:spPr>
+        <p:txBody>
+          <a:bodyPr wrap="none" rtlCol="0">
+            <a:spAutoFit/>
+          </a:bodyPr>
+          <a:lstStyle/>
+          <a:p>
+            <a:r>
+              <a:rPr lang="en-US" b="1" dirty="0"/>
+              <a:t>P </a:t>
+            </a:r>
+            <a:r>
+              <a:rPr lang="en-US" b="1" dirty="0" err="1"/>
+              <a:t>q.breakdown</a:t>
+            </a:r>
+            <a:r>
+              <a:rPr lang="en-US" b="1" dirty="0"/>
+              <a:t> (Q)</a:t>
+            </a:r>
+          </a:p>
+        </p:txBody>
+      </p:sp>
+      <p:cxnSp>
+        <p:nvCxnSpPr>
+          <p:cNvPr id="18" name="Connector: Elbow 17">
+            <a:extLst>
+              <a:ext uri="{FF2B5EF4-FFF2-40B4-BE49-F238E27FC236}">
+                <a16:creationId xmlns:a16="http://schemas.microsoft.com/office/drawing/2014/main" id="{3B890781-4519-431C-8FC6-623DA76406AA}"/>
+              </a:ext>
+            </a:extLst>
+          </p:cNvPr>
+          <p:cNvCxnSpPr>
+            <a:cxnSpLocks/>
+          </p:cNvCxnSpPr>
+          <p:nvPr/>
+        </p:nvCxnSpPr>
+        <p:spPr>
+          <a:xfrm rot="10800000">
+            <a:off x="1279433" y="1091546"/>
+            <a:ext cx="3808134" cy="2401682"/>
+          </a:xfrm>
+          <a:prstGeom prst="bentConnector3">
+            <a:avLst>
+              <a:gd name="adj1" fmla="val 99960"/>
+            </a:avLst>
+          </a:prstGeom>
+          <a:ln>
+            <a:tailEnd type="triangle"/>
+          </a:ln>
+        </p:spPr>
+        <p:style>
+          <a:lnRef idx="1">
+            <a:schemeClr val="dk1"/>
+          </a:lnRef>
+          <a:fillRef idx="0">
+            <a:schemeClr val="dk1"/>
+          </a:fillRef>
+          <a:effectRef idx="0">
+            <a:schemeClr val="dk1"/>
+          </a:effectRef>
+          <a:fontRef idx="minor">
+            <a:schemeClr val="tx1"/>
+          </a:fontRef>
+        </p:style>
+      </p:cxnSp>
+      <p:sp>
+        <p:nvSpPr>
+          <p:cNvPr id="23" name="TextBox 22">
+            <a:extLst>
+              <a:ext uri="{FF2B5EF4-FFF2-40B4-BE49-F238E27FC236}">
+                <a16:creationId xmlns:a16="http://schemas.microsoft.com/office/drawing/2014/main" id="{CBD54833-AD6B-4E26-BD20-A0B9FCE70EDA}"/>
+              </a:ext>
+            </a:extLst>
+          </p:cNvPr>
+          <p:cNvSpPr txBox="1"/>
+          <p:nvPr/>
+        </p:nvSpPr>
+        <p:spPr>
+          <a:xfrm>
+            <a:off x="2556414" y="3429002"/>
+            <a:ext cx="1788759" cy="369332"/>
+          </a:xfrm>
+          <a:prstGeom prst="rect">
+            <a:avLst/>
+          </a:prstGeom>
+          <a:noFill/>
+        </p:spPr>
+        <p:txBody>
+          <a:bodyPr wrap="none" rtlCol="0">
+            <a:spAutoFit/>
+          </a:bodyPr>
+          <a:lstStyle/>
+          <a:p>
+            <a:r>
+              <a:rPr lang="en-US" b="1" dirty="0"/>
+              <a:t>C </a:t>
+            </a:r>
+            <a:r>
+              <a:rPr lang="en-US" b="1" dirty="0" err="1"/>
+              <a:t>q.deployed</a:t>
+            </a:r>
+            <a:r>
+              <a:rPr lang="en-US" b="1" dirty="0"/>
+              <a:t> (Q)</a:t>
+            </a:r>
+          </a:p>
+        </p:txBody>
+      </p:sp>
+      <p:sp>
+        <p:nvSpPr>
+          <p:cNvPr id="29" name="TextBox 28">
+            <a:extLst>
+              <a:ext uri="{FF2B5EF4-FFF2-40B4-BE49-F238E27FC236}">
+                <a16:creationId xmlns:a16="http://schemas.microsoft.com/office/drawing/2014/main" id="{882E8340-A17A-416C-B177-62F27DC00613}"/>
+              </a:ext>
+            </a:extLst>
+          </p:cNvPr>
+          <p:cNvSpPr txBox="1"/>
+          <p:nvPr/>
+        </p:nvSpPr>
+        <p:spPr>
+          <a:xfrm>
+            <a:off x="4128264" y="1626265"/>
+            <a:ext cx="2293513" cy="523220"/>
+          </a:xfrm>
+          <a:prstGeom prst="rect">
+            <a:avLst/>
+          </a:prstGeom>
+          <a:noFill/>
+        </p:spPr>
+        <p:txBody>
+          <a:bodyPr wrap="square" rtlCol="0">
+            <a:spAutoFit/>
+          </a:bodyPr>
+          <a:lstStyle/>
+          <a:p>
+            <a:pPr algn="ctr"/>
+            <a:r>
+              <a:rPr lang="en-US" sz="1400" b="1" dirty="0"/>
+              <a:t>Break down messages</a:t>
+            </a:r>
+          </a:p>
+          <a:p>
+            <a:pPr algn="ctr"/>
+            <a:r>
+              <a:rPr lang="en-US" sz="1400" b="1" dirty="0"/>
+              <a:t>Heavy Rainfall Report</a:t>
+            </a:r>
+          </a:p>
+        </p:txBody>
+      </p:sp>
+      <p:sp>
+        <p:nvSpPr>
+          <p:cNvPr id="38" name="TextBox 37">
+            <a:extLst>
+              <a:ext uri="{FF2B5EF4-FFF2-40B4-BE49-F238E27FC236}">
+                <a16:creationId xmlns:a16="http://schemas.microsoft.com/office/drawing/2014/main" id="{9F22159C-A555-405B-A67C-7CD6F01B6880}"/>
+              </a:ext>
+            </a:extLst>
+          </p:cNvPr>
+          <p:cNvSpPr txBox="1"/>
+          <p:nvPr/>
+        </p:nvSpPr>
+        <p:spPr>
+          <a:xfrm>
+            <a:off x="7373002" y="3048391"/>
+            <a:ext cx="1431097" cy="369332"/>
+          </a:xfrm>
+          <a:prstGeom prst="rect">
+            <a:avLst/>
+          </a:prstGeom>
+          <a:noFill/>
+        </p:spPr>
+        <p:txBody>
+          <a:bodyPr wrap="none" rtlCol="0">
+            <a:spAutoFit/>
+          </a:bodyPr>
+          <a:lstStyle/>
+          <a:p>
+            <a:r>
+              <a:rPr lang="en-US" b="1" dirty="0"/>
+              <a:t>P </a:t>
+            </a:r>
+            <a:r>
+              <a:rPr lang="en-US" b="1" dirty="0" err="1"/>
+              <a:t>q.deployed</a:t>
+            </a:r>
+            <a:endParaRPr lang="en-US" b="1" dirty="0"/>
+          </a:p>
+        </p:txBody>
+      </p:sp>
+      <p:cxnSp>
+        <p:nvCxnSpPr>
+          <p:cNvPr id="49" name="Connector: Elbow 48">
+            <a:extLst>
+              <a:ext uri="{FF2B5EF4-FFF2-40B4-BE49-F238E27FC236}">
+                <a16:creationId xmlns:a16="http://schemas.microsoft.com/office/drawing/2014/main" id="{10503AB8-2E7F-4A4A-8AF9-5A46BDFC0E68}"/>
+              </a:ext>
+            </a:extLst>
+          </p:cNvPr>
+          <p:cNvCxnSpPr>
+            <a:cxnSpLocks/>
+            <a:endCxn id="43" idx="0"/>
+          </p:cNvCxnSpPr>
+          <p:nvPr/>
+        </p:nvCxnSpPr>
+        <p:spPr>
+          <a:xfrm>
+            <a:off x="7066012" y="4507197"/>
+            <a:ext cx="2638679" cy="351332"/>
           </a:xfrm>
           <a:prstGeom prst="bentConnector2">
             <a:avLst/>
@@ -4361,10 +5018,10 @@
       </p:cxnSp>
       <p:sp>
         <p:nvSpPr>
-          <p:cNvPr id="10" name="TextBox 9">
-            <a:extLst>
-              <a:ext uri="{FF2B5EF4-FFF2-40B4-BE49-F238E27FC236}">
-                <a16:creationId xmlns:a16="http://schemas.microsoft.com/office/drawing/2014/main" id="{9800C6B1-C350-4C6A-92E3-AAD83D06D33A}"/>
+          <p:cNvPr id="51" name="TextBox 50">
+            <a:extLst>
+              <a:ext uri="{FF2B5EF4-FFF2-40B4-BE49-F238E27FC236}">
+                <a16:creationId xmlns:a16="http://schemas.microsoft.com/office/drawing/2014/main" id="{F1069B8D-71A9-4E35-A146-1936AECD6276}"/>
               </a:ext>
             </a:extLst>
           </p:cNvPr>
@@ -4373,8 +5030,8 @@
         </p:nvSpPr>
         <p:spPr>
           <a:xfrm>
-            <a:off x="2465717" y="2838132"/>
-            <a:ext cx="1416798" cy="369332"/>
+            <a:off x="7305136" y="4136044"/>
+            <a:ext cx="2210862" cy="369332"/>
           </a:xfrm>
           <a:prstGeom prst="rect">
             <a:avLst/>
@@ -4388,98 +5045,26 @@
           <a:lstStyle/>
           <a:p>
             <a:r>
-              <a:rPr lang="en-US" dirty="0" err="1"/>
-              <a:t>q.breakdown</a:t>
-            </a:r>
-            <a:endParaRPr lang="en-US" dirty="0"/>
-          </a:p>
-        </p:txBody>
-      </p:sp>
-      <p:cxnSp>
-        <p:nvCxnSpPr>
-          <p:cNvPr id="18" name="Connector: Elbow 17">
-            <a:extLst>
-              <a:ext uri="{FF2B5EF4-FFF2-40B4-BE49-F238E27FC236}">
-                <a16:creationId xmlns:a16="http://schemas.microsoft.com/office/drawing/2014/main" id="{3B890781-4519-431C-8FC6-623DA76406AA}"/>
-              </a:ext>
-            </a:extLst>
-          </p:cNvPr>
-          <p:cNvCxnSpPr>
-            <a:cxnSpLocks/>
-          </p:cNvCxnSpPr>
-          <p:nvPr/>
-        </p:nvCxnSpPr>
-        <p:spPr>
-          <a:xfrm rot="10800000">
-            <a:off x="1347781" y="1691490"/>
-            <a:ext cx="3774258" cy="1737511"/>
-          </a:xfrm>
-          <a:prstGeom prst="bentConnector3">
-            <a:avLst>
-              <a:gd name="adj1" fmla="val 100018"/>
-            </a:avLst>
-          </a:prstGeom>
-          <a:ln>
-            <a:tailEnd type="triangle"/>
-          </a:ln>
-        </p:spPr>
-        <p:style>
-          <a:lnRef idx="1">
-            <a:schemeClr val="dk1"/>
-          </a:lnRef>
-          <a:fillRef idx="0">
-            <a:schemeClr val="dk1"/>
-          </a:fillRef>
-          <a:effectRef idx="0">
-            <a:schemeClr val="dk1"/>
-          </a:effectRef>
-          <a:fontRef idx="minor">
-            <a:schemeClr val="tx1"/>
-          </a:fontRef>
-        </p:style>
-      </p:cxnSp>
-      <p:sp>
-        <p:nvSpPr>
-          <p:cNvPr id="23" name="TextBox 22">
-            <a:extLst>
-              <a:ext uri="{FF2B5EF4-FFF2-40B4-BE49-F238E27FC236}">
-                <a16:creationId xmlns:a16="http://schemas.microsoft.com/office/drawing/2014/main" id="{CBD54833-AD6B-4E26-BD20-A0B9FCE70EDA}"/>
-              </a:ext>
-            </a:extLst>
-          </p:cNvPr>
-          <p:cNvSpPr txBox="1"/>
-          <p:nvPr/>
-        </p:nvSpPr>
-        <p:spPr>
-          <a:xfrm>
-            <a:off x="2556414" y="3429002"/>
-            <a:ext cx="1235403" cy="369332"/>
-          </a:xfrm>
-          <a:prstGeom prst="rect">
-            <a:avLst/>
-          </a:prstGeom>
-          <a:noFill/>
-        </p:spPr>
-        <p:txBody>
-          <a:bodyPr wrap="none" rtlCol="0">
-            <a:spAutoFit/>
-          </a:bodyPr>
-          <a:lstStyle/>
-          <a:p>
-            <a:r>
-              <a:rPr lang="en-US" dirty="0" err="1"/>
-              <a:t>q.deployed</a:t>
-            </a:r>
-            <a:endParaRPr lang="en-US" dirty="0"/>
+              <a:rPr lang="en-US" b="1" dirty="0"/>
+              <a:t>C </a:t>
+            </a:r>
+            <a:r>
+              <a:rPr lang="en-US" b="1" dirty="0" err="1"/>
+              <a:t>q.depot</a:t>
+            </a:r>
+            <a:r>
+              <a:rPr lang="en-US" b="1" dirty="0"/>
+              <a:t>.&lt;dynamic&gt;</a:t>
+            </a:r>
           </a:p>
         </p:txBody>
       </p:sp>
       <p:grpSp>
         <p:nvGrpSpPr>
-          <p:cNvPr id="28" name="Group 27">
-            <a:extLst>
-              <a:ext uri="{FF2B5EF4-FFF2-40B4-BE49-F238E27FC236}">
-                <a16:creationId xmlns:a16="http://schemas.microsoft.com/office/drawing/2014/main" id="{5F995AC6-390D-404C-91CD-6A6141ADBFDB}"/>
+          <p:cNvPr id="126" name="Group 125">
+            <a:extLst>
+              <a:ext uri="{FF2B5EF4-FFF2-40B4-BE49-F238E27FC236}">
+                <a16:creationId xmlns:a16="http://schemas.microsoft.com/office/drawing/2014/main" id="{BA06E3DD-A2B7-49C6-84FA-B1068E51BEAC}"/>
               </a:ext>
             </a:extLst>
           </p:cNvPr>
@@ -4488,18 +5073,386 @@
         </p:nvGrpSpPr>
         <p:grpSpPr>
           <a:xfrm>
-            <a:off x="5356051" y="128582"/>
-            <a:ext cx="1478866" cy="1168032"/>
-            <a:chOff x="5400295" y="128582"/>
-            <a:chExt cx="1478866" cy="1168032"/>
+            <a:off x="7499807" y="4858529"/>
+            <a:ext cx="4409768" cy="1917290"/>
+            <a:chOff x="7499807" y="4165913"/>
+            <a:chExt cx="4409768" cy="1917290"/>
+          </a:xfrm>
+        </p:grpSpPr>
+        <p:grpSp>
+          <p:nvGrpSpPr>
+            <p:cNvPr id="46" name="Group 45">
+              <a:extLst>
+                <a:ext uri="{FF2B5EF4-FFF2-40B4-BE49-F238E27FC236}">
+                  <a16:creationId xmlns:a16="http://schemas.microsoft.com/office/drawing/2014/main" id="{54A3FA70-B7B9-409A-B0AE-D4BB73DF526A}"/>
+                </a:ext>
+              </a:extLst>
+            </p:cNvPr>
+            <p:cNvGrpSpPr/>
+            <p:nvPr/>
+          </p:nvGrpSpPr>
+          <p:grpSpPr>
+            <a:xfrm>
+              <a:off x="7499807" y="4165913"/>
+              <a:ext cx="4409768" cy="1917290"/>
+              <a:chOff x="412955" y="4822723"/>
+              <a:chExt cx="4409768" cy="1917290"/>
+            </a:xfrm>
+          </p:grpSpPr>
+          <p:sp>
+            <p:nvSpPr>
+              <p:cNvPr id="43" name="Rectangle 42">
+                <a:extLst>
+                  <a:ext uri="{FF2B5EF4-FFF2-40B4-BE49-F238E27FC236}">
+                    <a16:creationId xmlns:a16="http://schemas.microsoft.com/office/drawing/2014/main" id="{4446AA8A-0D89-46CC-8C85-7D9D7D40107E}"/>
+                  </a:ext>
+                </a:extLst>
+              </p:cNvPr>
+              <p:cNvSpPr/>
+              <p:nvPr/>
+            </p:nvSpPr>
+            <p:spPr>
+              <a:xfrm>
+                <a:off x="412955" y="4822723"/>
+                <a:ext cx="4409768" cy="1917290"/>
+              </a:xfrm>
+              <a:prstGeom prst="rect">
+                <a:avLst/>
+              </a:prstGeom>
+              <a:noFill/>
+              <a:ln>
+                <a:solidFill>
+                  <a:schemeClr val="tx1">
+                    <a:lumMod val="95000"/>
+                    <a:lumOff val="5000"/>
+                  </a:schemeClr>
+                </a:solidFill>
+              </a:ln>
+            </p:spPr>
+            <p:style>
+              <a:lnRef idx="2">
+                <a:schemeClr val="accent1">
+                  <a:shade val="50000"/>
+                </a:schemeClr>
+              </a:lnRef>
+              <a:fillRef idx="1">
+                <a:schemeClr val="accent1"/>
+              </a:fillRef>
+              <a:effectRef idx="0">
+                <a:schemeClr val="accent1"/>
+              </a:effectRef>
+              <a:fontRef idx="minor">
+                <a:schemeClr val="lt1"/>
+              </a:fontRef>
+            </p:style>
+            <p:txBody>
+              <a:bodyPr rtlCol="0" anchor="ctr"/>
+              <a:lstStyle/>
+              <a:p>
+                <a:pPr algn="ctr"/>
+                <a:endParaRPr lang="en-US"/>
+              </a:p>
+            </p:txBody>
+          </p:sp>
+          <p:pic>
+            <p:nvPicPr>
+              <p:cNvPr id="41" name="Graphic 40" descr="Computer">
+                <a:extLst>
+                  <a:ext uri="{FF2B5EF4-FFF2-40B4-BE49-F238E27FC236}">
+                    <a16:creationId xmlns:a16="http://schemas.microsoft.com/office/drawing/2014/main" id="{01A1BA12-2B48-49A0-9E0B-46FE2E24C579}"/>
+                  </a:ext>
+                </a:extLst>
+              </p:cNvPr>
+              <p:cNvPicPr>
+                <a:picLocks noChangeAspect="1"/>
+              </p:cNvPicPr>
+              <p:nvPr/>
+            </p:nvPicPr>
+            <p:blipFill>
+              <a:blip r:embed="rId3">
+                <a:extLst>
+                  <a:ext uri="{28A0092B-C50C-407E-A947-70E740481C1C}">
+                    <a14:useLocalDpi xmlns:a14="http://schemas.microsoft.com/office/drawing/2010/main" val="0"/>
+                  </a:ext>
+                  <a:ext uri="{96DAC541-7B7A-43D3-8B79-37D633B846F1}">
+                    <asvg:svgBlip xmlns:asvg="http://schemas.microsoft.com/office/drawing/2016/SVG/main" r:embed="rId4"/>
+                  </a:ext>
+                </a:extLst>
+              </a:blip>
+              <a:stretch>
+                <a:fillRect/>
+              </a:stretch>
+            </p:blipFill>
+            <p:spPr>
+              <a:xfrm>
+                <a:off x="883261" y="5324168"/>
+                <a:ext cx="914400" cy="914400"/>
+              </a:xfrm>
+              <a:prstGeom prst="rect">
+                <a:avLst/>
+              </a:prstGeom>
+            </p:spPr>
+          </p:pic>
+          <p:sp>
+            <p:nvSpPr>
+              <p:cNvPr id="42" name="TextBox 41">
+                <a:extLst>
+                  <a:ext uri="{FF2B5EF4-FFF2-40B4-BE49-F238E27FC236}">
+                    <a16:creationId xmlns:a16="http://schemas.microsoft.com/office/drawing/2014/main" id="{5EFE54E3-B97B-46C7-92AF-B57445685AEF}"/>
+                  </a:ext>
+                </a:extLst>
+              </p:cNvPr>
+              <p:cNvSpPr txBox="1"/>
+              <p:nvPr/>
+            </p:nvSpPr>
+            <p:spPr>
+              <a:xfrm>
+                <a:off x="813508" y="6336044"/>
+                <a:ext cx="3670685" cy="369332"/>
+              </a:xfrm>
+              <a:prstGeom prst="rect">
+                <a:avLst/>
+              </a:prstGeom>
+              <a:noFill/>
+            </p:spPr>
+            <p:txBody>
+              <a:bodyPr wrap="none" rtlCol="0">
+                <a:spAutoFit/>
+              </a:bodyPr>
+              <a:lstStyle/>
+              <a:p>
+                <a:r>
+                  <a:rPr lang="en-US" dirty="0"/>
+                  <a:t>Bus Depots Deploy </a:t>
+                </a:r>
+                <a:r>
+                  <a:rPr lang="en-US" dirty="0" err="1"/>
+                  <a:t>Mgmt</a:t>
+                </a:r>
+                <a:r>
+                  <a:rPr lang="en-US" dirty="0"/>
+                  <a:t> System(C#)</a:t>
+                </a:r>
+              </a:p>
+            </p:txBody>
+          </p:sp>
+          <p:pic>
+            <p:nvPicPr>
+              <p:cNvPr id="44" name="Graphic 43" descr="Computer">
+                <a:extLst>
+                  <a:ext uri="{FF2B5EF4-FFF2-40B4-BE49-F238E27FC236}">
+                    <a16:creationId xmlns:a16="http://schemas.microsoft.com/office/drawing/2014/main" id="{0E58A373-681D-41AF-8DC1-85EFFDEBED7F}"/>
+                  </a:ext>
+                </a:extLst>
+              </p:cNvPr>
+              <p:cNvPicPr>
+                <a:picLocks noChangeAspect="1"/>
+              </p:cNvPicPr>
+              <p:nvPr/>
+            </p:nvPicPr>
+            <p:blipFill>
+              <a:blip r:embed="rId3">
+                <a:extLst>
+                  <a:ext uri="{28A0092B-C50C-407E-A947-70E740481C1C}">
+                    <a14:useLocalDpi xmlns:a14="http://schemas.microsoft.com/office/drawing/2010/main" val="0"/>
+                  </a:ext>
+                  <a:ext uri="{96DAC541-7B7A-43D3-8B79-37D633B846F1}">
+                    <asvg:svgBlip xmlns:asvg="http://schemas.microsoft.com/office/drawing/2016/SVG/main" r:embed="rId4"/>
+                  </a:ext>
+                </a:extLst>
+              </a:blip>
+              <a:stretch>
+                <a:fillRect/>
+              </a:stretch>
+            </p:blipFill>
+            <p:spPr>
+              <a:xfrm>
+                <a:off x="2198797" y="5324168"/>
+                <a:ext cx="914400" cy="914400"/>
+              </a:xfrm>
+              <a:prstGeom prst="rect">
+                <a:avLst/>
+              </a:prstGeom>
+            </p:spPr>
+          </p:pic>
+          <p:pic>
+            <p:nvPicPr>
+              <p:cNvPr id="45" name="Graphic 44" descr="Computer">
+                <a:extLst>
+                  <a:ext uri="{FF2B5EF4-FFF2-40B4-BE49-F238E27FC236}">
+                    <a16:creationId xmlns:a16="http://schemas.microsoft.com/office/drawing/2014/main" id="{047C174D-422A-4AF8-A632-2D7364D78418}"/>
+                  </a:ext>
+                </a:extLst>
+              </p:cNvPr>
+              <p:cNvPicPr>
+                <a:picLocks noChangeAspect="1"/>
+              </p:cNvPicPr>
+              <p:nvPr/>
+            </p:nvPicPr>
+            <p:blipFill>
+              <a:blip r:embed="rId3">
+                <a:extLst>
+                  <a:ext uri="{28A0092B-C50C-407E-A947-70E740481C1C}">
+                    <a14:useLocalDpi xmlns:a14="http://schemas.microsoft.com/office/drawing/2010/main" val="0"/>
+                  </a:ext>
+                  <a:ext uri="{96DAC541-7B7A-43D3-8B79-37D633B846F1}">
+                    <asvg:svgBlip xmlns:asvg="http://schemas.microsoft.com/office/drawing/2016/SVG/main" r:embed="rId4"/>
+                  </a:ext>
+                </a:extLst>
+              </a:blip>
+              <a:stretch>
+                <a:fillRect/>
+              </a:stretch>
+            </p:blipFill>
+            <p:spPr>
+              <a:xfrm>
+                <a:off x="3510760" y="5324168"/>
+                <a:ext cx="914400" cy="914400"/>
+              </a:xfrm>
+              <a:prstGeom prst="rect">
+                <a:avLst/>
+              </a:prstGeom>
+            </p:spPr>
+          </p:pic>
+        </p:grpSp>
+        <p:sp>
+          <p:nvSpPr>
+            <p:cNvPr id="53" name="TextBox 52">
+              <a:extLst>
+                <a:ext uri="{FF2B5EF4-FFF2-40B4-BE49-F238E27FC236}">
+                  <a16:creationId xmlns:a16="http://schemas.microsoft.com/office/drawing/2014/main" id="{757A665E-A648-45FB-B029-9CB6A71BA95B}"/>
+                </a:ext>
+              </a:extLst>
+            </p:cNvPr>
+            <p:cNvSpPr txBox="1"/>
+            <p:nvPr/>
+          </p:nvSpPr>
+          <p:spPr>
+            <a:xfrm>
+              <a:off x="7673092" y="4415993"/>
+              <a:ext cx="1428468" cy="307777"/>
+            </a:xfrm>
+            <a:prstGeom prst="rect">
+              <a:avLst/>
+            </a:prstGeom>
+            <a:noFill/>
+          </p:spPr>
+          <p:txBody>
+            <a:bodyPr wrap="square" rtlCol="0">
+              <a:spAutoFit/>
+            </a:bodyPr>
+            <a:lstStyle/>
+            <a:p>
+              <a:pPr algn="ctr"/>
+              <a:r>
+                <a:rPr lang="en-US" sz="1400" dirty="0" err="1"/>
+                <a:t>q.depot.jurong</a:t>
+              </a:r>
+              <a:endParaRPr lang="en-US" sz="1400" dirty="0"/>
+            </a:p>
+          </p:txBody>
+        </p:sp>
+        <p:sp>
+          <p:nvSpPr>
+            <p:cNvPr id="54" name="TextBox 53">
+              <a:extLst>
+                <a:ext uri="{FF2B5EF4-FFF2-40B4-BE49-F238E27FC236}">
+                  <a16:creationId xmlns:a16="http://schemas.microsoft.com/office/drawing/2014/main" id="{7699BB38-CC2B-4767-AD2B-232373CD019A}"/>
+                </a:ext>
+              </a:extLst>
+            </p:cNvPr>
+            <p:cNvSpPr txBox="1"/>
+            <p:nvPr/>
+          </p:nvSpPr>
+          <p:spPr>
+            <a:xfrm>
+              <a:off x="8898687" y="4404784"/>
+              <a:ext cx="1612008" cy="307777"/>
+            </a:xfrm>
+            <a:prstGeom prst="rect">
+              <a:avLst/>
+            </a:prstGeom>
+            <a:noFill/>
+          </p:spPr>
+          <p:txBody>
+            <a:bodyPr wrap="square" rtlCol="0">
+              <a:spAutoFit/>
+            </a:bodyPr>
+            <a:lstStyle/>
+            <a:p>
+              <a:pPr algn="ctr"/>
+              <a:r>
+                <a:rPr lang="en-US" sz="1400" dirty="0" err="1"/>
+                <a:t>q.depot.tampines</a:t>
+              </a:r>
+              <a:endParaRPr lang="en-US" sz="1400" dirty="0"/>
+            </a:p>
+          </p:txBody>
+        </p:sp>
+        <p:sp>
+          <p:nvSpPr>
+            <p:cNvPr id="55" name="TextBox 54">
+              <a:extLst>
+                <a:ext uri="{FF2B5EF4-FFF2-40B4-BE49-F238E27FC236}">
+                  <a16:creationId xmlns:a16="http://schemas.microsoft.com/office/drawing/2014/main" id="{EDD37F66-D735-4309-B1BC-934E333C5EE8}"/>
+                </a:ext>
+              </a:extLst>
+            </p:cNvPr>
+            <p:cNvSpPr txBox="1"/>
+            <p:nvPr/>
+          </p:nvSpPr>
+          <p:spPr>
+            <a:xfrm>
+              <a:off x="10249651" y="4406849"/>
+              <a:ext cx="1612008" cy="307777"/>
+            </a:xfrm>
+            <a:prstGeom prst="rect">
+              <a:avLst/>
+            </a:prstGeom>
+            <a:noFill/>
+          </p:spPr>
+          <p:txBody>
+            <a:bodyPr wrap="square" rtlCol="0">
+              <a:spAutoFit/>
+            </a:bodyPr>
+            <a:lstStyle/>
+            <a:p>
+              <a:pPr algn="ctr"/>
+              <a:r>
+                <a:rPr lang="en-US" sz="1400" dirty="0" err="1"/>
+                <a:t>q.depot.toapayoh</a:t>
+              </a:r>
+              <a:endParaRPr lang="en-US" sz="1400" dirty="0"/>
+            </a:p>
+          </p:txBody>
+        </p:sp>
+      </p:grpSp>
+      <p:grpSp>
+        <p:nvGrpSpPr>
+          <p:cNvPr id="56" name="Group 55">
+            <a:extLst>
+              <a:ext uri="{FF2B5EF4-FFF2-40B4-BE49-F238E27FC236}">
+                <a16:creationId xmlns:a16="http://schemas.microsoft.com/office/drawing/2014/main" id="{7976C5A8-5D8B-4FD0-93EF-0F0696FB09CF}"/>
+              </a:ext>
+            </a:extLst>
+          </p:cNvPr>
+          <p:cNvGrpSpPr/>
+          <p:nvPr/>
+        </p:nvGrpSpPr>
+        <p:grpSpPr>
+          <a:xfrm>
+            <a:off x="57296" y="3596217"/>
+            <a:ext cx="2552686" cy="1113076"/>
+            <a:chOff x="1406811" y="686282"/>
+            <a:chExt cx="2552686" cy="1113076"/>
           </a:xfrm>
         </p:grpSpPr>
         <p:pic>
           <p:nvPicPr>
-            <p:cNvPr id="24" name="Graphic 23" descr="Rubber duck">
+            <p:cNvPr id="57" name="Graphic 56" descr="Computer">
               <a:extLst>
                 <a:ext uri="{FF2B5EF4-FFF2-40B4-BE49-F238E27FC236}">
-                  <a16:creationId xmlns:a16="http://schemas.microsoft.com/office/drawing/2014/main" id="{41C81EFD-2273-4120-966C-0DB259F802B8}"/>
+                  <a16:creationId xmlns:a16="http://schemas.microsoft.com/office/drawing/2014/main" id="{B490D1D9-8703-44A1-B47A-9132FBD36A85}"/>
                 </a:ext>
               </a:extLst>
             </p:cNvPr>
@@ -4509,13 +5462,13 @@
             <p:nvPr/>
           </p:nvPicPr>
           <p:blipFill>
-            <a:blip r:embed="rId4">
+            <a:blip r:embed="rId3">
               <a:extLst>
                 <a:ext uri="{28A0092B-C50C-407E-A947-70E740481C1C}">
                   <a14:useLocalDpi xmlns:a14="http://schemas.microsoft.com/office/drawing/2010/main" val="0"/>
                 </a:ext>
                 <a:ext uri="{96DAC541-7B7A-43D3-8B79-37D633B846F1}">
-                  <asvg:svgBlip xmlns:asvg="http://schemas.microsoft.com/office/drawing/2016/SVG/main" r:embed="rId5"/>
+                  <asvg:svgBlip xmlns:asvg="http://schemas.microsoft.com/office/drawing/2016/SVG/main" r:embed="rId4"/>
                 </a:ext>
               </a:extLst>
             </a:blip>
@@ -4525,7 +5478,7 @@
           </p:blipFill>
           <p:spPr>
             <a:xfrm>
-              <a:off x="5638801" y="128582"/>
+              <a:off x="2137303" y="686282"/>
               <a:ext cx="914400" cy="914400"/>
             </a:xfrm>
             <a:prstGeom prst="rect">
@@ -4535,10 +5488,10 @@
         </p:pic>
         <p:sp>
           <p:nvSpPr>
-            <p:cNvPr id="25" name="TextBox 24">
+            <p:cNvPr id="58" name="TextBox 57">
               <a:extLst>
                 <a:ext uri="{FF2B5EF4-FFF2-40B4-BE49-F238E27FC236}">
-                  <a16:creationId xmlns:a16="http://schemas.microsoft.com/office/drawing/2014/main" id="{EC2323EA-C17D-4014-9F01-C357DA3EA42D}"/>
+                  <a16:creationId xmlns:a16="http://schemas.microsoft.com/office/drawing/2014/main" id="{D2D6274C-B8EC-49A7-92EF-BF33EE663F29}"/>
                 </a:ext>
               </a:extLst>
             </p:cNvPr>
@@ -4547,8 +5500,8 @@
           </p:nvSpPr>
           <p:spPr>
             <a:xfrm>
-              <a:off x="5400295" y="927282"/>
-              <a:ext cx="1478866" cy="369332"/>
+              <a:off x="1406811" y="1430026"/>
+              <a:ext cx="2552686" cy="369332"/>
             </a:xfrm>
             <a:prstGeom prst="rect">
               <a:avLst/>
@@ -4563,7 +5516,7 @@
             <a:p>
               <a:r>
                 <a:rPr lang="en-US" dirty="0"/>
-                <a:t>Twitter Plugin</a:t>
+                <a:t>Bus Management System</a:t>
               </a:r>
             </a:p>
           </p:txBody>
@@ -4571,24 +5524,23 @@
       </p:grpSp>
       <p:cxnSp>
         <p:nvCxnSpPr>
-          <p:cNvPr id="27" name="Straight Arrow Connector 26">
-            <a:extLst>
-              <a:ext uri="{FF2B5EF4-FFF2-40B4-BE49-F238E27FC236}">
-                <a16:creationId xmlns:a16="http://schemas.microsoft.com/office/drawing/2014/main" id="{0FE6EFA7-41E9-4065-8D84-C3C4516A9C68}"/>
+          <p:cNvPr id="62" name="Straight Arrow Connector 61">
+            <a:extLst>
+              <a:ext uri="{FF2B5EF4-FFF2-40B4-BE49-F238E27FC236}">
+                <a16:creationId xmlns:a16="http://schemas.microsoft.com/office/drawing/2014/main" id="{BC547505-418E-4046-8B9C-3E0502ED48FF}"/>
               </a:ext>
             </a:extLst>
           </p:cNvPr>
           <p:cNvCxnSpPr>
             <a:cxnSpLocks/>
-            <a:stCxn id="4" idx="0"/>
-            <a:endCxn id="25" idx="2"/>
+            <a:stCxn id="57" idx="3"/>
           </p:cNvCxnSpPr>
           <p:nvPr/>
         </p:nvCxnSpPr>
         <p:spPr>
-          <a:xfrm flipH="1" flipV="1">
-            <a:off x="6095484" y="1296614"/>
-            <a:ext cx="517" cy="1446586"/>
+          <a:xfrm>
+            <a:off x="1702188" y="4053417"/>
+            <a:ext cx="3419841" cy="22028"/>
           </a:xfrm>
           <a:prstGeom prst="straightConnector1">
             <a:avLst/>
@@ -4614,10 +5566,10 @@
       </p:cxnSp>
       <p:sp>
         <p:nvSpPr>
-          <p:cNvPr id="29" name="TextBox 28">
-            <a:extLst>
-              <a:ext uri="{FF2B5EF4-FFF2-40B4-BE49-F238E27FC236}">
-                <a16:creationId xmlns:a16="http://schemas.microsoft.com/office/drawing/2014/main" id="{882E8340-A17A-416C-B177-62F27DC00613}"/>
+          <p:cNvPr id="63" name="TextBox 62">
+            <a:extLst>
+              <a:ext uri="{FF2B5EF4-FFF2-40B4-BE49-F238E27FC236}">
+                <a16:creationId xmlns:a16="http://schemas.microsoft.com/office/drawing/2014/main" id="{6C2417B4-8A3B-459B-90E3-E45536848137}"/>
               </a:ext>
             </a:extLst>
           </p:cNvPr>
@@ -4626,8 +5578,8 @@
         </p:nvSpPr>
         <p:spPr>
           <a:xfrm>
-            <a:off x="6095484" y="1772606"/>
-            <a:ext cx="2254720" cy="646331"/>
+            <a:off x="2557112" y="4057433"/>
+            <a:ext cx="1123513" cy="369332"/>
           </a:xfrm>
           <a:prstGeom prst="rect">
             <a:avLst/>
@@ -4635,31 +5587,29 @@
           <a:noFill/>
         </p:spPr>
         <p:txBody>
-          <a:bodyPr wrap="none" rtlCol="0">
+          <a:bodyPr wrap="square" rtlCol="0">
             <a:spAutoFit/>
           </a:bodyPr>
           <a:lstStyle/>
           <a:p>
             <a:r>
-              <a:rPr lang="en-US" dirty="0"/>
-              <a:t>Break down messages</a:t>
-            </a:r>
-          </a:p>
-          <a:p>
-            <a:pPr algn="ctr"/>
-            <a:r>
-              <a:rPr lang="en-US" dirty="0"/>
-              <a:t>Heavy Rainfall Report</a:t>
-            </a:r>
+              <a:rPr lang="en-US" b="1" dirty="0"/>
+              <a:t>File </a:t>
+            </a:r>
+            <a:r>
+              <a:rPr lang="en-US" b="1" dirty="0" err="1"/>
+              <a:t>Poller</a:t>
+            </a:r>
+            <a:endParaRPr lang="en-US" b="1" dirty="0"/>
           </a:p>
         </p:txBody>
       </p:sp>
       <p:grpSp>
         <p:nvGrpSpPr>
-          <p:cNvPr id="33" name="Group 32">
-            <a:extLst>
-              <a:ext uri="{FF2B5EF4-FFF2-40B4-BE49-F238E27FC236}">
-                <a16:creationId xmlns:a16="http://schemas.microsoft.com/office/drawing/2014/main" id="{63B28DEF-B414-4179-BB0A-B09B7DEDC750}"/>
+          <p:cNvPr id="64" name="Group 63">
+            <a:extLst>
+              <a:ext uri="{FF2B5EF4-FFF2-40B4-BE49-F238E27FC236}">
+                <a16:creationId xmlns:a16="http://schemas.microsoft.com/office/drawing/2014/main" id="{2267A04F-96F7-49C0-B8A3-5DC1B3F707BB}"/>
               </a:ext>
             </a:extLst>
           </p:cNvPr>
@@ -4668,18 +5618,61 @@
         </p:nvGrpSpPr>
         <p:grpSpPr>
           <a:xfrm>
-            <a:off x="8896297" y="2669150"/>
-            <a:ext cx="3030381" cy="1099066"/>
-            <a:chOff x="583994" y="833284"/>
-            <a:chExt cx="3030381" cy="1099066"/>
+            <a:off x="2308861" y="5372597"/>
+            <a:ext cx="2402389" cy="1485403"/>
+            <a:chOff x="978751" y="3005762"/>
+            <a:chExt cx="2402389" cy="1485403"/>
           </a:xfrm>
         </p:grpSpPr>
+        <p:sp>
+          <p:nvSpPr>
+            <p:cNvPr id="65" name="TextBox 64">
+              <a:extLst>
+                <a:ext uri="{FF2B5EF4-FFF2-40B4-BE49-F238E27FC236}">
+                  <a16:creationId xmlns:a16="http://schemas.microsoft.com/office/drawing/2014/main" id="{8B3E46FF-3599-4502-857A-A9F7DAD6DB2D}"/>
+                </a:ext>
+              </a:extLst>
+            </p:cNvPr>
+            <p:cNvSpPr txBox="1"/>
+            <p:nvPr/>
+          </p:nvSpPr>
+          <p:spPr>
+            <a:xfrm>
+              <a:off x="978751" y="3844834"/>
+              <a:ext cx="2402389" cy="646331"/>
+            </a:xfrm>
+            <a:prstGeom prst="rect">
+              <a:avLst/>
+            </a:prstGeom>
+            <a:noFill/>
+          </p:spPr>
+          <p:txBody>
+            <a:bodyPr wrap="none" rtlCol="0">
+              <a:spAutoFit/>
+            </a:bodyPr>
+            <a:lstStyle/>
+            <a:p>
+              <a:pPr algn="ctr"/>
+              <a:r>
+                <a:rPr lang="en-US" dirty="0"/>
+                <a:t>Schedule Management </a:t>
+              </a:r>
+            </a:p>
+            <a:p>
+              <a:pPr algn="ctr"/>
+              <a:r>
+                <a:rPr lang="en-US" dirty="0"/>
+                <a:t>Web Service (PHP)</a:t>
+              </a:r>
+            </a:p>
+          </p:txBody>
+        </p:sp>
         <p:pic>
           <p:nvPicPr>
-            <p:cNvPr id="34" name="Graphic 33" descr="Computer">
+            <p:cNvPr id="66" name="Graphic 65" descr="Earth Globe Americas">
               <a:extLst>
                 <a:ext uri="{FF2B5EF4-FFF2-40B4-BE49-F238E27FC236}">
-                  <a16:creationId xmlns:a16="http://schemas.microsoft.com/office/drawing/2014/main" id="{0D5583D0-ED17-412D-AC5B-1BA8A51E536E}"/>
+                  <a16:creationId xmlns:a16="http://schemas.microsoft.com/office/drawing/2014/main" id="{7AFFB57A-AA42-4242-B9BC-4BA274D128DA}"/>
                 </a:ext>
               </a:extLst>
             </p:cNvPr>
@@ -4689,13 +5682,13 @@
             <p:nvPr/>
           </p:nvPicPr>
           <p:blipFill>
-            <a:blip r:embed="rId2">
+            <a:blip r:embed="rId5">
               <a:extLst>
                 <a:ext uri="{28A0092B-C50C-407E-A947-70E740481C1C}">
                   <a14:useLocalDpi xmlns:a14="http://schemas.microsoft.com/office/drawing/2010/main" val="0"/>
                 </a:ext>
                 <a:ext uri="{96DAC541-7B7A-43D3-8B79-37D633B846F1}">
-                  <asvg:svgBlip xmlns:asvg="http://schemas.microsoft.com/office/drawing/2016/SVG/main" r:embed="rId3"/>
+                  <asvg:svgBlip xmlns:asvg="http://schemas.microsoft.com/office/drawing/2016/SVG/main" r:embed="rId6"/>
                 </a:ext>
               </a:extLst>
             </a:blip>
@@ -4705,7 +5698,7 @@
           </p:blipFill>
           <p:spPr>
             <a:xfrm>
-              <a:off x="1641987" y="833284"/>
+              <a:off x="1641987" y="3005762"/>
               <a:ext cx="914400" cy="914400"/>
             </a:xfrm>
             <a:prstGeom prst="rect">
@@ -4713,12 +5706,68 @@
             </a:prstGeom>
           </p:spPr>
         </p:pic>
+      </p:grpSp>
+      <p:sp>
+        <p:nvSpPr>
+          <p:cNvPr id="69" name="TextBox 68">
+            <a:extLst>
+              <a:ext uri="{FF2B5EF4-FFF2-40B4-BE49-F238E27FC236}">
+                <a16:creationId xmlns:a16="http://schemas.microsoft.com/office/drawing/2014/main" id="{87FD0C4E-3A59-4EA3-99BD-D7E601D7FAAA}"/>
+              </a:ext>
+            </a:extLst>
+          </p:cNvPr>
+          <p:cNvSpPr txBox="1"/>
+          <p:nvPr/>
+        </p:nvSpPr>
+        <p:spPr>
+          <a:xfrm>
+            <a:off x="5559718" y="5139939"/>
+            <a:ext cx="684418" cy="369332"/>
+          </a:xfrm>
+          <a:prstGeom prst="rect">
+            <a:avLst/>
+          </a:prstGeom>
+          <a:noFill/>
+        </p:spPr>
+        <p:txBody>
+          <a:bodyPr wrap="none" rtlCol="0">
+            <a:spAutoFit/>
+          </a:bodyPr>
+          <a:lstStyle/>
+          <a:p>
+            <a:r>
+              <a:rPr lang="en-US" b="1" dirty="0"/>
+              <a:t>HTTP</a:t>
+            </a:r>
+          </a:p>
+        </p:txBody>
+      </p:sp>
+      <p:grpSp>
+        <p:nvGrpSpPr>
+          <p:cNvPr id="71" name="Group 70">
+            <a:extLst>
+              <a:ext uri="{FF2B5EF4-FFF2-40B4-BE49-F238E27FC236}">
+                <a16:creationId xmlns:a16="http://schemas.microsoft.com/office/drawing/2014/main" id="{3FC55428-A528-4B9F-8C06-57C2E45E2767}"/>
+              </a:ext>
+            </a:extLst>
+          </p:cNvPr>
+          <p:cNvGrpSpPr/>
+          <p:nvPr/>
+        </p:nvGrpSpPr>
+        <p:grpSpPr>
+          <a:xfrm>
+            <a:off x="-3486" y="4807155"/>
+            <a:ext cx="2353145" cy="1529727"/>
+            <a:chOff x="921013" y="3005762"/>
+            <a:chExt cx="2353145" cy="1529727"/>
+          </a:xfrm>
+        </p:grpSpPr>
         <p:sp>
           <p:nvSpPr>
-            <p:cNvPr id="35" name="TextBox 34">
+            <p:cNvPr id="72" name="TextBox 71">
               <a:extLst>
                 <a:ext uri="{FF2B5EF4-FFF2-40B4-BE49-F238E27FC236}">
-                  <a16:creationId xmlns:a16="http://schemas.microsoft.com/office/drawing/2014/main" id="{16681CA6-8DF2-437E-BCEC-DC4012CEA449}"/>
+                  <a16:creationId xmlns:a16="http://schemas.microsoft.com/office/drawing/2014/main" id="{A07C89D9-E262-4A8A-9272-889371116074}"/>
                 </a:ext>
               </a:extLst>
             </p:cNvPr>
@@ -4727,8 +5776,146 @@
           </p:nvSpPr>
           <p:spPr>
             <a:xfrm>
-              <a:off x="583994" y="1563018"/>
-              <a:ext cx="3030381" cy="369332"/>
+              <a:off x="921013" y="3889158"/>
+              <a:ext cx="2353145" cy="646331"/>
+            </a:xfrm>
+            <a:prstGeom prst="rect">
+              <a:avLst/>
+            </a:prstGeom>
+            <a:noFill/>
+          </p:spPr>
+          <p:txBody>
+            <a:bodyPr wrap="none" rtlCol="0">
+              <a:spAutoFit/>
+            </a:bodyPr>
+            <a:lstStyle/>
+            <a:p>
+              <a:pPr algn="ctr"/>
+              <a:r>
+                <a:rPr lang="en-US" dirty="0"/>
+                <a:t>Get nearest Bus Depot </a:t>
+              </a:r>
+            </a:p>
+            <a:p>
+              <a:pPr algn="ctr"/>
+              <a:r>
+                <a:rPr lang="en-US" dirty="0"/>
+                <a:t>Web Service (Java)</a:t>
+              </a:r>
+            </a:p>
+          </p:txBody>
+        </p:sp>
+        <p:pic>
+          <p:nvPicPr>
+            <p:cNvPr id="73" name="Graphic 72" descr="Earth Globe Americas">
+              <a:extLst>
+                <a:ext uri="{FF2B5EF4-FFF2-40B4-BE49-F238E27FC236}">
+                  <a16:creationId xmlns:a16="http://schemas.microsoft.com/office/drawing/2014/main" id="{FBF02C0D-873E-4CC8-B378-A2129CEFF338}"/>
+                </a:ext>
+              </a:extLst>
+            </p:cNvPr>
+            <p:cNvPicPr>
+              <a:picLocks noChangeAspect="1"/>
+            </p:cNvPicPr>
+            <p:nvPr/>
+          </p:nvPicPr>
+          <p:blipFill>
+            <a:blip r:embed="rId5">
+              <a:extLst>
+                <a:ext uri="{28A0092B-C50C-407E-A947-70E740481C1C}">
+                  <a14:useLocalDpi xmlns:a14="http://schemas.microsoft.com/office/drawing/2010/main" val="0"/>
+                </a:ext>
+                <a:ext uri="{96DAC541-7B7A-43D3-8B79-37D633B846F1}">
+                  <asvg:svgBlip xmlns:asvg="http://schemas.microsoft.com/office/drawing/2016/SVG/main" r:embed="rId6"/>
+                </a:ext>
+              </a:extLst>
+            </a:blip>
+            <a:stretch>
+              <a:fillRect/>
+            </a:stretch>
+          </p:blipFill>
+          <p:spPr>
+            <a:xfrm>
+              <a:off x="1641987" y="3005762"/>
+              <a:ext cx="914400" cy="914400"/>
+            </a:xfrm>
+            <a:prstGeom prst="rect">
+              <a:avLst/>
+            </a:prstGeom>
+          </p:spPr>
+        </p:pic>
+      </p:grpSp>
+      <p:sp>
+        <p:nvSpPr>
+          <p:cNvPr id="77" name="TextBox 76">
+            <a:extLst>
+              <a:ext uri="{FF2B5EF4-FFF2-40B4-BE49-F238E27FC236}">
+                <a16:creationId xmlns:a16="http://schemas.microsoft.com/office/drawing/2014/main" id="{F218D09A-16CE-4C90-8245-440D8FA85A8E}"/>
+              </a:ext>
+            </a:extLst>
+          </p:cNvPr>
+          <p:cNvSpPr txBox="1"/>
+          <p:nvPr/>
+        </p:nvSpPr>
+        <p:spPr>
+          <a:xfrm>
+            <a:off x="2140685" y="4913268"/>
+            <a:ext cx="684418" cy="369332"/>
+          </a:xfrm>
+          <a:prstGeom prst="rect">
+            <a:avLst/>
+          </a:prstGeom>
+          <a:noFill/>
+        </p:spPr>
+        <p:txBody>
+          <a:bodyPr wrap="none" rtlCol="0">
+            <a:spAutoFit/>
+          </a:bodyPr>
+          <a:lstStyle/>
+          <a:p>
+            <a:r>
+              <a:rPr lang="en-US" b="1" dirty="0"/>
+              <a:t>HTTP</a:t>
+            </a:r>
+          </a:p>
+        </p:txBody>
+      </p:sp>
+      <p:grpSp>
+        <p:nvGrpSpPr>
+          <p:cNvPr id="78" name="Group 77">
+            <a:extLst>
+              <a:ext uri="{FF2B5EF4-FFF2-40B4-BE49-F238E27FC236}">
+                <a16:creationId xmlns:a16="http://schemas.microsoft.com/office/drawing/2014/main" id="{DBACCDC6-70DD-443D-8934-BCEC8CB9F97B}"/>
+              </a:ext>
+            </a:extLst>
+          </p:cNvPr>
+          <p:cNvGrpSpPr/>
+          <p:nvPr/>
+        </p:nvGrpSpPr>
+        <p:grpSpPr>
+          <a:xfrm>
+            <a:off x="5552919" y="5642878"/>
+            <a:ext cx="1361911" cy="1255900"/>
+            <a:chOff x="1418231" y="3005762"/>
+            <a:chExt cx="1361911" cy="1255900"/>
+          </a:xfrm>
+        </p:grpSpPr>
+        <p:sp>
+          <p:nvSpPr>
+            <p:cNvPr id="79" name="TextBox 78">
+              <a:extLst>
+                <a:ext uri="{FF2B5EF4-FFF2-40B4-BE49-F238E27FC236}">
+                  <a16:creationId xmlns:a16="http://schemas.microsoft.com/office/drawing/2014/main" id="{505DFB36-8D90-4C62-A2DA-6218BDB3816F}"/>
+                </a:ext>
+              </a:extLst>
+            </p:cNvPr>
+            <p:cNvSpPr txBox="1"/>
+            <p:nvPr/>
+          </p:nvSpPr>
+          <p:spPr>
+            <a:xfrm>
+              <a:off x="1418231" y="3892330"/>
+              <a:ext cx="1361911" cy="369332"/>
             </a:xfrm>
             <a:prstGeom prst="rect">
               <a:avLst/>
@@ -4743,18 +5930,171 @@
             <a:p>
               <a:r>
                 <a:rPr lang="en-US" dirty="0"/>
-                <a:t>Bus Management System (C#)</a:t>
+                <a:t>Weather API</a:t>
               </a:r>
             </a:p>
           </p:txBody>
         </p:sp>
+        <p:pic>
+          <p:nvPicPr>
+            <p:cNvPr id="80" name="Graphic 79" descr="Earth Globe Americas">
+              <a:extLst>
+                <a:ext uri="{FF2B5EF4-FFF2-40B4-BE49-F238E27FC236}">
+                  <a16:creationId xmlns:a16="http://schemas.microsoft.com/office/drawing/2014/main" id="{62C8E6E7-D278-41BD-9EF6-B2CD08AB7DAF}"/>
+                </a:ext>
+              </a:extLst>
+            </p:cNvPr>
+            <p:cNvPicPr>
+              <a:picLocks noChangeAspect="1"/>
+            </p:cNvPicPr>
+            <p:nvPr/>
+          </p:nvPicPr>
+          <p:blipFill>
+            <a:blip r:embed="rId5">
+              <a:extLst>
+                <a:ext uri="{28A0092B-C50C-407E-A947-70E740481C1C}">
+                  <a14:useLocalDpi xmlns:a14="http://schemas.microsoft.com/office/drawing/2010/main" val="0"/>
+                </a:ext>
+                <a:ext uri="{96DAC541-7B7A-43D3-8B79-37D633B846F1}">
+                  <asvg:svgBlip xmlns:asvg="http://schemas.microsoft.com/office/drawing/2016/SVG/main" r:embed="rId6"/>
+                </a:ext>
+              </a:extLst>
+            </a:blip>
+            <a:stretch>
+              <a:fillRect/>
+            </a:stretch>
+          </p:blipFill>
+          <p:spPr>
+            <a:xfrm>
+              <a:off x="1641987" y="3005762"/>
+              <a:ext cx="914400" cy="914400"/>
+            </a:xfrm>
+            <a:prstGeom prst="rect">
+              <a:avLst/>
+            </a:prstGeom>
+          </p:spPr>
+        </p:pic>
       </p:grpSp>
-      <p:sp>
-        <p:nvSpPr>
-          <p:cNvPr id="38" name="TextBox 37">
-            <a:extLst>
-              <a:ext uri="{FF2B5EF4-FFF2-40B4-BE49-F238E27FC236}">
-                <a16:creationId xmlns:a16="http://schemas.microsoft.com/office/drawing/2014/main" id="{9F22159C-A555-405B-A67C-7CD6F01B6880}"/>
+      <p:cxnSp>
+        <p:nvCxnSpPr>
+          <p:cNvPr id="87" name="Connector: Elbow 86">
+            <a:extLst>
+              <a:ext uri="{FF2B5EF4-FFF2-40B4-BE49-F238E27FC236}">
+                <a16:creationId xmlns:a16="http://schemas.microsoft.com/office/drawing/2014/main" id="{648BE510-1903-48E0-933F-79AAA6F27823}"/>
+              </a:ext>
+            </a:extLst>
+          </p:cNvPr>
+          <p:cNvCxnSpPr>
+            <a:stCxn id="73" idx="3"/>
+          </p:cNvCxnSpPr>
+          <p:nvPr/>
+        </p:nvCxnSpPr>
+        <p:spPr>
+          <a:xfrm flipV="1">
+            <a:off x="1631888" y="4472953"/>
+            <a:ext cx="3490145" cy="791402"/>
+          </a:xfrm>
+          <a:prstGeom prst="bentConnector3">
+            <a:avLst/>
+          </a:prstGeom>
+        </p:spPr>
+        <p:style>
+          <a:lnRef idx="1">
+            <a:schemeClr val="dk1"/>
+          </a:lnRef>
+          <a:fillRef idx="0">
+            <a:schemeClr val="dk1"/>
+          </a:fillRef>
+          <a:effectRef idx="0">
+            <a:schemeClr val="dk1"/>
+          </a:effectRef>
+          <a:fontRef idx="minor">
+            <a:schemeClr val="tx1"/>
+          </a:fontRef>
+        </p:style>
+      </p:cxnSp>
+      <p:cxnSp>
+        <p:nvCxnSpPr>
+          <p:cNvPr id="89" name="Connector: Elbow 88">
+            <a:extLst>
+              <a:ext uri="{FF2B5EF4-FFF2-40B4-BE49-F238E27FC236}">
+                <a16:creationId xmlns:a16="http://schemas.microsoft.com/office/drawing/2014/main" id="{48D3BA84-8653-435F-A70F-350C0BDD17B6}"/>
+              </a:ext>
+            </a:extLst>
+          </p:cNvPr>
+          <p:cNvCxnSpPr>
+            <a:stCxn id="66" idx="3"/>
+          </p:cNvCxnSpPr>
+          <p:nvPr/>
+        </p:nvCxnSpPr>
+        <p:spPr>
+          <a:xfrm flipV="1">
+            <a:off x="3886497" y="4723770"/>
+            <a:ext cx="1235536" cy="1106027"/>
+          </a:xfrm>
+          <a:prstGeom prst="bentConnector3">
+            <a:avLst/>
+          </a:prstGeom>
+        </p:spPr>
+        <p:style>
+          <a:lnRef idx="1">
+            <a:schemeClr val="dk1"/>
+          </a:lnRef>
+          <a:fillRef idx="0">
+            <a:schemeClr val="dk1"/>
+          </a:fillRef>
+          <a:effectRef idx="0">
+            <a:schemeClr val="dk1"/>
+          </a:effectRef>
+          <a:fontRef idx="minor">
+            <a:schemeClr val="tx1"/>
+          </a:fontRef>
+        </p:style>
+      </p:cxnSp>
+      <p:cxnSp>
+        <p:nvCxnSpPr>
+          <p:cNvPr id="91" name="Straight Connector 90">
+            <a:extLst>
+              <a:ext uri="{FF2B5EF4-FFF2-40B4-BE49-F238E27FC236}">
+                <a16:creationId xmlns:a16="http://schemas.microsoft.com/office/drawing/2014/main" id="{B95C97DD-90C8-4885-AB26-8EB6CEA95AFB}"/>
+              </a:ext>
+            </a:extLst>
+          </p:cNvPr>
+          <p:cNvCxnSpPr>
+            <a:stCxn id="80" idx="0"/>
+          </p:cNvCxnSpPr>
+          <p:nvPr/>
+        </p:nvCxnSpPr>
+        <p:spPr>
+          <a:xfrm flipH="1" flipV="1">
+            <a:off x="6233874" y="4999703"/>
+            <a:ext cx="1" cy="643175"/>
+          </a:xfrm>
+          <a:prstGeom prst="line">
+            <a:avLst/>
+          </a:prstGeom>
+        </p:spPr>
+        <p:style>
+          <a:lnRef idx="1">
+            <a:schemeClr val="dk1"/>
+          </a:lnRef>
+          <a:fillRef idx="0">
+            <a:schemeClr val="dk1"/>
+          </a:fillRef>
+          <a:effectRef idx="0">
+            <a:schemeClr val="dk1"/>
+          </a:effectRef>
+          <a:fontRef idx="minor">
+            <a:schemeClr val="tx1"/>
+          </a:fontRef>
+        </p:style>
+      </p:cxnSp>
+      <p:sp>
+        <p:nvSpPr>
+          <p:cNvPr id="92" name="TextBox 91">
+            <a:extLst>
+              <a:ext uri="{FF2B5EF4-FFF2-40B4-BE49-F238E27FC236}">
+                <a16:creationId xmlns:a16="http://schemas.microsoft.com/office/drawing/2014/main" id="{F801533A-EAA5-4273-A826-CB85FF3C711E}"/>
               </a:ext>
             </a:extLst>
           </p:cNvPr>
@@ -4763,8 +6103,8 @@
         </p:nvSpPr>
         <p:spPr>
           <a:xfrm>
-            <a:off x="7378389" y="3186277"/>
-            <a:ext cx="1235403" cy="369332"/>
+            <a:off x="3824961" y="5463545"/>
+            <a:ext cx="684418" cy="369332"/>
           </a:xfrm>
           <a:prstGeom prst="rect">
             <a:avLst/>
@@ -4778,31 +6118,287 @@
           <a:lstStyle/>
           <a:p>
             <a:r>
-              <a:rPr lang="en-US" dirty="0" err="1"/>
-              <a:t>q.deployed</a:t>
-            </a:r>
-            <a:endParaRPr lang="en-US" dirty="0"/>
+              <a:rPr lang="en-US" b="1" dirty="0"/>
+              <a:t>HTTP</a:t>
+            </a:r>
           </a:p>
         </p:txBody>
       </p:sp>
       <p:cxnSp>
         <p:nvCxnSpPr>
-          <p:cNvPr id="40" name="Straight Arrow Connector 39">
-            <a:extLst>
-              <a:ext uri="{FF2B5EF4-FFF2-40B4-BE49-F238E27FC236}">
-                <a16:creationId xmlns:a16="http://schemas.microsoft.com/office/drawing/2014/main" id="{E064A1CD-5840-4F69-9769-812E7B29A5FA}"/>
+          <p:cNvPr id="103" name="Connector: Elbow 102">
+            <a:extLst>
+              <a:ext uri="{FF2B5EF4-FFF2-40B4-BE49-F238E27FC236}">
+                <a16:creationId xmlns:a16="http://schemas.microsoft.com/office/drawing/2014/main" id="{D5F9CB3F-274D-44F6-84C5-D7F9371135A9}"/>
               </a:ext>
             </a:extLst>
           </p:cNvPr>
           <p:cNvCxnSpPr>
-            <a:stCxn id="35" idx="1"/>
+            <a:cxnSpLocks/>
           </p:cNvCxnSpPr>
           <p:nvPr/>
         </p:nvCxnSpPr>
         <p:spPr>
-          <a:xfrm flipH="1">
-            <a:off x="7069962" y="3583550"/>
-            <a:ext cx="1826335" cy="0"/>
+          <a:xfrm rot="10800000">
+            <a:off x="7069964" y="3429006"/>
+            <a:ext cx="3527648" cy="1408184"/>
+          </a:xfrm>
+          <a:prstGeom prst="bentConnector3">
+            <a:avLst>
+              <a:gd name="adj1" fmla="val -1006"/>
+            </a:avLst>
+          </a:prstGeom>
+          <a:ln>
+            <a:tailEnd type="triangle"/>
+          </a:ln>
+        </p:spPr>
+        <p:style>
+          <a:lnRef idx="1">
+            <a:schemeClr val="dk1"/>
+          </a:lnRef>
+          <a:fillRef idx="0">
+            <a:schemeClr val="dk1"/>
+          </a:fillRef>
+          <a:effectRef idx="0">
+            <a:schemeClr val="dk1"/>
+          </a:effectRef>
+          <a:fontRef idx="minor">
+            <a:schemeClr val="tx1"/>
+          </a:fontRef>
+        </p:style>
+      </p:cxnSp>
+      <p:grpSp>
+        <p:nvGrpSpPr>
+          <p:cNvPr id="109" name="Group 108">
+            <a:extLst>
+              <a:ext uri="{FF2B5EF4-FFF2-40B4-BE49-F238E27FC236}">
+                <a16:creationId xmlns:a16="http://schemas.microsoft.com/office/drawing/2014/main" id="{E53E27CB-D984-4DDA-8490-7CA190442A71}"/>
+              </a:ext>
+            </a:extLst>
+          </p:cNvPr>
+          <p:cNvGrpSpPr/>
+          <p:nvPr/>
+        </p:nvGrpSpPr>
+        <p:grpSpPr>
+          <a:xfrm>
+            <a:off x="3394433" y="160305"/>
+            <a:ext cx="1478866" cy="1300533"/>
+            <a:chOff x="4559635" y="-3919"/>
+            <a:chExt cx="1478866" cy="1300533"/>
+          </a:xfrm>
+        </p:grpSpPr>
+        <p:sp>
+          <p:nvSpPr>
+            <p:cNvPr id="25" name="TextBox 24">
+              <a:extLst>
+                <a:ext uri="{FF2B5EF4-FFF2-40B4-BE49-F238E27FC236}">
+                  <a16:creationId xmlns:a16="http://schemas.microsoft.com/office/drawing/2014/main" id="{EC2323EA-C17D-4014-9F01-C357DA3EA42D}"/>
+                </a:ext>
+              </a:extLst>
+            </p:cNvPr>
+            <p:cNvSpPr txBox="1"/>
+            <p:nvPr/>
+          </p:nvSpPr>
+          <p:spPr>
+            <a:xfrm>
+              <a:off x="4559635" y="927282"/>
+              <a:ext cx="1478866" cy="369332"/>
+            </a:xfrm>
+            <a:prstGeom prst="rect">
+              <a:avLst/>
+            </a:prstGeom>
+            <a:noFill/>
+          </p:spPr>
+          <p:txBody>
+            <a:bodyPr wrap="none" rtlCol="0">
+              <a:spAutoFit/>
+            </a:bodyPr>
+            <a:lstStyle/>
+            <a:p>
+              <a:r>
+                <a:rPr lang="en-US" dirty="0"/>
+                <a:t>Twitter Plugin</a:t>
+              </a:r>
+            </a:p>
+          </p:txBody>
+        </p:sp>
+        <p:pic>
+          <p:nvPicPr>
+            <p:cNvPr id="108" name="Picture 107">
+              <a:extLst>
+                <a:ext uri="{FF2B5EF4-FFF2-40B4-BE49-F238E27FC236}">
+                  <a16:creationId xmlns:a16="http://schemas.microsoft.com/office/drawing/2014/main" id="{B40FCADA-E9CD-4504-A885-583C695602E1}"/>
+                </a:ext>
+              </a:extLst>
+            </p:cNvPr>
+            <p:cNvPicPr>
+              <a:picLocks noChangeAspect="1"/>
+            </p:cNvPicPr>
+            <p:nvPr/>
+          </p:nvPicPr>
+          <p:blipFill>
+            <a:blip r:embed="rId7">
+              <a:biLevel thresh="75000"/>
+              <a:extLst>
+                <a:ext uri="{28A0092B-C50C-407E-A947-70E740481C1C}">
+                  <a14:useLocalDpi xmlns:a14="http://schemas.microsoft.com/office/drawing/2010/main" val="0"/>
+                </a:ext>
+              </a:extLst>
+            </a:blip>
+            <a:stretch>
+              <a:fillRect/>
+            </a:stretch>
+          </p:blipFill>
+          <p:spPr>
+            <a:xfrm>
+              <a:off x="4711250" y="-3919"/>
+              <a:ext cx="1164433" cy="1164433"/>
+            </a:xfrm>
+            <a:prstGeom prst="rect">
+              <a:avLst/>
+            </a:prstGeom>
+            <a:noFill/>
+          </p:spPr>
+        </p:pic>
+      </p:grpSp>
+      <p:cxnSp>
+        <p:nvCxnSpPr>
+          <p:cNvPr id="120" name="Connector: Elbow 119">
+            <a:extLst>
+              <a:ext uri="{FF2B5EF4-FFF2-40B4-BE49-F238E27FC236}">
+                <a16:creationId xmlns:a16="http://schemas.microsoft.com/office/drawing/2014/main" id="{0D856BFE-D343-48CF-8F8B-49C0A7EBC53A}"/>
+              </a:ext>
+            </a:extLst>
+          </p:cNvPr>
+          <p:cNvCxnSpPr>
+            <a:cxnSpLocks/>
+            <a:endCxn id="159" idx="2"/>
+          </p:cNvCxnSpPr>
+          <p:nvPr/>
+        </p:nvCxnSpPr>
+        <p:spPr>
+          <a:xfrm flipV="1">
+            <a:off x="7084871" y="1635174"/>
+            <a:ext cx="3401905" cy="1339922"/>
+          </a:xfrm>
+          <a:prstGeom prst="bentConnector2">
+            <a:avLst/>
+          </a:prstGeom>
+          <a:ln>
+            <a:tailEnd type="triangle"/>
+          </a:ln>
+        </p:spPr>
+        <p:style>
+          <a:lnRef idx="1">
+            <a:schemeClr val="dk1"/>
+          </a:lnRef>
+          <a:fillRef idx="0">
+            <a:schemeClr val="dk1"/>
+          </a:fillRef>
+          <a:effectRef idx="0">
+            <a:schemeClr val="dk1"/>
+          </a:effectRef>
+          <a:fontRef idx="minor">
+            <a:schemeClr val="tx1"/>
+          </a:fontRef>
+        </p:style>
+      </p:cxnSp>
+      <p:sp>
+        <p:nvSpPr>
+          <p:cNvPr id="121" name="TextBox 120">
+            <a:extLst>
+              <a:ext uri="{FF2B5EF4-FFF2-40B4-BE49-F238E27FC236}">
+                <a16:creationId xmlns:a16="http://schemas.microsoft.com/office/drawing/2014/main" id="{E5945A79-C75F-4F8B-8CF5-E1637E1D4AFC}"/>
+              </a:ext>
+            </a:extLst>
+          </p:cNvPr>
+          <p:cNvSpPr txBox="1"/>
+          <p:nvPr/>
+        </p:nvSpPr>
+        <p:spPr>
+          <a:xfrm>
+            <a:off x="10525042" y="2294144"/>
+            <a:ext cx="1326004" cy="369332"/>
+          </a:xfrm>
+          <a:prstGeom prst="rect">
+            <a:avLst/>
+          </a:prstGeom>
+          <a:noFill/>
+        </p:spPr>
+        <p:txBody>
+          <a:bodyPr wrap="none" rtlCol="0">
+            <a:spAutoFit/>
+          </a:bodyPr>
+          <a:lstStyle/>
+          <a:p>
+            <a:r>
+              <a:rPr lang="en-US" b="1" dirty="0"/>
+              <a:t>Send Emails</a:t>
+            </a:r>
+          </a:p>
+        </p:txBody>
+      </p:sp>
+      <p:cxnSp>
+        <p:nvCxnSpPr>
+          <p:cNvPr id="130" name="Connector: Elbow 129">
+            <a:extLst>
+              <a:ext uri="{FF2B5EF4-FFF2-40B4-BE49-F238E27FC236}">
+                <a16:creationId xmlns:a16="http://schemas.microsoft.com/office/drawing/2014/main" id="{C4DBE0C7-26A2-40D0-9775-8156C064A289}"/>
+              </a:ext>
+            </a:extLst>
+          </p:cNvPr>
+          <p:cNvCxnSpPr>
+            <a:cxnSpLocks/>
+            <a:stCxn id="4" idx="0"/>
+            <a:endCxn id="25" idx="2"/>
+          </p:cNvCxnSpPr>
+          <p:nvPr/>
+        </p:nvCxnSpPr>
+        <p:spPr>
+          <a:xfrm rot="16200000" flipV="1">
+            <a:off x="4473753" y="1120951"/>
+            <a:ext cx="1282362" cy="1962135"/>
+          </a:xfrm>
+          <a:prstGeom prst="bentConnector3">
+            <a:avLst>
+              <a:gd name="adj1" fmla="val 50000"/>
+            </a:avLst>
+          </a:prstGeom>
+          <a:ln>
+            <a:tailEnd type="triangle"/>
+          </a:ln>
+        </p:spPr>
+        <p:style>
+          <a:lnRef idx="1">
+            <a:schemeClr val="dk1"/>
+          </a:lnRef>
+          <a:fillRef idx="0">
+            <a:schemeClr val="dk1"/>
+          </a:fillRef>
+          <a:effectRef idx="0">
+            <a:schemeClr val="dk1"/>
+          </a:effectRef>
+          <a:fontRef idx="minor">
+            <a:schemeClr val="tx1"/>
+          </a:fontRef>
+        </p:style>
+      </p:cxnSp>
+      <p:cxnSp>
+        <p:nvCxnSpPr>
+          <p:cNvPr id="137" name="Straight Arrow Connector 136">
+            <a:extLst>
+              <a:ext uri="{FF2B5EF4-FFF2-40B4-BE49-F238E27FC236}">
+                <a16:creationId xmlns:a16="http://schemas.microsoft.com/office/drawing/2014/main" id="{F923AC5A-2EE8-4D8E-9C5E-CD21D8F0ED67}"/>
+              </a:ext>
+            </a:extLst>
+          </p:cNvPr>
+          <p:cNvCxnSpPr/>
+          <p:nvPr/>
+        </p:nvCxnSpPr>
+        <p:spPr>
+          <a:xfrm flipV="1">
+            <a:off x="6691075" y="1545225"/>
+            <a:ext cx="0" cy="1197975"/>
           </a:xfrm>
           <a:prstGeom prst="straightConnector1">
             <a:avLst/>
@@ -4826,6 +6422,728 @@
           </a:fontRef>
         </p:style>
       </p:cxnSp>
+      <p:grpSp>
+        <p:nvGrpSpPr>
+          <p:cNvPr id="167" name="Group 166">
+            <a:extLst>
+              <a:ext uri="{FF2B5EF4-FFF2-40B4-BE49-F238E27FC236}">
+                <a16:creationId xmlns:a16="http://schemas.microsoft.com/office/drawing/2014/main" id="{7D01A9FB-DC69-4F3F-8728-49CD073C50C3}"/>
+              </a:ext>
+            </a:extLst>
+          </p:cNvPr>
+          <p:cNvGrpSpPr/>
+          <p:nvPr/>
+        </p:nvGrpSpPr>
+        <p:grpSpPr>
+          <a:xfrm>
+            <a:off x="4342461" y="-4104"/>
+            <a:ext cx="5524038" cy="1595348"/>
+            <a:chOff x="3550053" y="5799"/>
+            <a:chExt cx="5524038" cy="1595348"/>
+          </a:xfrm>
+        </p:grpSpPr>
+        <p:sp>
+          <p:nvSpPr>
+            <p:cNvPr id="140" name="TextBox 139">
+              <a:extLst>
+                <a:ext uri="{FF2B5EF4-FFF2-40B4-BE49-F238E27FC236}">
+                  <a16:creationId xmlns:a16="http://schemas.microsoft.com/office/drawing/2014/main" id="{DDA851CD-7CD0-4EE8-8906-9B27D82E6E44}"/>
+                </a:ext>
+              </a:extLst>
+            </p:cNvPr>
+            <p:cNvSpPr txBox="1"/>
+            <p:nvPr/>
+          </p:nvSpPr>
+          <p:spPr>
+            <a:xfrm>
+              <a:off x="4157731" y="1231815"/>
+              <a:ext cx="3838920" cy="369332"/>
+            </a:xfrm>
+            <a:prstGeom prst="rect">
+              <a:avLst/>
+            </a:prstGeom>
+            <a:noFill/>
+          </p:spPr>
+          <p:txBody>
+            <a:bodyPr wrap="square" rtlCol="0">
+              <a:spAutoFit/>
+            </a:bodyPr>
+            <a:lstStyle/>
+            <a:p>
+              <a:pPr algn="ctr"/>
+              <a:r>
+                <a:rPr lang="en-US" dirty="0"/>
+                <a:t>Train Listeners</a:t>
+              </a:r>
+            </a:p>
+          </p:txBody>
+        </p:sp>
+        <p:grpSp>
+          <p:nvGrpSpPr>
+            <p:cNvPr id="166" name="Group 165">
+              <a:extLst>
+                <a:ext uri="{FF2B5EF4-FFF2-40B4-BE49-F238E27FC236}">
+                  <a16:creationId xmlns:a16="http://schemas.microsoft.com/office/drawing/2014/main" id="{9AB7962C-B204-4435-8C90-DE72C3C47CD5}"/>
+                </a:ext>
+              </a:extLst>
+            </p:cNvPr>
+            <p:cNvGrpSpPr/>
+            <p:nvPr/>
+          </p:nvGrpSpPr>
+          <p:grpSpPr>
+            <a:xfrm>
+              <a:off x="3550053" y="5799"/>
+              <a:ext cx="5524038" cy="1539426"/>
+              <a:chOff x="3550053" y="5799"/>
+              <a:chExt cx="5524038" cy="1539426"/>
+            </a:xfrm>
+          </p:grpSpPr>
+          <p:grpSp>
+            <p:nvGrpSpPr>
+              <p:cNvPr id="165" name="Group 164">
+                <a:extLst>
+                  <a:ext uri="{FF2B5EF4-FFF2-40B4-BE49-F238E27FC236}">
+                    <a16:creationId xmlns:a16="http://schemas.microsoft.com/office/drawing/2014/main" id="{9BD750A5-6995-4144-952B-9D97D5320E64}"/>
+                  </a:ext>
+                </a:extLst>
+              </p:cNvPr>
+              <p:cNvGrpSpPr/>
+              <p:nvPr/>
+            </p:nvGrpSpPr>
+            <p:grpSpPr>
+              <a:xfrm>
+                <a:off x="4176540" y="5799"/>
+                <a:ext cx="3838920" cy="1539426"/>
+                <a:chOff x="4176540" y="5799"/>
+                <a:chExt cx="3838920" cy="1539426"/>
+              </a:xfrm>
+            </p:grpSpPr>
+            <p:sp>
+              <p:nvSpPr>
+                <p:cNvPr id="135" name="Rectangle 134">
+                  <a:extLst>
+                    <a:ext uri="{FF2B5EF4-FFF2-40B4-BE49-F238E27FC236}">
+                      <a16:creationId xmlns:a16="http://schemas.microsoft.com/office/drawing/2014/main" id="{3901C13B-28AB-487B-BDE6-798251662321}"/>
+                    </a:ext>
+                  </a:extLst>
+                </p:cNvPr>
+                <p:cNvSpPr/>
+                <p:nvPr/>
+              </p:nvSpPr>
+              <p:spPr>
+                <a:xfrm>
+                  <a:off x="4461017" y="71371"/>
+                  <a:ext cx="3237293" cy="1473854"/>
+                </a:xfrm>
+                <a:prstGeom prst="rect">
+                  <a:avLst/>
+                </a:prstGeom>
+                <a:noFill/>
+                <a:ln>
+                  <a:solidFill>
+                    <a:schemeClr val="tx1">
+                      <a:lumMod val="95000"/>
+                      <a:lumOff val="5000"/>
+                    </a:schemeClr>
+                  </a:solidFill>
+                </a:ln>
+              </p:spPr>
+              <p:style>
+                <a:lnRef idx="2">
+                  <a:schemeClr val="accent1">
+                    <a:shade val="50000"/>
+                  </a:schemeClr>
+                </a:lnRef>
+                <a:fillRef idx="1">
+                  <a:schemeClr val="accent1"/>
+                </a:fillRef>
+                <a:effectRef idx="0">
+                  <a:schemeClr val="accent1"/>
+                </a:effectRef>
+                <a:fontRef idx="minor">
+                  <a:schemeClr val="lt1"/>
+                </a:fontRef>
+              </p:style>
+              <p:txBody>
+                <a:bodyPr rtlCol="0" anchor="ctr"/>
+                <a:lstStyle/>
+                <a:p>
+                  <a:pPr algn="ctr"/>
+                  <a:endParaRPr lang="en-US"/>
+                </a:p>
+              </p:txBody>
+            </p:sp>
+            <p:sp>
+              <p:nvSpPr>
+                <p:cNvPr id="144" name="Rectangle 143">
+                  <a:extLst>
+                    <a:ext uri="{FF2B5EF4-FFF2-40B4-BE49-F238E27FC236}">
+                      <a16:creationId xmlns:a16="http://schemas.microsoft.com/office/drawing/2014/main" id="{0910863D-B404-4985-88E7-77B051AC0397}"/>
+                    </a:ext>
+                  </a:extLst>
+                </p:cNvPr>
+                <p:cNvSpPr/>
+                <p:nvPr/>
+              </p:nvSpPr>
+              <p:spPr>
+                <a:xfrm>
+                  <a:off x="4504265" y="351821"/>
+                  <a:ext cx="1930497" cy="839346"/>
+                </a:xfrm>
+                <a:prstGeom prst="rect">
+                  <a:avLst/>
+                </a:prstGeom>
+                <a:solidFill>
+                  <a:schemeClr val="accent6">
+                    <a:lumMod val="40000"/>
+                    <a:lumOff val="60000"/>
+                  </a:schemeClr>
+                </a:solidFill>
+                <a:ln>
+                  <a:solidFill>
+                    <a:schemeClr val="tx1">
+                      <a:lumMod val="95000"/>
+                      <a:lumOff val="5000"/>
+                    </a:schemeClr>
+                  </a:solidFill>
+                </a:ln>
+              </p:spPr>
+              <p:style>
+                <a:lnRef idx="2">
+                  <a:schemeClr val="accent1">
+                    <a:shade val="50000"/>
+                  </a:schemeClr>
+                </a:lnRef>
+                <a:fillRef idx="1">
+                  <a:schemeClr val="accent1"/>
+                </a:fillRef>
+                <a:effectRef idx="0">
+                  <a:schemeClr val="accent1"/>
+                </a:effectRef>
+                <a:fontRef idx="minor">
+                  <a:schemeClr val="lt1"/>
+                </a:fontRef>
+              </p:style>
+              <p:txBody>
+                <a:bodyPr rtlCol="0" anchor="ctr"/>
+                <a:lstStyle/>
+                <a:p>
+                  <a:pPr algn="ctr"/>
+                  <a:endParaRPr lang="en-US"/>
+                </a:p>
+              </p:txBody>
+            </p:sp>
+            <p:pic>
+              <p:nvPicPr>
+                <p:cNvPr id="141" name="Graphic 140" descr="Computer">
+                  <a:extLst>
+                    <a:ext uri="{FF2B5EF4-FFF2-40B4-BE49-F238E27FC236}">
+                      <a16:creationId xmlns:a16="http://schemas.microsoft.com/office/drawing/2014/main" id="{7B638115-FD3D-47DC-901D-BBC1725BD9CD}"/>
+                    </a:ext>
+                  </a:extLst>
+                </p:cNvPr>
+                <p:cNvPicPr>
+                  <a:picLocks noChangeAspect="1"/>
+                </p:cNvPicPr>
+                <p:nvPr/>
+              </p:nvPicPr>
+              <p:blipFill>
+                <a:blip r:embed="rId3">
+                  <a:extLst>
+                    <a:ext uri="{28A0092B-C50C-407E-A947-70E740481C1C}">
+                      <a14:useLocalDpi xmlns:a14="http://schemas.microsoft.com/office/drawing/2010/main" val="0"/>
+                    </a:ext>
+                    <a:ext uri="{96DAC541-7B7A-43D3-8B79-37D633B846F1}">
+                      <asvg:svgBlip xmlns:asvg="http://schemas.microsoft.com/office/drawing/2016/SVG/main" r:embed="rId4"/>
+                    </a:ext>
+                  </a:extLst>
+                </a:blip>
+                <a:stretch>
+                  <a:fillRect/>
+                </a:stretch>
+              </p:blipFill>
+              <p:spPr>
+                <a:xfrm>
+                  <a:off x="4669259" y="410773"/>
+                  <a:ext cx="721594" cy="721594"/>
+                </a:xfrm>
+                <a:prstGeom prst="rect">
+                  <a:avLst/>
+                </a:prstGeom>
+              </p:spPr>
+            </p:pic>
+            <p:sp>
+              <p:nvSpPr>
+                <p:cNvPr id="146" name="Rectangle 145">
+                  <a:extLst>
+                    <a:ext uri="{FF2B5EF4-FFF2-40B4-BE49-F238E27FC236}">
+                      <a16:creationId xmlns:a16="http://schemas.microsoft.com/office/drawing/2014/main" id="{415C9760-A181-480A-8FA5-CDAF4A3698A1}"/>
+                    </a:ext>
+                  </a:extLst>
+                </p:cNvPr>
+                <p:cNvSpPr/>
+                <p:nvPr/>
+              </p:nvSpPr>
+              <p:spPr>
+                <a:xfrm>
+                  <a:off x="6605150" y="305327"/>
+                  <a:ext cx="1013009" cy="874658"/>
+                </a:xfrm>
+                <a:prstGeom prst="rect">
+                  <a:avLst/>
+                </a:prstGeom>
+                <a:solidFill>
+                  <a:schemeClr val="accent2">
+                    <a:lumMod val="20000"/>
+                    <a:lumOff val="80000"/>
+                  </a:schemeClr>
+                </a:solidFill>
+                <a:ln>
+                  <a:solidFill>
+                    <a:schemeClr val="tx1">
+                      <a:lumMod val="95000"/>
+                      <a:lumOff val="5000"/>
+                    </a:schemeClr>
+                  </a:solidFill>
+                </a:ln>
+              </p:spPr>
+              <p:style>
+                <a:lnRef idx="2">
+                  <a:schemeClr val="accent1">
+                    <a:shade val="50000"/>
+                  </a:schemeClr>
+                </a:lnRef>
+                <a:fillRef idx="1">
+                  <a:schemeClr val="accent1"/>
+                </a:fillRef>
+                <a:effectRef idx="0">
+                  <a:schemeClr val="accent1"/>
+                </a:effectRef>
+                <a:fontRef idx="minor">
+                  <a:schemeClr val="lt1"/>
+                </a:fontRef>
+              </p:style>
+              <p:txBody>
+                <a:bodyPr rtlCol="0" anchor="ctr"/>
+                <a:lstStyle/>
+                <a:p>
+                  <a:pPr algn="ctr"/>
+                  <a:endParaRPr lang="en-US"/>
+                </a:p>
+              </p:txBody>
+            </p:sp>
+            <p:pic>
+              <p:nvPicPr>
+                <p:cNvPr id="142" name="Graphic 141" descr="Computer">
+                  <a:extLst>
+                    <a:ext uri="{FF2B5EF4-FFF2-40B4-BE49-F238E27FC236}">
+                      <a16:creationId xmlns:a16="http://schemas.microsoft.com/office/drawing/2014/main" id="{154890D9-FA8B-4916-9468-233B7F1C35BD}"/>
+                    </a:ext>
+                  </a:extLst>
+                </p:cNvPr>
+                <p:cNvPicPr>
+                  <a:picLocks noChangeAspect="1"/>
+                </p:cNvPicPr>
+                <p:nvPr/>
+              </p:nvPicPr>
+              <p:blipFill>
+                <a:blip r:embed="rId3">
+                  <a:extLst>
+                    <a:ext uri="{28A0092B-C50C-407E-A947-70E740481C1C}">
+                      <a14:useLocalDpi xmlns:a14="http://schemas.microsoft.com/office/drawing/2010/main" val="0"/>
+                    </a:ext>
+                    <a:ext uri="{96DAC541-7B7A-43D3-8B79-37D633B846F1}">
+                      <asvg:svgBlip xmlns:asvg="http://schemas.microsoft.com/office/drawing/2016/SVG/main" r:embed="rId4"/>
+                    </a:ext>
+                  </a:extLst>
+                </a:blip>
+                <a:stretch>
+                  <a:fillRect/>
+                </a:stretch>
+              </p:blipFill>
+              <p:spPr>
+                <a:xfrm>
+                  <a:off x="5552010" y="406799"/>
+                  <a:ext cx="721594" cy="721594"/>
+                </a:xfrm>
+                <a:prstGeom prst="rect">
+                  <a:avLst/>
+                </a:prstGeom>
+              </p:spPr>
+            </p:pic>
+            <p:pic>
+              <p:nvPicPr>
+                <p:cNvPr id="143" name="Graphic 142" descr="Computer">
+                  <a:extLst>
+                    <a:ext uri="{FF2B5EF4-FFF2-40B4-BE49-F238E27FC236}">
+                      <a16:creationId xmlns:a16="http://schemas.microsoft.com/office/drawing/2014/main" id="{D63EC113-6D28-42AF-A9CB-E3D674FC1D68}"/>
+                    </a:ext>
+                  </a:extLst>
+                </p:cNvPr>
+                <p:cNvPicPr>
+                  <a:picLocks noChangeAspect="1"/>
+                </p:cNvPicPr>
+                <p:nvPr/>
+              </p:nvPicPr>
+              <p:blipFill>
+                <a:blip r:embed="rId3">
+                  <a:extLst>
+                    <a:ext uri="{28A0092B-C50C-407E-A947-70E740481C1C}">
+                      <a14:useLocalDpi xmlns:a14="http://schemas.microsoft.com/office/drawing/2010/main" val="0"/>
+                    </a:ext>
+                    <a:ext uri="{96DAC541-7B7A-43D3-8B79-37D633B846F1}">
+                      <asvg:svgBlip xmlns:asvg="http://schemas.microsoft.com/office/drawing/2016/SVG/main" r:embed="rId4"/>
+                    </a:ext>
+                  </a:extLst>
+                </a:blip>
+                <a:stretch>
+                  <a:fillRect/>
+                </a:stretch>
+              </p:blipFill>
+              <p:spPr>
+                <a:xfrm>
+                  <a:off x="6793834" y="453293"/>
+                  <a:ext cx="721594" cy="721594"/>
+                </a:xfrm>
+                <a:prstGeom prst="rect">
+                  <a:avLst/>
+                </a:prstGeom>
+              </p:spPr>
+            </p:pic>
+            <p:sp>
+              <p:nvSpPr>
+                <p:cNvPr id="148" name="TextBox 147">
+                  <a:extLst>
+                    <a:ext uri="{FF2B5EF4-FFF2-40B4-BE49-F238E27FC236}">
+                      <a16:creationId xmlns:a16="http://schemas.microsoft.com/office/drawing/2014/main" id="{CCD4D169-0F64-42FC-961F-84D2AD996A12}"/>
+                    </a:ext>
+                  </a:extLst>
+                </p:cNvPr>
+                <p:cNvSpPr txBox="1"/>
+                <p:nvPr/>
+              </p:nvSpPr>
+              <p:spPr>
+                <a:xfrm>
+                  <a:off x="4176540" y="5799"/>
+                  <a:ext cx="3838920" cy="369332"/>
+                </a:xfrm>
+                <a:prstGeom prst="rect">
+                  <a:avLst/>
+                </a:prstGeom>
+                <a:noFill/>
+              </p:spPr>
+              <p:txBody>
+                <a:bodyPr wrap="square" rtlCol="0">
+                  <a:spAutoFit/>
+                </a:bodyPr>
+                <a:lstStyle/>
+                <a:p>
+                  <a:pPr algn="ctr"/>
+                  <a:r>
+                    <a:rPr lang="en-US" dirty="0" err="1"/>
+                    <a:t>t.weather</a:t>
+                  </a:r>
+                  <a:endParaRPr lang="en-US" dirty="0"/>
+                </a:p>
+              </p:txBody>
+            </p:sp>
+          </p:grpSp>
+          <p:sp>
+            <p:nvSpPr>
+              <p:cNvPr id="145" name="TextBox 144">
+                <a:extLst>
+                  <a:ext uri="{FF2B5EF4-FFF2-40B4-BE49-F238E27FC236}">
+                    <a16:creationId xmlns:a16="http://schemas.microsoft.com/office/drawing/2014/main" id="{452BC86D-7124-4910-B386-387E8A853F5B}"/>
+                  </a:ext>
+                </a:extLst>
+              </p:cNvPr>
+              <p:cNvSpPr txBox="1"/>
+              <p:nvPr/>
+            </p:nvSpPr>
+            <p:spPr>
+              <a:xfrm>
+                <a:off x="3550053" y="299329"/>
+                <a:ext cx="3838920" cy="307777"/>
+              </a:xfrm>
+              <a:prstGeom prst="rect">
+                <a:avLst/>
+              </a:prstGeom>
+              <a:noFill/>
+            </p:spPr>
+            <p:txBody>
+              <a:bodyPr wrap="square" rtlCol="0">
+                <a:spAutoFit/>
+              </a:bodyPr>
+              <a:lstStyle/>
+              <a:p>
+                <a:pPr algn="ctr"/>
+                <a:r>
+                  <a:rPr lang="en-US" sz="1400" dirty="0" err="1"/>
+                  <a:t>t.ew.listener</a:t>
+                </a:r>
+                <a:endParaRPr lang="en-US" sz="1400" dirty="0"/>
+              </a:p>
+            </p:txBody>
+          </p:sp>
+          <p:sp>
+            <p:nvSpPr>
+              <p:cNvPr id="147" name="TextBox 146">
+                <a:extLst>
+                  <a:ext uri="{FF2B5EF4-FFF2-40B4-BE49-F238E27FC236}">
+                    <a16:creationId xmlns:a16="http://schemas.microsoft.com/office/drawing/2014/main" id="{57592175-5584-4596-8F43-35BBEA6DCF28}"/>
+                  </a:ext>
+                </a:extLst>
+              </p:cNvPr>
+              <p:cNvSpPr txBox="1"/>
+              <p:nvPr/>
+            </p:nvSpPr>
+            <p:spPr>
+              <a:xfrm>
+                <a:off x="5235171" y="281348"/>
+                <a:ext cx="3838920" cy="307777"/>
+              </a:xfrm>
+              <a:prstGeom prst="rect">
+                <a:avLst/>
+              </a:prstGeom>
+              <a:noFill/>
+            </p:spPr>
+            <p:txBody>
+              <a:bodyPr wrap="square" rtlCol="0">
+                <a:spAutoFit/>
+              </a:bodyPr>
+              <a:lstStyle/>
+              <a:p>
+                <a:pPr algn="ctr"/>
+                <a:r>
+                  <a:rPr lang="en-US" sz="1400" dirty="0" err="1"/>
+                  <a:t>t.ns.listener</a:t>
+                </a:r>
+                <a:endParaRPr lang="en-US" sz="1400" dirty="0"/>
+              </a:p>
+            </p:txBody>
+          </p:sp>
+        </p:grpSp>
+      </p:grpSp>
+      <p:sp>
+        <p:nvSpPr>
+          <p:cNvPr id="149" name="TextBox 148">
+            <a:extLst>
+              <a:ext uri="{FF2B5EF4-FFF2-40B4-BE49-F238E27FC236}">
+                <a16:creationId xmlns:a16="http://schemas.microsoft.com/office/drawing/2014/main" id="{0253AB35-29F0-465C-B472-8980F74A41D8}"/>
+              </a:ext>
+            </a:extLst>
+          </p:cNvPr>
+          <p:cNvSpPr txBox="1"/>
+          <p:nvPr/>
+        </p:nvSpPr>
+        <p:spPr>
+          <a:xfrm>
+            <a:off x="6692433" y="1871896"/>
+            <a:ext cx="2141355" cy="646331"/>
+          </a:xfrm>
+          <a:prstGeom prst="rect">
+            <a:avLst/>
+          </a:prstGeom>
+          <a:noFill/>
+        </p:spPr>
+        <p:txBody>
+          <a:bodyPr wrap="none" rtlCol="0">
+            <a:spAutoFit/>
+          </a:bodyPr>
+          <a:lstStyle/>
+          <a:p>
+            <a:r>
+              <a:rPr lang="en-US" b="1" dirty="0" err="1"/>
+              <a:t>t.weather</a:t>
+            </a:r>
+            <a:endParaRPr lang="en-US" b="1" dirty="0"/>
+          </a:p>
+          <a:p>
+            <a:r>
+              <a:rPr lang="en-US" b="1" dirty="0"/>
+              <a:t>t.&lt;dynamic&gt;.listener</a:t>
+            </a:r>
+          </a:p>
+        </p:txBody>
+      </p:sp>
+      <p:pic>
+        <p:nvPicPr>
+          <p:cNvPr id="159" name="Picture 158">
+            <a:extLst>
+              <a:ext uri="{FF2B5EF4-FFF2-40B4-BE49-F238E27FC236}">
+                <a16:creationId xmlns:a16="http://schemas.microsoft.com/office/drawing/2014/main" id="{D3AB49D7-F2FF-4493-92BE-B7E3286D6497}"/>
+              </a:ext>
+            </a:extLst>
+          </p:cNvPr>
+          <p:cNvPicPr>
+            <a:picLocks noChangeAspect="1"/>
+          </p:cNvPicPr>
+          <p:nvPr/>
+        </p:nvPicPr>
+        <p:blipFill>
+          <a:blip r:embed="rId8"/>
+          <a:stretch>
+            <a:fillRect/>
+          </a:stretch>
+        </p:blipFill>
+        <p:spPr>
+          <a:xfrm>
+            <a:off x="8884513" y="99364"/>
+            <a:ext cx="3204526" cy="1535810"/>
+          </a:xfrm>
+          <a:prstGeom prst="rect">
+            <a:avLst/>
+          </a:prstGeom>
+        </p:spPr>
+      </p:pic>
+      <p:pic>
+        <p:nvPicPr>
+          <p:cNvPr id="177" name="Graphic 176" descr="List">
+            <a:extLst>
+              <a:ext uri="{FF2B5EF4-FFF2-40B4-BE49-F238E27FC236}">
+                <a16:creationId xmlns:a16="http://schemas.microsoft.com/office/drawing/2014/main" id="{62589CED-89D1-4477-9144-E7EFBBC41553}"/>
+              </a:ext>
+            </a:extLst>
+          </p:cNvPr>
+          <p:cNvPicPr>
+            <a:picLocks noChangeAspect="1"/>
+          </p:cNvPicPr>
+          <p:nvPr/>
+        </p:nvPicPr>
+        <p:blipFill>
+          <a:blip r:embed="rId9">
+            <a:extLst>
+              <a:ext uri="{28A0092B-C50C-407E-A947-70E740481C1C}">
+                <a14:useLocalDpi xmlns:a14="http://schemas.microsoft.com/office/drawing/2010/main" val="0"/>
+              </a:ext>
+              <a:ext uri="{96DAC541-7B7A-43D3-8B79-37D633B846F1}">
+                <asvg:svgBlip xmlns:asvg="http://schemas.microsoft.com/office/drawing/2016/SVG/main" r:embed="rId10"/>
+              </a:ext>
+            </a:extLst>
+          </a:blip>
+          <a:stretch>
+            <a:fillRect/>
+          </a:stretch>
+        </p:blipFill>
+        <p:spPr>
+          <a:xfrm>
+            <a:off x="3106787" y="2007030"/>
+            <a:ext cx="610642" cy="610642"/>
+          </a:xfrm>
+          <a:prstGeom prst="rect">
+            <a:avLst/>
+          </a:prstGeom>
+        </p:spPr>
+      </p:pic>
+      <p:sp>
+        <p:nvSpPr>
+          <p:cNvPr id="178" name="TextBox 177">
+            <a:extLst>
+              <a:ext uri="{FF2B5EF4-FFF2-40B4-BE49-F238E27FC236}">
+                <a16:creationId xmlns:a16="http://schemas.microsoft.com/office/drawing/2014/main" id="{A9EA4FF5-80BF-4869-8E68-0C744456C5C5}"/>
+              </a:ext>
+            </a:extLst>
+          </p:cNvPr>
+          <p:cNvSpPr txBox="1"/>
+          <p:nvPr/>
+        </p:nvSpPr>
+        <p:spPr>
+          <a:xfrm>
+            <a:off x="1691824" y="2613478"/>
+            <a:ext cx="3365280" cy="338554"/>
+          </a:xfrm>
+          <a:prstGeom prst="rect">
+            <a:avLst/>
+          </a:prstGeom>
+          <a:noFill/>
+        </p:spPr>
+        <p:txBody>
+          <a:bodyPr wrap="none" rtlCol="0">
+            <a:spAutoFit/>
+          </a:bodyPr>
+          <a:lstStyle/>
+          <a:p>
+            <a:r>
+              <a:rPr lang="en-US" sz="1600" dirty="0"/>
+              <a:t>breakdown.xml (new_breakdown.xsd)</a:t>
+            </a:r>
+          </a:p>
+        </p:txBody>
+      </p:sp>
+      <p:pic>
+        <p:nvPicPr>
+          <p:cNvPr id="179" name="Graphic 178" descr="List">
+            <a:extLst>
+              <a:ext uri="{FF2B5EF4-FFF2-40B4-BE49-F238E27FC236}">
+                <a16:creationId xmlns:a16="http://schemas.microsoft.com/office/drawing/2014/main" id="{4EE9417E-8AEB-4FB4-985B-D563F9D513C4}"/>
+              </a:ext>
+            </a:extLst>
+          </p:cNvPr>
+          <p:cNvPicPr>
+            <a:picLocks noChangeAspect="1"/>
+          </p:cNvPicPr>
+          <p:nvPr/>
+        </p:nvPicPr>
+        <p:blipFill>
+          <a:blip r:embed="rId9">
+            <a:extLst>
+              <a:ext uri="{28A0092B-C50C-407E-A947-70E740481C1C}">
+                <a14:useLocalDpi xmlns:a14="http://schemas.microsoft.com/office/drawing/2010/main" val="0"/>
+              </a:ext>
+              <a:ext uri="{96DAC541-7B7A-43D3-8B79-37D633B846F1}">
+                <asvg:svgBlip xmlns:asvg="http://schemas.microsoft.com/office/drawing/2016/SVG/main" r:embed="rId10"/>
+              </a:ext>
+            </a:extLst>
+          </a:blip>
+          <a:stretch>
+            <a:fillRect/>
+          </a:stretch>
+        </p:blipFill>
+        <p:spPr>
+          <a:xfrm>
+            <a:off x="8385351" y="3450596"/>
+            <a:ext cx="610642" cy="610642"/>
+          </a:xfrm>
+          <a:prstGeom prst="rect">
+            <a:avLst/>
+          </a:prstGeom>
+        </p:spPr>
+      </p:pic>
+      <p:sp>
+        <p:nvSpPr>
+          <p:cNvPr id="180" name="TextBox 179">
+            <a:extLst>
+              <a:ext uri="{FF2B5EF4-FFF2-40B4-BE49-F238E27FC236}">
+                <a16:creationId xmlns:a16="http://schemas.microsoft.com/office/drawing/2014/main" id="{EF23C709-46B4-4FC1-A6B8-F1DB1BFD08FF}"/>
+              </a:ext>
+            </a:extLst>
+          </p:cNvPr>
+          <p:cNvSpPr txBox="1"/>
+          <p:nvPr/>
+        </p:nvSpPr>
+        <p:spPr>
+          <a:xfrm>
+            <a:off x="7121496" y="3941688"/>
+            <a:ext cx="3431132" cy="338554"/>
+          </a:xfrm>
+          <a:prstGeom prst="rect">
+            <a:avLst/>
+          </a:prstGeom>
+          <a:noFill/>
+        </p:spPr>
+        <p:txBody>
+          <a:bodyPr wrap="none" rtlCol="0">
+            <a:spAutoFit/>
+          </a:bodyPr>
+          <a:lstStyle/>
+          <a:p>
+            <a:r>
+              <a:rPr lang="en-US" sz="1600" dirty="0"/>
+              <a:t>busRequest.xml (new_busRequest.xsd)</a:t>
+            </a:r>
+          </a:p>
+        </p:txBody>
+      </p:sp>
     </p:spTree>
     <p:extLst>
       <p:ext uri="{BB962C8B-B14F-4D97-AF65-F5344CB8AC3E}">
@@ -5132,4 +7450,299 @@
     </a:ext>
   </a:extLst>
 </a:theme>
+</file>
+
+<file path=ppt/theme/theme2.xml><?xml version="1.0" encoding="utf-8"?>
+<a:theme xmlns:a="http://schemas.openxmlformats.org/drawingml/2006/main" name="Office Theme">
+  <a:themeElements>
+    <a:clrScheme name="Office">
+      <a:dk1>
+        <a:sysClr val="windowText" lastClr="000000"/>
+      </a:dk1>
+      <a:lt1>
+        <a:sysClr val="window" lastClr="FFFFFF"/>
+      </a:lt1>
+      <a:dk2>
+        <a:srgbClr val="44546A"/>
+      </a:dk2>
+      <a:lt2>
+        <a:srgbClr val="E7E6E6"/>
+      </a:lt2>
+      <a:accent1>
+        <a:srgbClr val="4472C4"/>
+      </a:accent1>
+      <a:accent2>
+        <a:srgbClr val="ED7D31"/>
+      </a:accent2>
+      <a:accent3>
+        <a:srgbClr val="A5A5A5"/>
+      </a:accent3>
+      <a:accent4>
+        <a:srgbClr val="FFC000"/>
+      </a:accent4>
+      <a:accent5>
+        <a:srgbClr val="5B9BD5"/>
+      </a:accent5>
+      <a:accent6>
+        <a:srgbClr val="70AD47"/>
+      </a:accent6>
+      <a:hlink>
+        <a:srgbClr val="0563C1"/>
+      </a:hlink>
+      <a:folHlink>
+        <a:srgbClr val="954F72"/>
+      </a:folHlink>
+    </a:clrScheme>
+    <a:fontScheme name="Office">
+      <a:majorFont>
+        <a:latin typeface="Calibri Light" panose="020F0302020204030204"/>
+        <a:ea typeface=""/>
+        <a:cs typeface=""/>
+        <a:font script="Jpan" typeface="游ゴシック Light"/>
+        <a:font script="Hang" typeface="맑은 고딕"/>
+        <a:font script="Hans" typeface="等线 Light"/>
+        <a:font script="Hant" typeface="新細明體"/>
+        <a:font script="Arab" typeface="Times New Roman"/>
+        <a:font script="Hebr" typeface="Times New Roman"/>
+        <a:font script="Thai" typeface="Angsana New"/>
+        <a:font script="Ethi" typeface="Nyala"/>
+        <a:font script="Beng" typeface="Vrinda"/>
+        <a:font script="Gujr" typeface="Shruti"/>
+        <a:font script="Khmr" typeface="MoolBoran"/>
+        <a:font script="Knda" typeface="Tunga"/>
+        <a:font script="Guru" typeface="Raavi"/>
+        <a:font script="Cans" typeface="Euphemia"/>
+        <a:font script="Cher" typeface="Plantagenet Cherokee"/>
+        <a:font script="Yiii" typeface="Microsoft Yi Baiti"/>
+        <a:font script="Tibt" typeface="Microsoft Himalaya"/>
+        <a:font script="Thaa" typeface="MV Boli"/>
+        <a:font script="Deva" typeface="Mangal"/>
+        <a:font script="Telu" typeface="Gautami"/>
+        <a:font script="Taml" typeface="Latha"/>
+        <a:font script="Syrc" typeface="Estrangelo Edessa"/>
+        <a:font script="Orya" typeface="Kalinga"/>
+        <a:font script="Mlym" typeface="Kartika"/>
+        <a:font script="Laoo" typeface="DokChampa"/>
+        <a:font script="Sinh" typeface="Iskoola Pota"/>
+        <a:font script="Mong" typeface="Mongolian Baiti"/>
+        <a:font script="Viet" typeface="Times New Roman"/>
+        <a:font script="Uigh" typeface="Microsoft Uighur"/>
+        <a:font script="Geor" typeface="Sylfaen"/>
+        <a:font script="Armn" typeface="Arial"/>
+        <a:font script="Bugi" typeface="Leelawadee UI"/>
+        <a:font script="Bopo" typeface="Microsoft JhengHei"/>
+        <a:font script="Java" typeface="Javanese Text"/>
+        <a:font script="Lisu" typeface="Segoe UI"/>
+        <a:font script="Mymr" typeface="Myanmar Text"/>
+        <a:font script="Nkoo" typeface="Ebrima"/>
+        <a:font script="Olck" typeface="Nirmala UI"/>
+        <a:font script="Osma" typeface="Ebrima"/>
+        <a:font script="Phag" typeface="Phagspa"/>
+        <a:font script="Syrn" typeface="Estrangelo Edessa"/>
+        <a:font script="Syrj" typeface="Estrangelo Edessa"/>
+        <a:font script="Syre" typeface="Estrangelo Edessa"/>
+        <a:font script="Sora" typeface="Nirmala UI"/>
+        <a:font script="Tale" typeface="Microsoft Tai Le"/>
+        <a:font script="Talu" typeface="Microsoft New Tai Lue"/>
+        <a:font script="Tfng" typeface="Ebrima"/>
+      </a:majorFont>
+      <a:minorFont>
+        <a:latin typeface="Calibri" panose="020F0502020204030204"/>
+        <a:ea typeface=""/>
+        <a:cs typeface=""/>
+        <a:font script="Jpan" typeface="游ゴシック"/>
+        <a:font script="Hang" typeface="맑은 고딕"/>
+        <a:font script="Hans" typeface="等线"/>
+        <a:font script="Hant" typeface="新細明體"/>
+        <a:font script="Arab" typeface="Arial"/>
+        <a:font script="Hebr" typeface="Arial"/>
+        <a:font script="Thai" typeface="Cordia New"/>
+        <a:font script="Ethi" typeface="Nyala"/>
+        <a:font script="Beng" typeface="Vrinda"/>
+        <a:font script="Gujr" typeface="Shruti"/>
+        <a:font script="Khmr" typeface="DaunPenh"/>
+        <a:font script="Knda" typeface="Tunga"/>
+        <a:font script="Guru" typeface="Raavi"/>
+        <a:font script="Cans" typeface="Euphemia"/>
+        <a:font script="Cher" typeface="Plantagenet Cherokee"/>
+        <a:font script="Yiii" typeface="Microsoft Yi Baiti"/>
+        <a:font script="Tibt" typeface="Microsoft Himalaya"/>
+        <a:font script="Thaa" typeface="MV Boli"/>
+        <a:font script="Deva" typeface="Mangal"/>
+        <a:font script="Telu" typeface="Gautami"/>
+        <a:font script="Taml" typeface="Latha"/>
+        <a:font script="Syrc" typeface="Estrangelo Edessa"/>
+        <a:font script="Orya" typeface="Kalinga"/>
+        <a:font script="Mlym" typeface="Kartika"/>
+        <a:font script="Laoo" typeface="DokChampa"/>
+        <a:font script="Sinh" typeface="Iskoola Pota"/>
+        <a:font script="Mong" typeface="Mongolian Baiti"/>
+        <a:font script="Viet" typeface="Arial"/>
+        <a:font script="Uigh" typeface="Microsoft Uighur"/>
+        <a:font script="Geor" typeface="Sylfaen"/>
+        <a:font script="Armn" typeface="Arial"/>
+        <a:font script="Bugi" typeface="Leelawadee UI"/>
+        <a:font script="Bopo" typeface="Microsoft JhengHei"/>
+        <a:font script="Java" typeface="Javanese Text"/>
+        <a:font script="Lisu" typeface="Segoe UI"/>
+        <a:font script="Mymr" typeface="Myanmar Text"/>
+        <a:font script="Nkoo" typeface="Ebrima"/>
+        <a:font script="Olck" typeface="Nirmala UI"/>
+        <a:font script="Osma" typeface="Ebrima"/>
+        <a:font script="Phag" typeface="Phagspa"/>
+        <a:font script="Syrn" typeface="Estrangelo Edessa"/>
+        <a:font script="Syrj" typeface="Estrangelo Edessa"/>
+        <a:font script="Syre" typeface="Estrangelo Edessa"/>
+        <a:font script="Sora" typeface="Nirmala UI"/>
+        <a:font script="Tale" typeface="Microsoft Tai Le"/>
+        <a:font script="Talu" typeface="Microsoft New Tai Lue"/>
+        <a:font script="Tfng" typeface="Ebrima"/>
+      </a:minorFont>
+    </a:fontScheme>
+    <a:fmtScheme name="Office">
+      <a:fillStyleLst>
+        <a:solidFill>
+          <a:schemeClr val="phClr"/>
+        </a:solidFill>
+        <a:gradFill rotWithShape="1">
+          <a:gsLst>
+            <a:gs pos="0">
+              <a:schemeClr val="phClr">
+                <a:lumMod val="110000"/>
+                <a:satMod val="105000"/>
+                <a:tint val="67000"/>
+              </a:schemeClr>
+            </a:gs>
+            <a:gs pos="50000">
+              <a:schemeClr val="phClr">
+                <a:lumMod val="105000"/>
+                <a:satMod val="103000"/>
+                <a:tint val="73000"/>
+              </a:schemeClr>
+            </a:gs>
+            <a:gs pos="100000">
+              <a:schemeClr val="phClr">
+                <a:lumMod val="105000"/>
+                <a:satMod val="109000"/>
+                <a:tint val="81000"/>
+              </a:schemeClr>
+            </a:gs>
+          </a:gsLst>
+          <a:lin ang="5400000" scaled="0"/>
+        </a:gradFill>
+        <a:gradFill rotWithShape="1">
+          <a:gsLst>
+            <a:gs pos="0">
+              <a:schemeClr val="phClr">
+                <a:satMod val="103000"/>
+                <a:lumMod val="102000"/>
+                <a:tint val="94000"/>
+              </a:schemeClr>
+            </a:gs>
+            <a:gs pos="50000">
+              <a:schemeClr val="phClr">
+                <a:satMod val="110000"/>
+                <a:lumMod val="100000"/>
+                <a:shade val="100000"/>
+              </a:schemeClr>
+            </a:gs>
+            <a:gs pos="100000">
+              <a:schemeClr val="phClr">
+                <a:lumMod val="99000"/>
+                <a:satMod val="120000"/>
+                <a:shade val="78000"/>
+              </a:schemeClr>
+            </a:gs>
+          </a:gsLst>
+          <a:lin ang="5400000" scaled="0"/>
+        </a:gradFill>
+      </a:fillStyleLst>
+      <a:lnStyleLst>
+        <a:ln w="6350" cap="flat" cmpd="sng" algn="ctr">
+          <a:solidFill>
+            <a:schemeClr val="phClr"/>
+          </a:solidFill>
+          <a:prstDash val="solid"/>
+          <a:miter lim="800000"/>
+        </a:ln>
+        <a:ln w="12700" cap="flat" cmpd="sng" algn="ctr">
+          <a:solidFill>
+            <a:schemeClr val="phClr"/>
+          </a:solidFill>
+          <a:prstDash val="solid"/>
+          <a:miter lim="800000"/>
+        </a:ln>
+        <a:ln w="19050" cap="flat" cmpd="sng" algn="ctr">
+          <a:solidFill>
+            <a:schemeClr val="phClr"/>
+          </a:solidFill>
+          <a:prstDash val="solid"/>
+          <a:miter lim="800000"/>
+        </a:ln>
+      </a:lnStyleLst>
+      <a:effectStyleLst>
+        <a:effectStyle>
+          <a:effectLst/>
+        </a:effectStyle>
+        <a:effectStyle>
+          <a:effectLst/>
+        </a:effectStyle>
+        <a:effectStyle>
+          <a:effectLst>
+            <a:outerShdw blurRad="57150" dist="19050" dir="5400000" algn="ctr" rotWithShape="0">
+              <a:srgbClr val="000000">
+                <a:alpha val="63000"/>
+              </a:srgbClr>
+            </a:outerShdw>
+          </a:effectLst>
+        </a:effectStyle>
+      </a:effectStyleLst>
+      <a:bgFillStyleLst>
+        <a:solidFill>
+          <a:schemeClr val="phClr"/>
+        </a:solidFill>
+        <a:solidFill>
+          <a:schemeClr val="phClr">
+            <a:tint val="95000"/>
+            <a:satMod val="170000"/>
+          </a:schemeClr>
+        </a:solidFill>
+        <a:gradFill rotWithShape="1">
+          <a:gsLst>
+            <a:gs pos="0">
+              <a:schemeClr val="phClr">
+                <a:tint val="93000"/>
+                <a:satMod val="150000"/>
+                <a:shade val="98000"/>
+                <a:lumMod val="102000"/>
+              </a:schemeClr>
+            </a:gs>
+            <a:gs pos="50000">
+              <a:schemeClr val="phClr">
+                <a:tint val="98000"/>
+                <a:satMod val="130000"/>
+                <a:shade val="90000"/>
+                <a:lumMod val="103000"/>
+              </a:schemeClr>
+            </a:gs>
+            <a:gs pos="100000">
+              <a:schemeClr val="phClr">
+                <a:shade val="63000"/>
+                <a:satMod val="120000"/>
+              </a:schemeClr>
+            </a:gs>
+          </a:gsLst>
+          <a:lin ang="5400000" scaled="0"/>
+        </a:gradFill>
+      </a:bgFillStyleLst>
+    </a:fmtScheme>
+  </a:themeElements>
+  <a:objectDefaults/>
+  <a:extraClrSchemeLst/>
+  <a:extLst>
+    <a:ext uri="{05A4C25C-085E-4340-85A3-A5531E510DB2}">
+      <thm15:themeFamily xmlns:thm15="http://schemas.microsoft.com/office/thememl/2012/main" name="Office Theme" id="{62F939B6-93AF-4DB8-9C6B-D6C7DFDC589F}" vid="{4A3C46E8-61CC-4603-A589-7422A47A8E4A}"/>
+    </a:ext>
+  </a:extLst>
+</a:theme>
 </file>
</xml_diff>

<commit_message>
Updated Technical Diagrams , Created a TrainAsyncMsgConsumer
~ Edited Technical Diagram to add in logos of technology used
+ New Java file for TrainAsyncMsgProducer mainly use for the individualTrainSystem
</commit_message>
<xml_diff>
--- a/EI Diagrams2.pptx
+++ b/EI Diagrams2.pptx
@@ -116,6 +116,491 @@
 </p:presentation>
 </file>
 
+<file path=ppt/changesInfos/changesInfo1.xml><?xml version="1.0" encoding="utf-8"?>
+<pc:chgInfo xmlns:a="http://schemas.openxmlformats.org/drawingml/2006/main" xmlns:r="http://schemas.openxmlformats.org/officeDocument/2006/relationships" xmlns:ac="http://schemas.microsoft.com/office/drawing/2013/main/command" xmlns:pc="http://schemas.microsoft.com/office/powerpoint/2013/main/command">
+  <pc:docChgLst>
+    <pc:chgData name="Eugene CHOY Wen Jia" userId="f0093c6c-aad3-47c8-981f-e49faae5c851" providerId="ADAL" clId="{3552CE5B-0803-49BD-A011-F4C75B92F40C}"/>
+    <pc:docChg chg="undo custSel modSld">
+      <pc:chgData name="Eugene CHOY Wen Jia" userId="f0093c6c-aad3-47c8-981f-e49faae5c851" providerId="ADAL" clId="{3552CE5B-0803-49BD-A011-F4C75B92F40C}" dt="2018-03-20T07:13:31.677" v="321" actId="1076"/>
+      <pc:docMkLst>
+        <pc:docMk/>
+      </pc:docMkLst>
+      <pc:sldChg chg="addSp delSp modSp">
+        <pc:chgData name="Eugene CHOY Wen Jia" userId="f0093c6c-aad3-47c8-981f-e49faae5c851" providerId="ADAL" clId="{3552CE5B-0803-49BD-A011-F4C75B92F40C}" dt="2018-03-20T07:13:31.677" v="321" actId="1076"/>
+        <pc:sldMkLst>
+          <pc:docMk/>
+          <pc:sldMk cId="576619051" sldId="257"/>
+        </pc:sldMkLst>
+        <pc:spChg chg="mod">
+          <ac:chgData name="Eugene CHOY Wen Jia" userId="f0093c6c-aad3-47c8-981f-e49faae5c851" providerId="ADAL" clId="{3552CE5B-0803-49BD-A011-F4C75B92F40C}" dt="2018-03-20T07:12:59.050" v="316" actId="20577"/>
+          <ac:spMkLst>
+            <pc:docMk/>
+            <pc:sldMk cId="576619051" sldId="257"/>
+            <ac:spMk id="4" creationId="{B7FE81CF-4DDC-4B5E-8304-6A1BFD48C76B}"/>
+          </ac:spMkLst>
+        </pc:spChg>
+        <pc:spChg chg="mod topLvl">
+          <ac:chgData name="Eugene CHOY Wen Jia" userId="f0093c6c-aad3-47c8-981f-e49faae5c851" providerId="ADAL" clId="{3552CE5B-0803-49BD-A011-F4C75B92F40C}" dt="2018-03-20T06:57:27.080" v="95" actId="404"/>
+          <ac:spMkLst>
+            <pc:docMk/>
+            <pc:sldMk cId="576619051" sldId="257"/>
+            <ac:spMk id="7" creationId="{1F77A314-7F07-43ED-9FB3-650E3013A58B}"/>
+          </ac:spMkLst>
+        </pc:spChg>
+        <pc:spChg chg="mod">
+          <ac:chgData name="Eugene CHOY Wen Jia" userId="f0093c6c-aad3-47c8-981f-e49faae5c851" providerId="ADAL" clId="{3552CE5B-0803-49BD-A011-F4C75B92F40C}" dt="2018-03-20T07:00:48.997" v="153" actId="1076"/>
+          <ac:spMkLst>
+            <pc:docMk/>
+            <pc:sldMk cId="576619051" sldId="257"/>
+            <ac:spMk id="10" creationId="{9800C6B1-C350-4C6A-92E3-AAD83D06D33A}"/>
+          </ac:spMkLst>
+        </pc:spChg>
+        <pc:spChg chg="add del">
+          <ac:chgData name="Eugene CHOY Wen Jia" userId="f0093c6c-aad3-47c8-981f-e49faae5c851" providerId="ADAL" clId="{3552CE5B-0803-49BD-A011-F4C75B92F40C}" dt="2018-03-20T06:56:16.917" v="86" actId="478"/>
+          <ac:spMkLst>
+            <pc:docMk/>
+            <pc:sldMk cId="576619051" sldId="257"/>
+            <ac:spMk id="13" creationId="{7F03AE14-00C5-48A3-A3FD-38F601FC4616}"/>
+          </ac:spMkLst>
+        </pc:spChg>
+        <pc:spChg chg="mod">
+          <ac:chgData name="Eugene CHOY Wen Jia" userId="f0093c6c-aad3-47c8-981f-e49faae5c851" providerId="ADAL" clId="{3552CE5B-0803-49BD-A011-F4C75B92F40C}" dt="2018-03-20T07:01:20.141" v="160" actId="1076"/>
+          <ac:spMkLst>
+            <pc:docMk/>
+            <pc:sldMk cId="576619051" sldId="257"/>
+            <ac:spMk id="23" creationId="{CBD54833-AD6B-4E26-BD20-A0B9FCE70EDA}"/>
+          </ac:spMkLst>
+        </pc:spChg>
+        <pc:spChg chg="mod">
+          <ac:chgData name="Eugene CHOY Wen Jia" userId="f0093c6c-aad3-47c8-981f-e49faae5c851" providerId="ADAL" clId="{3552CE5B-0803-49BD-A011-F4C75B92F40C}" dt="2018-03-20T06:58:04.347" v="108" actId="404"/>
+          <ac:spMkLst>
+            <pc:docMk/>
+            <pc:sldMk cId="576619051" sldId="257"/>
+            <ac:spMk id="25" creationId="{EC2323EA-C17D-4014-9F01-C357DA3EA42D}"/>
+          </ac:spMkLst>
+        </pc:spChg>
+        <pc:spChg chg="mod">
+          <ac:chgData name="Eugene CHOY Wen Jia" userId="f0093c6c-aad3-47c8-981f-e49faae5c851" providerId="ADAL" clId="{3552CE5B-0803-49BD-A011-F4C75B92F40C}" dt="2018-03-20T06:59:43.066" v="133" actId="1076"/>
+          <ac:spMkLst>
+            <pc:docMk/>
+            <pc:sldMk cId="576619051" sldId="257"/>
+            <ac:spMk id="29" creationId="{882E8340-A17A-416C-B177-62F27DC00613}"/>
+          </ac:spMkLst>
+        </pc:spChg>
+        <pc:spChg chg="mod">
+          <ac:chgData name="Eugene CHOY Wen Jia" userId="f0093c6c-aad3-47c8-981f-e49faae5c851" providerId="ADAL" clId="{3552CE5B-0803-49BD-A011-F4C75B92F40C}" dt="2018-03-20T07:03:20.259" v="211" actId="1076"/>
+          <ac:spMkLst>
+            <pc:docMk/>
+            <pc:sldMk cId="576619051" sldId="257"/>
+            <ac:spMk id="42" creationId="{5EFE54E3-B97B-46C7-92AF-B57445685AEF}"/>
+          </ac:spMkLst>
+        </pc:spChg>
+        <pc:spChg chg="mod">
+          <ac:chgData name="Eugene CHOY Wen Jia" userId="f0093c6c-aad3-47c8-981f-e49faae5c851" providerId="ADAL" clId="{3552CE5B-0803-49BD-A011-F4C75B92F40C}" dt="2018-03-20T07:13:31.677" v="321" actId="1076"/>
+          <ac:spMkLst>
+            <pc:docMk/>
+            <pc:sldMk cId="576619051" sldId="257"/>
+            <ac:spMk id="51" creationId="{F1069B8D-71A9-4E35-A146-1936AECD6276}"/>
+          </ac:spMkLst>
+        </pc:spChg>
+        <pc:spChg chg="mod">
+          <ac:chgData name="Eugene CHOY Wen Jia" userId="f0093c6c-aad3-47c8-981f-e49faae5c851" providerId="ADAL" clId="{3552CE5B-0803-49BD-A011-F4C75B92F40C}" dt="2018-03-20T07:01:25.125" v="161" actId="404"/>
+          <ac:spMkLst>
+            <pc:docMk/>
+            <pc:sldMk cId="576619051" sldId="257"/>
+            <ac:spMk id="58" creationId="{D2D6274C-B8EC-49A7-92EF-BF33EE663F29}"/>
+          </ac:spMkLst>
+        </pc:spChg>
+        <pc:spChg chg="mod">
+          <ac:chgData name="Eugene CHOY Wen Jia" userId="f0093c6c-aad3-47c8-981f-e49faae5c851" providerId="ADAL" clId="{3552CE5B-0803-49BD-A011-F4C75B92F40C}" dt="2018-03-20T07:09:42.037" v="300" actId="1076"/>
+          <ac:spMkLst>
+            <pc:docMk/>
+            <pc:sldMk cId="576619051" sldId="257"/>
+            <ac:spMk id="63" creationId="{6C2417B4-8A3B-459B-90E3-E45536848137}"/>
+          </ac:spMkLst>
+        </pc:spChg>
+        <pc:spChg chg="mod">
+          <ac:chgData name="Eugene CHOY Wen Jia" userId="f0093c6c-aad3-47c8-981f-e49faae5c851" providerId="ADAL" clId="{3552CE5B-0803-49BD-A011-F4C75B92F40C}" dt="2018-03-20T07:06:36.435" v="254" actId="404"/>
+          <ac:spMkLst>
+            <pc:docMk/>
+            <pc:sldMk cId="576619051" sldId="257"/>
+            <ac:spMk id="65" creationId="{8B3E46FF-3599-4502-857A-A9F7DAD6DB2D}"/>
+          </ac:spMkLst>
+        </pc:spChg>
+        <pc:spChg chg="mod">
+          <ac:chgData name="Eugene CHOY Wen Jia" userId="f0093c6c-aad3-47c8-981f-e49faae5c851" providerId="ADAL" clId="{3552CE5B-0803-49BD-A011-F4C75B92F40C}" dt="2018-03-20T07:01:54.815" v="169" actId="404"/>
+          <ac:spMkLst>
+            <pc:docMk/>
+            <pc:sldMk cId="576619051" sldId="257"/>
+            <ac:spMk id="69" creationId="{87FD0C4E-3A59-4EA3-99BD-D7E601D7FAAA}"/>
+          </ac:spMkLst>
+        </pc:spChg>
+        <pc:spChg chg="mod">
+          <ac:chgData name="Eugene CHOY Wen Jia" userId="f0093c6c-aad3-47c8-981f-e49faae5c851" providerId="ADAL" clId="{3552CE5B-0803-49BD-A011-F4C75B92F40C}" dt="2018-03-20T07:07:24.719" v="272" actId="1076"/>
+          <ac:spMkLst>
+            <pc:docMk/>
+            <pc:sldMk cId="576619051" sldId="257"/>
+            <ac:spMk id="72" creationId="{A07C89D9-E262-4A8A-9272-889371116074}"/>
+          </ac:spMkLst>
+        </pc:spChg>
+        <pc:spChg chg="mod">
+          <ac:chgData name="Eugene CHOY Wen Jia" userId="f0093c6c-aad3-47c8-981f-e49faae5c851" providerId="ADAL" clId="{3552CE5B-0803-49BD-A011-F4C75B92F40C}" dt="2018-03-20T07:09:50.590" v="303" actId="1076"/>
+          <ac:spMkLst>
+            <pc:docMk/>
+            <pc:sldMk cId="576619051" sldId="257"/>
+            <ac:spMk id="77" creationId="{F218D09A-16CE-4C90-8245-440D8FA85A8E}"/>
+          </ac:spMkLst>
+        </pc:spChg>
+        <pc:spChg chg="mod">
+          <ac:chgData name="Eugene CHOY Wen Jia" userId="f0093c6c-aad3-47c8-981f-e49faae5c851" providerId="ADAL" clId="{3552CE5B-0803-49BD-A011-F4C75B92F40C}" dt="2018-03-20T07:02:15.879" v="195" actId="20577"/>
+          <ac:spMkLst>
+            <pc:docMk/>
+            <pc:sldMk cId="576619051" sldId="257"/>
+            <ac:spMk id="79" creationId="{505DFB36-8D90-4C62-A2DA-6218BDB3816F}"/>
+          </ac:spMkLst>
+        </pc:spChg>
+        <pc:spChg chg="mod">
+          <ac:chgData name="Eugene CHOY Wen Jia" userId="f0093c6c-aad3-47c8-981f-e49faae5c851" providerId="ADAL" clId="{3552CE5B-0803-49BD-A011-F4C75B92F40C}" dt="2018-03-20T07:10:15.782" v="308" actId="1076"/>
+          <ac:spMkLst>
+            <pc:docMk/>
+            <pc:sldMk cId="576619051" sldId="257"/>
+            <ac:spMk id="92" creationId="{F801533A-EAA5-4273-A826-CB85FF3C711E}"/>
+          </ac:spMkLst>
+        </pc:spChg>
+        <pc:spChg chg="mod">
+          <ac:chgData name="Eugene CHOY Wen Jia" userId="f0093c6c-aad3-47c8-981f-e49faae5c851" providerId="ADAL" clId="{3552CE5B-0803-49BD-A011-F4C75B92F40C}" dt="2018-03-20T07:00:21.731" v="146" actId="1076"/>
+          <ac:spMkLst>
+            <pc:docMk/>
+            <pc:sldMk cId="576619051" sldId="257"/>
+            <ac:spMk id="121" creationId="{E5945A79-C75F-4F8B-8CF5-E1637E1D4AFC}"/>
+          </ac:spMkLst>
+        </pc:spChg>
+        <pc:spChg chg="mod">
+          <ac:chgData name="Eugene CHOY Wen Jia" userId="f0093c6c-aad3-47c8-981f-e49faae5c851" providerId="ADAL" clId="{3552CE5B-0803-49BD-A011-F4C75B92F40C}" dt="2018-03-20T06:59:52.280" v="136" actId="14100"/>
+          <ac:spMkLst>
+            <pc:docMk/>
+            <pc:sldMk cId="576619051" sldId="257"/>
+            <ac:spMk id="135" creationId="{3901C13B-28AB-487B-BDE6-798251662321}"/>
+          </ac:spMkLst>
+        </pc:spChg>
+        <pc:spChg chg="mod">
+          <ac:chgData name="Eugene CHOY Wen Jia" userId="f0093c6c-aad3-47c8-981f-e49faae5c851" providerId="ADAL" clId="{3552CE5B-0803-49BD-A011-F4C75B92F40C}" dt="2018-03-20T07:00:06.688" v="144" actId="1037"/>
+          <ac:spMkLst>
+            <pc:docMk/>
+            <pc:sldMk cId="576619051" sldId="257"/>
+            <ac:spMk id="147" creationId="{57592175-5584-4596-8F43-35BBEA6DCF28}"/>
+          </ac:spMkLst>
+        </pc:spChg>
+        <pc:spChg chg="mod">
+          <ac:chgData name="Eugene CHOY Wen Jia" userId="f0093c6c-aad3-47c8-981f-e49faae5c851" providerId="ADAL" clId="{3552CE5B-0803-49BD-A011-F4C75B92F40C}" dt="2018-03-20T07:08:34.025" v="288" actId="404"/>
+          <ac:spMkLst>
+            <pc:docMk/>
+            <pc:sldMk cId="576619051" sldId="257"/>
+            <ac:spMk id="149" creationId="{0253AB35-29F0-465C-B472-8980F74A41D8}"/>
+          </ac:spMkLst>
+        </pc:spChg>
+        <pc:spChg chg="mod">
+          <ac:chgData name="Eugene CHOY Wen Jia" userId="f0093c6c-aad3-47c8-981f-e49faae5c851" providerId="ADAL" clId="{3552CE5B-0803-49BD-A011-F4C75B92F40C}" dt="2018-03-20T07:01:03.891" v="156" actId="1076"/>
+          <ac:spMkLst>
+            <pc:docMk/>
+            <pc:sldMk cId="576619051" sldId="257"/>
+            <ac:spMk id="178" creationId="{A9EA4FF5-80BF-4869-8E68-0C744456C5C5}"/>
+          </ac:spMkLst>
+        </pc:spChg>
+        <pc:spChg chg="mod">
+          <ac:chgData name="Eugene CHOY Wen Jia" userId="f0093c6c-aad3-47c8-981f-e49faae5c851" providerId="ADAL" clId="{3552CE5B-0803-49BD-A011-F4C75B92F40C}" dt="2018-03-20T07:13:23.414" v="319" actId="1076"/>
+          <ac:spMkLst>
+            <pc:docMk/>
+            <pc:sldMk cId="576619051" sldId="257"/>
+            <ac:spMk id="180" creationId="{EF23C709-46B4-4FC1-A6B8-F1DB1BFD08FF}"/>
+          </ac:spMkLst>
+        </pc:spChg>
+        <pc:grpChg chg="del">
+          <ac:chgData name="Eugene CHOY Wen Jia" userId="f0093c6c-aad3-47c8-981f-e49faae5c851" providerId="ADAL" clId="{3552CE5B-0803-49BD-A011-F4C75B92F40C}" dt="2018-03-20T06:57:11.068" v="89" actId="165"/>
+          <ac:grpSpMkLst>
+            <pc:docMk/>
+            <pc:sldMk cId="576619051" sldId="257"/>
+            <ac:grpSpMk id="5" creationId="{F341EEF3-6254-4563-AF2D-D550F762C806}"/>
+          </ac:grpSpMkLst>
+        </pc:grpChg>
+        <pc:grpChg chg="add mod">
+          <ac:chgData name="Eugene CHOY Wen Jia" userId="f0093c6c-aad3-47c8-981f-e49faae5c851" providerId="ADAL" clId="{3552CE5B-0803-49BD-A011-F4C75B92F40C}" dt="2018-03-20T06:57:20.072" v="93" actId="164"/>
+          <ac:grpSpMkLst>
+            <pc:docMk/>
+            <pc:sldMk cId="576619051" sldId="257"/>
+            <ac:grpSpMk id="17" creationId="{8808C0F9-46C2-40F8-9F98-076B86331510}"/>
+          </ac:grpSpMkLst>
+        </pc:grpChg>
+        <pc:grpChg chg="add mod">
+          <ac:chgData name="Eugene CHOY Wen Jia" userId="f0093c6c-aad3-47c8-981f-e49faae5c851" providerId="ADAL" clId="{3552CE5B-0803-49BD-A011-F4C75B92F40C}" dt="2018-03-20T06:57:31.778" v="97" actId="14100"/>
+          <ac:grpSpMkLst>
+            <pc:docMk/>
+            <pc:sldMk cId="576619051" sldId="257"/>
+            <ac:grpSpMk id="19" creationId="{0178F462-CA38-4F38-9809-B45A2C3C17C6}"/>
+          </ac:grpSpMkLst>
+        </pc:grpChg>
+        <pc:grpChg chg="mod">
+          <ac:chgData name="Eugene CHOY Wen Jia" userId="f0093c6c-aad3-47c8-981f-e49faae5c851" providerId="ADAL" clId="{3552CE5B-0803-49BD-A011-F4C75B92F40C}" dt="2018-03-20T07:09:38.128" v="299" actId="1076"/>
+          <ac:grpSpMkLst>
+            <pc:docMk/>
+            <pc:sldMk cId="576619051" sldId="257"/>
+            <ac:grpSpMk id="56" creationId="{7976C5A8-5D8B-4FD0-93EF-0F0696FB09CF}"/>
+          </ac:grpSpMkLst>
+        </pc:grpChg>
+        <pc:grpChg chg="mod">
+          <ac:chgData name="Eugene CHOY Wen Jia" userId="f0093c6c-aad3-47c8-981f-e49faae5c851" providerId="ADAL" clId="{3552CE5B-0803-49BD-A011-F4C75B92F40C}" dt="2018-03-20T07:09:59.824" v="305" actId="164"/>
+          <ac:grpSpMkLst>
+            <pc:docMk/>
+            <pc:sldMk cId="576619051" sldId="257"/>
+            <ac:grpSpMk id="64" creationId="{2267A04F-96F7-49C0-B8A3-5DC1B3F707BB}"/>
+          </ac:grpSpMkLst>
+        </pc:grpChg>
+        <pc:grpChg chg="add mod">
+          <ac:chgData name="Eugene CHOY Wen Jia" userId="f0093c6c-aad3-47c8-981f-e49faae5c851" providerId="ADAL" clId="{3552CE5B-0803-49BD-A011-F4C75B92F40C}" dt="2018-03-20T07:09:45.416" v="301" actId="1076"/>
+          <ac:grpSpMkLst>
+            <pc:docMk/>
+            <pc:sldMk cId="576619051" sldId="257"/>
+            <ac:grpSpMk id="68" creationId="{2ED2848E-3EEE-4C32-AAB3-285C6C487E43}"/>
+          </ac:grpSpMkLst>
+        </pc:grpChg>
+        <pc:grpChg chg="mod">
+          <ac:chgData name="Eugene CHOY Wen Jia" userId="f0093c6c-aad3-47c8-981f-e49faae5c851" providerId="ADAL" clId="{3552CE5B-0803-49BD-A011-F4C75B92F40C}" dt="2018-03-20T07:06:27.175" v="251" actId="164"/>
+          <ac:grpSpMkLst>
+            <pc:docMk/>
+            <pc:sldMk cId="576619051" sldId="257"/>
+            <ac:grpSpMk id="71" creationId="{3FC55428-A528-4B9F-8C06-57C2E45E2767}"/>
+          </ac:grpSpMkLst>
+        </pc:grpChg>
+        <pc:grpChg chg="mod">
+          <ac:chgData name="Eugene CHOY Wen Jia" userId="f0093c6c-aad3-47c8-981f-e49faae5c851" providerId="ADAL" clId="{3552CE5B-0803-49BD-A011-F4C75B92F40C}" dt="2018-03-20T05:32:20.770" v="36" actId="1076"/>
+          <ac:grpSpMkLst>
+            <pc:docMk/>
+            <pc:sldMk cId="576619051" sldId="257"/>
+            <ac:grpSpMk id="78" creationId="{DBACCDC6-70DD-443D-8934-BCEC8CB9F97B}"/>
+          </ac:grpSpMkLst>
+        </pc:grpChg>
+        <pc:grpChg chg="add mod">
+          <ac:chgData name="Eugene CHOY Wen Jia" userId="f0093c6c-aad3-47c8-981f-e49faae5c851" providerId="ADAL" clId="{3552CE5B-0803-49BD-A011-F4C75B92F40C}" dt="2018-03-20T07:10:03.936" v="306" actId="1076"/>
+          <ac:grpSpMkLst>
+            <pc:docMk/>
+            <pc:sldMk cId="576619051" sldId="257"/>
+            <ac:grpSpMk id="88" creationId="{EF65BAA1-BAB8-4F7B-BA7D-9EE30D8D0E2D}"/>
+          </ac:grpSpMkLst>
+        </pc:grpChg>
+        <pc:grpChg chg="mod">
+          <ac:chgData name="Eugene CHOY Wen Jia" userId="f0093c6c-aad3-47c8-981f-e49faae5c851" providerId="ADAL" clId="{3552CE5B-0803-49BD-A011-F4C75B92F40C}" dt="2018-03-20T06:58:32.846" v="113" actId="1076"/>
+          <ac:grpSpMkLst>
+            <pc:docMk/>
+            <pc:sldMk cId="576619051" sldId="257"/>
+            <ac:grpSpMk id="109" creationId="{E53E27CB-D984-4DDA-8490-7CA190442A71}"/>
+          </ac:grpSpMkLst>
+        </pc:grpChg>
+        <pc:grpChg chg="mod">
+          <ac:chgData name="Eugene CHOY Wen Jia" userId="f0093c6c-aad3-47c8-981f-e49faae5c851" providerId="ADAL" clId="{3552CE5B-0803-49BD-A011-F4C75B92F40C}" dt="2018-03-20T07:03:04.601" v="206" actId="1076"/>
+          <ac:grpSpMkLst>
+            <pc:docMk/>
+            <pc:sldMk cId="576619051" sldId="257"/>
+            <ac:grpSpMk id="126" creationId="{BA06E3DD-A2B7-49C6-84FA-B1068E51BEAC}"/>
+          </ac:grpSpMkLst>
+        </pc:grpChg>
+        <pc:grpChg chg="mod">
+          <ac:chgData name="Eugene CHOY Wen Jia" userId="f0093c6c-aad3-47c8-981f-e49faae5c851" providerId="ADAL" clId="{3552CE5B-0803-49BD-A011-F4C75B92F40C}" dt="2018-03-20T06:59:47.846" v="135" actId="1076"/>
+          <ac:grpSpMkLst>
+            <pc:docMk/>
+            <pc:sldMk cId="576619051" sldId="257"/>
+            <ac:grpSpMk id="167" creationId="{7D01A9FB-DC69-4F3F-8728-49CD073C50C3}"/>
+          </ac:grpSpMkLst>
+        </pc:grpChg>
+        <pc:picChg chg="add del">
+          <ac:chgData name="Eugene CHOY Wen Jia" userId="f0093c6c-aad3-47c8-981f-e49faae5c851" providerId="ADAL" clId="{3552CE5B-0803-49BD-A011-F4C75B92F40C}" dt="2018-03-20T05:33:42.943" v="53"/>
+          <ac:picMkLst>
+            <pc:docMk/>
+            <pc:sldMk cId="576619051" sldId="257"/>
+            <ac:picMk id="2" creationId="{E696F1B7-6AA0-45DC-B4C4-5BF95C95C0F8}"/>
+          </ac:picMkLst>
+        </pc:picChg>
+        <pc:picChg chg="mod topLvl">
+          <ac:chgData name="Eugene CHOY Wen Jia" userId="f0093c6c-aad3-47c8-981f-e49faae5c851" providerId="ADAL" clId="{3552CE5B-0803-49BD-A011-F4C75B92F40C}" dt="2018-03-20T06:57:13.595" v="90" actId="164"/>
+          <ac:picMkLst>
+            <pc:docMk/>
+            <pc:sldMk cId="576619051" sldId="257"/>
+            <ac:picMk id="6" creationId="{6853ACC9-E91F-474F-A9EB-35A697F18027}"/>
+          </ac:picMkLst>
+        </pc:picChg>
+        <pc:picChg chg="add del mod">
+          <ac:chgData name="Eugene CHOY Wen Jia" userId="f0093c6c-aad3-47c8-981f-e49faae5c851" providerId="ADAL" clId="{3552CE5B-0803-49BD-A011-F4C75B92F40C}" dt="2018-03-20T05:35:16.127" v="55" actId="478"/>
+          <ac:picMkLst>
+            <pc:docMk/>
+            <pc:sldMk cId="576619051" sldId="257"/>
+            <ac:picMk id="8" creationId="{D639B0EE-9C95-463E-83EE-4C86C8166CB8}"/>
+          </ac:picMkLst>
+        </pc:picChg>
+        <pc:picChg chg="add del mod">
+          <ac:chgData name="Eugene CHOY Wen Jia" userId="f0093c6c-aad3-47c8-981f-e49faae5c851" providerId="ADAL" clId="{3552CE5B-0803-49BD-A011-F4C75B92F40C}" dt="2018-03-20T06:55:06.040" v="61" actId="478"/>
+          <ac:picMkLst>
+            <pc:docMk/>
+            <pc:sldMk cId="576619051" sldId="257"/>
+            <ac:picMk id="12" creationId="{0C75F74A-C53E-4119-BF0B-438A2BFCA58C}"/>
+          </ac:picMkLst>
+        </pc:picChg>
+        <pc:picChg chg="add mod">
+          <ac:chgData name="Eugene CHOY Wen Jia" userId="f0093c6c-aad3-47c8-981f-e49faae5c851" providerId="ADAL" clId="{3552CE5B-0803-49BD-A011-F4C75B92F40C}" dt="2018-03-20T06:57:13.595" v="90" actId="164"/>
+          <ac:picMkLst>
+            <pc:docMk/>
+            <pc:sldMk cId="576619051" sldId="257"/>
+            <ac:picMk id="15" creationId="{E7CC8C3B-F989-4E63-AD36-1A2FF00F5FC6}"/>
+          </ac:picMkLst>
+        </pc:picChg>
+        <pc:picChg chg="add mod">
+          <ac:chgData name="Eugene CHOY Wen Jia" userId="f0093c6c-aad3-47c8-981f-e49faae5c851" providerId="ADAL" clId="{3552CE5B-0803-49BD-A011-F4C75B92F40C}" dt="2018-03-20T07:02:49.037" v="199" actId="1076"/>
+          <ac:picMkLst>
+            <pc:docMk/>
+            <pc:sldMk cId="576619051" sldId="257"/>
+            <ac:picMk id="40" creationId="{03FCBB63-BDD0-446C-B047-E83EFCDC97A8}"/>
+          </ac:picMkLst>
+        </pc:picChg>
+        <pc:picChg chg="add mod">
+          <ac:chgData name="Eugene CHOY Wen Jia" userId="f0093c6c-aad3-47c8-981f-e49faae5c851" providerId="ADAL" clId="{3552CE5B-0803-49BD-A011-F4C75B92F40C}" dt="2018-03-20T07:04:12.992" v="216" actId="1076"/>
+          <ac:picMkLst>
+            <pc:docMk/>
+            <pc:sldMk cId="576619051" sldId="257"/>
+            <ac:picMk id="48" creationId="{566D78A6-50D9-4728-AAB1-95A89AC335C5}"/>
+          </ac:picMkLst>
+        </pc:picChg>
+        <pc:picChg chg="add mod">
+          <ac:chgData name="Eugene CHOY Wen Jia" userId="f0093c6c-aad3-47c8-981f-e49faae5c851" providerId="ADAL" clId="{3552CE5B-0803-49BD-A011-F4C75B92F40C}" dt="2018-03-20T07:05:19.035" v="234" actId="1076"/>
+          <ac:picMkLst>
+            <pc:docMk/>
+            <pc:sldMk cId="576619051" sldId="257"/>
+            <ac:picMk id="52" creationId="{8F8FF822-BDE7-413D-B733-84070E8C3D28}"/>
+          </ac:picMkLst>
+        </pc:picChg>
+        <pc:picChg chg="mod">
+          <ac:chgData name="Eugene CHOY Wen Jia" userId="f0093c6c-aad3-47c8-981f-e49faae5c851" providerId="ADAL" clId="{3552CE5B-0803-49BD-A011-F4C75B92F40C}" dt="2018-03-20T07:01:33.800" v="165" actId="1076"/>
+          <ac:picMkLst>
+            <pc:docMk/>
+            <pc:sldMk cId="576619051" sldId="257"/>
+            <ac:picMk id="57" creationId="{B490D1D9-8703-44A1-B47A-9132FBD36A85}"/>
+          </ac:picMkLst>
+        </pc:picChg>
+        <pc:picChg chg="mod">
+          <ac:chgData name="Eugene CHOY Wen Jia" userId="f0093c6c-aad3-47c8-981f-e49faae5c851" providerId="ADAL" clId="{3552CE5B-0803-49BD-A011-F4C75B92F40C}" dt="2018-03-20T07:05:46.160" v="243" actId="1076"/>
+          <ac:picMkLst>
+            <pc:docMk/>
+            <pc:sldMk cId="576619051" sldId="257"/>
+            <ac:picMk id="66" creationId="{7AFFB57A-AA42-4242-B9BC-4BA274D128DA}"/>
+          </ac:picMkLst>
+        </pc:picChg>
+        <pc:picChg chg="mod">
+          <ac:chgData name="Eugene CHOY Wen Jia" userId="f0093c6c-aad3-47c8-981f-e49faae5c851" providerId="ADAL" clId="{3552CE5B-0803-49BD-A011-F4C75B92F40C}" dt="2018-03-20T07:07:21.774" v="271" actId="1076"/>
+          <ac:picMkLst>
+            <pc:docMk/>
+            <pc:sldMk cId="576619051" sldId="257"/>
+            <ac:picMk id="73" creationId="{FBF02C0D-873E-4CC8-B378-A2129CEFF338}"/>
+          </ac:picMkLst>
+        </pc:picChg>
+        <pc:picChg chg="add mod">
+          <ac:chgData name="Eugene CHOY Wen Jia" userId="f0093c6c-aad3-47c8-981f-e49faae5c851" providerId="ADAL" clId="{3552CE5B-0803-49BD-A011-F4C75B92F40C}" dt="2018-03-20T07:09:59.824" v="305" actId="164"/>
+          <ac:picMkLst>
+            <pc:docMk/>
+            <pc:sldMk cId="576619051" sldId="257"/>
+            <ac:picMk id="76" creationId="{4E2D3EAB-DE34-446D-A72E-0E3C56587257}"/>
+          </ac:picMkLst>
+        </pc:picChg>
+        <pc:picChg chg="add mod">
+          <ac:chgData name="Eugene CHOY Wen Jia" userId="f0093c6c-aad3-47c8-981f-e49faae5c851" providerId="ADAL" clId="{3552CE5B-0803-49BD-A011-F4C75B92F40C}" dt="2018-03-20T07:12:16.509" v="313" actId="1076"/>
+          <ac:picMkLst>
+            <pc:docMk/>
+            <pc:sldMk cId="576619051" sldId="257"/>
+            <ac:picMk id="94" creationId="{E0D478CB-B89A-4C86-BF92-6CA3E15B285B}"/>
+          </ac:picMkLst>
+        </pc:picChg>
+        <pc:picChg chg="add mod">
+          <ac:chgData name="Eugene CHOY Wen Jia" userId="f0093c6c-aad3-47c8-981f-e49faae5c851" providerId="ADAL" clId="{3552CE5B-0803-49BD-A011-F4C75B92F40C}" dt="2018-03-20T06:59:58.737" v="138" actId="1076"/>
+          <ac:picMkLst>
+            <pc:docMk/>
+            <pc:sldMk cId="576619051" sldId="257"/>
+            <ac:picMk id="96" creationId="{B83AE1BB-DE3B-494A-A3F9-7DC9099A6F3A}"/>
+          </ac:picMkLst>
+        </pc:picChg>
+        <pc:picChg chg="add mod">
+          <ac:chgData name="Eugene CHOY Wen Jia" userId="f0093c6c-aad3-47c8-981f-e49faae5c851" providerId="ADAL" clId="{3552CE5B-0803-49BD-A011-F4C75B92F40C}" dt="2018-03-20T07:06:50.619" v="259" actId="1076"/>
+          <ac:picMkLst>
+            <pc:docMk/>
+            <pc:sldMk cId="576619051" sldId="257"/>
+            <ac:picMk id="102" creationId="{066242CB-1568-4176-8CE5-C8B4FC01846D}"/>
+          </ac:picMkLst>
+        </pc:picChg>
+        <pc:picChg chg="mod">
+          <ac:chgData name="Eugene CHOY Wen Jia" userId="f0093c6c-aad3-47c8-981f-e49faae5c851" providerId="ADAL" clId="{3552CE5B-0803-49BD-A011-F4C75B92F40C}" dt="2018-03-20T07:01:05.639" v="157" actId="1076"/>
+          <ac:picMkLst>
+            <pc:docMk/>
+            <pc:sldMk cId="576619051" sldId="257"/>
+            <ac:picMk id="177" creationId="{62589CED-89D1-4477-9144-E7EFBBC41553}"/>
+          </ac:picMkLst>
+        </pc:picChg>
+        <pc:cxnChg chg="mod">
+          <ac:chgData name="Eugene CHOY Wen Jia" userId="f0093c6c-aad3-47c8-981f-e49faae5c851" providerId="ADAL" clId="{3552CE5B-0803-49BD-A011-F4C75B92F40C}" dt="2018-03-20T06:57:46.211" v="103" actId="14100"/>
+          <ac:cxnSpMkLst>
+            <pc:docMk/>
+            <pc:sldMk cId="576619051" sldId="257"/>
+            <ac:cxnSpMk id="18" creationId="{3B890781-4519-431C-8FC6-623DA76406AA}"/>
+          </ac:cxnSpMkLst>
+        </pc:cxnChg>
+        <pc:cxnChg chg="mod">
+          <ac:chgData name="Eugene CHOY Wen Jia" userId="f0093c6c-aad3-47c8-981f-e49faae5c851" providerId="ADAL" clId="{3552CE5B-0803-49BD-A011-F4C75B92F40C}" dt="2018-03-20T07:03:04.601" v="206" actId="1076"/>
+          <ac:cxnSpMkLst>
+            <pc:docMk/>
+            <pc:sldMk cId="576619051" sldId="257"/>
+            <ac:cxnSpMk id="49" creationId="{10503AB8-2E7F-4A4A-8AF9-5A46BDFC0E68}"/>
+          </ac:cxnSpMkLst>
+        </pc:cxnChg>
+        <pc:cxnChg chg="mod">
+          <ac:chgData name="Eugene CHOY Wen Jia" userId="f0093c6c-aad3-47c8-981f-e49faae5c851" providerId="ADAL" clId="{3552CE5B-0803-49BD-A011-F4C75B92F40C}" dt="2018-03-20T07:09:38.128" v="299" actId="1076"/>
+          <ac:cxnSpMkLst>
+            <pc:docMk/>
+            <pc:sldMk cId="576619051" sldId="257"/>
+            <ac:cxnSpMk id="62" creationId="{BC547505-418E-4046-8B9C-3E0502ED48FF}"/>
+          </ac:cxnSpMkLst>
+        </pc:cxnChg>
+        <pc:cxnChg chg="mod">
+          <ac:chgData name="Eugene CHOY Wen Jia" userId="f0093c6c-aad3-47c8-981f-e49faae5c851" providerId="ADAL" clId="{3552CE5B-0803-49BD-A011-F4C75B92F40C}" dt="2018-03-20T07:09:53.620" v="304" actId="14100"/>
+          <ac:cxnSpMkLst>
+            <pc:docMk/>
+            <pc:sldMk cId="576619051" sldId="257"/>
+            <ac:cxnSpMk id="87" creationId="{648BE510-1903-48E0-933F-79AAA6F27823}"/>
+          </ac:cxnSpMkLst>
+        </pc:cxnChg>
+        <pc:cxnChg chg="mod">
+          <ac:chgData name="Eugene CHOY Wen Jia" userId="f0093c6c-aad3-47c8-981f-e49faae5c851" providerId="ADAL" clId="{3552CE5B-0803-49BD-A011-F4C75B92F40C}" dt="2018-03-20T07:10:12.388" v="307" actId="14100"/>
+          <ac:cxnSpMkLst>
+            <pc:docMk/>
+            <pc:sldMk cId="576619051" sldId="257"/>
+            <ac:cxnSpMk id="89" creationId="{48D3BA84-8653-435F-A70F-350C0BDD17B6}"/>
+          </ac:cxnSpMkLst>
+        </pc:cxnChg>
+        <pc:cxnChg chg="mod">
+          <ac:chgData name="Eugene CHOY Wen Jia" userId="f0093c6c-aad3-47c8-981f-e49faae5c851" providerId="ADAL" clId="{3552CE5B-0803-49BD-A011-F4C75B92F40C}" dt="2018-03-20T06:56:27.394" v="87" actId="14100"/>
+          <ac:cxnSpMkLst>
+            <pc:docMk/>
+            <pc:sldMk cId="576619051" sldId="257"/>
+            <ac:cxnSpMk id="91" creationId="{B95C97DD-90C8-4885-AB26-8EB6CEA95AFB}"/>
+          </ac:cxnSpMkLst>
+        </pc:cxnChg>
+        <pc:cxnChg chg="mod">
+          <ac:chgData name="Eugene CHOY Wen Jia" userId="f0093c6c-aad3-47c8-981f-e49faae5c851" providerId="ADAL" clId="{3552CE5B-0803-49BD-A011-F4C75B92F40C}" dt="2018-03-20T06:59:33.003" v="128" actId="14100"/>
+          <ac:cxnSpMkLst>
+            <pc:docMk/>
+            <pc:sldMk cId="576619051" sldId="257"/>
+            <ac:cxnSpMk id="130" creationId="{C4DBE0C7-26A2-40D0-9775-8156C064A289}"/>
+          </ac:cxnSpMkLst>
+        </pc:cxnChg>
+      </pc:sldChg>
+    </pc:docChg>
+  </pc:docChgLst>
+</pc:chgInfo>
+</file>
+
 <file path=ppt/notesMasters/notesMaster1.xml><?xml version="1.0" encoding="utf-8"?>
 <p:notesMaster xmlns:a="http://schemas.openxmlformats.org/drawingml/2006/main" xmlns:r="http://schemas.openxmlformats.org/officeDocument/2006/relationships" xmlns:p="http://schemas.openxmlformats.org/presentationml/2006/main">
   <p:cSld>
@@ -198,7 +683,7 @@
           <a:p>
             <a:fld id="{2969D29A-BED7-4F52-827A-C7D8A439955D}" type="datetimeFigureOut">
               <a:rPr lang="en-US" smtClean="0"/>
-              <a:t>17-Mar-18</a:t>
+              <a:t>20-Mar-18</a:t>
             </a:fld>
             <a:endParaRPr lang="en-US"/>
           </a:p>
@@ -696,7 +1181,7 @@
           <a:p>
             <a:fld id="{4C7F959B-C76D-4575-9470-CE5E6063DE88}" type="datetimeFigureOut">
               <a:rPr lang="en-US" smtClean="0"/>
-              <a:t>17-Mar-18</a:t>
+              <a:t>20-Mar-18</a:t>
             </a:fld>
             <a:endParaRPr lang="en-US"/>
           </a:p>
@@ -894,7 +1379,7 @@
           <a:p>
             <a:fld id="{4C7F959B-C76D-4575-9470-CE5E6063DE88}" type="datetimeFigureOut">
               <a:rPr lang="en-US" smtClean="0"/>
-              <a:t>17-Mar-18</a:t>
+              <a:t>20-Mar-18</a:t>
             </a:fld>
             <a:endParaRPr lang="en-US"/>
           </a:p>
@@ -1102,7 +1587,7 @@
           <a:p>
             <a:fld id="{4C7F959B-C76D-4575-9470-CE5E6063DE88}" type="datetimeFigureOut">
               <a:rPr lang="en-US" smtClean="0"/>
-              <a:t>17-Mar-18</a:t>
+              <a:t>20-Mar-18</a:t>
             </a:fld>
             <a:endParaRPr lang="en-US"/>
           </a:p>
@@ -1300,7 +1785,7 @@
           <a:p>
             <a:fld id="{4C7F959B-C76D-4575-9470-CE5E6063DE88}" type="datetimeFigureOut">
               <a:rPr lang="en-US" smtClean="0"/>
-              <a:t>17-Mar-18</a:t>
+              <a:t>20-Mar-18</a:t>
             </a:fld>
             <a:endParaRPr lang="en-US"/>
           </a:p>
@@ -1575,7 +2060,7 @@
           <a:p>
             <a:fld id="{4C7F959B-C76D-4575-9470-CE5E6063DE88}" type="datetimeFigureOut">
               <a:rPr lang="en-US" smtClean="0"/>
-              <a:t>17-Mar-18</a:t>
+              <a:t>20-Mar-18</a:t>
             </a:fld>
             <a:endParaRPr lang="en-US"/>
           </a:p>
@@ -1840,7 +2325,7 @@
           <a:p>
             <a:fld id="{4C7F959B-C76D-4575-9470-CE5E6063DE88}" type="datetimeFigureOut">
               <a:rPr lang="en-US" smtClean="0"/>
-              <a:t>17-Mar-18</a:t>
+              <a:t>20-Mar-18</a:t>
             </a:fld>
             <a:endParaRPr lang="en-US"/>
           </a:p>
@@ -2252,7 +2737,7 @@
           <a:p>
             <a:fld id="{4C7F959B-C76D-4575-9470-CE5E6063DE88}" type="datetimeFigureOut">
               <a:rPr lang="en-US" smtClean="0"/>
-              <a:t>17-Mar-18</a:t>
+              <a:t>20-Mar-18</a:t>
             </a:fld>
             <a:endParaRPr lang="en-US"/>
           </a:p>
@@ -2393,7 +2878,7 @@
           <a:p>
             <a:fld id="{4C7F959B-C76D-4575-9470-CE5E6063DE88}" type="datetimeFigureOut">
               <a:rPr lang="en-US" smtClean="0"/>
-              <a:t>17-Mar-18</a:t>
+              <a:t>20-Mar-18</a:t>
             </a:fld>
             <a:endParaRPr lang="en-US"/>
           </a:p>
@@ -2506,7 +2991,7 @@
           <a:p>
             <a:fld id="{4C7F959B-C76D-4575-9470-CE5E6063DE88}" type="datetimeFigureOut">
               <a:rPr lang="en-US" smtClean="0"/>
-              <a:t>17-Mar-18</a:t>
+              <a:t>20-Mar-18</a:t>
             </a:fld>
             <a:endParaRPr lang="en-US"/>
           </a:p>
@@ -2817,7 +3302,7 @@
           <a:p>
             <a:fld id="{4C7F959B-C76D-4575-9470-CE5E6063DE88}" type="datetimeFigureOut">
               <a:rPr lang="en-US" smtClean="0"/>
-              <a:t>17-Mar-18</a:t>
+              <a:t>20-Mar-18</a:t>
             </a:fld>
             <a:endParaRPr lang="en-US"/>
           </a:p>
@@ -3105,7 +3590,7 @@
           <a:p>
             <a:fld id="{4C7F959B-C76D-4575-9470-CE5E6063DE88}" type="datetimeFigureOut">
               <a:rPr lang="en-US" smtClean="0"/>
-              <a:t>17-Mar-18</a:t>
+              <a:t>20-Mar-18</a:t>
             </a:fld>
             <a:endParaRPr lang="en-US"/>
           </a:p>
@@ -3346,7 +3831,7 @@
           <a:p>
             <a:fld id="{4C7F959B-C76D-4575-9470-CE5E6063DE88}" type="datetimeFigureOut">
               <a:rPr lang="en-US" smtClean="0"/>
-              <a:t>17-Mar-18</a:t>
+              <a:t>20-Mar-18</a:t>
             </a:fld>
             <a:endParaRPr lang="en-US"/>
           </a:p>
@@ -4517,7 +5002,7 @@
           <a:p>
             <a:pPr algn="ctr"/>
             <a:r>
-              <a:rPr lang="en-US" sz="2400" b="1" dirty="0">
+              <a:rPr lang="en-US" sz="2000" b="1" dirty="0">
                 <a:solidFill>
                   <a:sysClr val="windowText" lastClr="000000"/>
                 </a:solidFill>
@@ -4528,7 +5013,7 @@
           <a:p>
             <a:pPr algn="ctr"/>
             <a:r>
-              <a:rPr lang="en-US" sz="2400" b="1" dirty="0">
+              <a:rPr lang="en-US" sz="2000" b="1" dirty="0">
                 <a:solidFill>
                   <a:sysClr val="windowText" lastClr="000000"/>
                 </a:solidFill>
@@ -4539,14 +5024,14 @@
           <a:p>
             <a:pPr algn="ctr"/>
             <a:r>
-              <a:rPr lang="en-US" sz="1600" dirty="0" err="1">
+              <a:rPr lang="en-US" sz="1400" dirty="0" err="1">
                 <a:solidFill>
                   <a:sysClr val="windowText" lastClr="000000"/>
                 </a:solidFill>
               </a:rPr>
               <a:t>q.breakdown</a:t>
             </a:r>
-            <a:endParaRPr lang="en-US" sz="1600" dirty="0">
+            <a:endParaRPr lang="en-US" sz="1400" dirty="0">
               <a:solidFill>
                 <a:sysClr val="windowText" lastClr="000000"/>
               </a:solidFill>
@@ -4555,14 +5040,14 @@
           <a:p>
             <a:pPr algn="ctr"/>
             <a:r>
-              <a:rPr lang="en-US" sz="1600" dirty="0" err="1">
+              <a:rPr lang="en-US" sz="1400" dirty="0" err="1">
                 <a:solidFill>
                   <a:sysClr val="windowText" lastClr="000000"/>
                 </a:solidFill>
               </a:rPr>
               <a:t>q.deployed</a:t>
             </a:r>
-            <a:endParaRPr lang="en-US" sz="1600" dirty="0">
+            <a:endParaRPr lang="en-US" sz="1400" dirty="0">
               <a:solidFill>
                 <a:sysClr val="windowText" lastClr="000000"/>
               </a:solidFill>
@@ -4571,7 +5056,7 @@
           <a:p>
             <a:pPr algn="ctr"/>
             <a:r>
-              <a:rPr lang="en-US" sz="1600" dirty="0" err="1">
+              <a:rPr lang="en-US" sz="1400" dirty="0" err="1">
                 <a:solidFill>
                   <a:sysClr val="windowText" lastClr="000000"/>
                 </a:solidFill>
@@ -4579,7 +5064,7 @@
               <a:t>q.depot</a:t>
             </a:r>
             <a:r>
-              <a:rPr lang="en-US" sz="1600" dirty="0">
+              <a:rPr lang="en-US" sz="1400" dirty="0">
                 <a:solidFill>
                   <a:sysClr val="windowText" lastClr="000000"/>
                 </a:solidFill>
@@ -4590,14 +5075,14 @@
           <a:p>
             <a:pPr algn="ctr"/>
             <a:r>
-              <a:rPr lang="en-US" sz="1600" dirty="0" err="1">
+              <a:rPr lang="en-US" sz="1400" dirty="0" err="1">
                 <a:solidFill>
                   <a:sysClr val="windowText" lastClr="000000"/>
                 </a:solidFill>
               </a:rPr>
               <a:t>t.weather</a:t>
             </a:r>
-            <a:endParaRPr lang="en-US" sz="1600" dirty="0">
+            <a:endParaRPr lang="en-US" sz="1400" dirty="0">
               <a:solidFill>
                 <a:sysClr val="windowText" lastClr="000000"/>
               </a:solidFill>
@@ -4606,7 +5091,7 @@
           <a:p>
             <a:pPr algn="ctr"/>
             <a:r>
-              <a:rPr lang="en-US" sz="1600" dirty="0">
+              <a:rPr lang="en-US" sz="1400" dirty="0">
                 <a:solidFill>
                   <a:sysClr val="windowText" lastClr="000000"/>
                 </a:solidFill>
@@ -4616,109 +5101,6 @@
           </a:p>
         </p:txBody>
       </p:sp>
-      <p:grpSp>
-        <p:nvGrpSpPr>
-          <p:cNvPr id="5" name="Group 4">
-            <a:extLst>
-              <a:ext uri="{FF2B5EF4-FFF2-40B4-BE49-F238E27FC236}">
-                <a16:creationId xmlns:a16="http://schemas.microsoft.com/office/drawing/2014/main" id="{F341EEF3-6254-4563-AF2D-D550F762C806}"/>
-              </a:ext>
-            </a:extLst>
-          </p:cNvPr>
-          <p:cNvGrpSpPr/>
-          <p:nvPr/>
-        </p:nvGrpSpPr>
-        <p:grpSpPr>
-          <a:xfrm>
-            <a:off x="61537" y="-29546"/>
-            <a:ext cx="3668055" cy="1105709"/>
-            <a:chOff x="468900" y="833284"/>
-            <a:chExt cx="3668055" cy="1105709"/>
-          </a:xfrm>
-        </p:grpSpPr>
-        <p:pic>
-          <p:nvPicPr>
-            <p:cNvPr id="6" name="Graphic 5" descr="Computer">
-              <a:extLst>
-                <a:ext uri="{FF2B5EF4-FFF2-40B4-BE49-F238E27FC236}">
-                  <a16:creationId xmlns:a16="http://schemas.microsoft.com/office/drawing/2014/main" id="{6853ACC9-E91F-474F-A9EB-35A697F18027}"/>
-                </a:ext>
-              </a:extLst>
-            </p:cNvPr>
-            <p:cNvPicPr>
-              <a:picLocks noChangeAspect="1"/>
-            </p:cNvPicPr>
-            <p:nvPr/>
-          </p:nvPicPr>
-          <p:blipFill>
-            <a:blip r:embed="rId3">
-              <a:extLst>
-                <a:ext uri="{28A0092B-C50C-407E-A947-70E740481C1C}">
-                  <a14:useLocalDpi xmlns:a14="http://schemas.microsoft.com/office/drawing/2010/main" val="0"/>
-                </a:ext>
-                <a:ext uri="{96DAC541-7B7A-43D3-8B79-37D633B846F1}">
-                  <asvg:svgBlip xmlns:asvg="http://schemas.microsoft.com/office/drawing/2016/SVG/main" r:embed="rId4"/>
-                </a:ext>
-              </a:extLst>
-            </a:blip>
-            <a:stretch>
-              <a:fillRect/>
-            </a:stretch>
-          </p:blipFill>
-          <p:spPr>
-            <a:xfrm>
-              <a:off x="1641987" y="833284"/>
-              <a:ext cx="914400" cy="914400"/>
-            </a:xfrm>
-            <a:prstGeom prst="rect">
-              <a:avLst/>
-            </a:prstGeom>
-          </p:spPr>
-        </p:pic>
-        <p:sp>
-          <p:nvSpPr>
-            <p:cNvPr id="7" name="TextBox 6">
-              <a:extLst>
-                <a:ext uri="{FF2B5EF4-FFF2-40B4-BE49-F238E27FC236}">
-                  <a16:creationId xmlns:a16="http://schemas.microsoft.com/office/drawing/2014/main" id="{1F77A314-7F07-43ED-9FB3-650E3013A58B}"/>
-                </a:ext>
-              </a:extLst>
-            </p:cNvPr>
-            <p:cNvSpPr txBox="1"/>
-            <p:nvPr/>
-          </p:nvSpPr>
-          <p:spPr>
-            <a:xfrm>
-              <a:off x="468900" y="1569661"/>
-              <a:ext cx="3668055" cy="369332"/>
-            </a:xfrm>
-            <a:prstGeom prst="rect">
-              <a:avLst/>
-            </a:prstGeom>
-            <a:noFill/>
-          </p:spPr>
-          <p:txBody>
-            <a:bodyPr wrap="none" rtlCol="0">
-              <a:spAutoFit/>
-            </a:bodyPr>
-            <a:lstStyle/>
-            <a:p>
-              <a:r>
-                <a:rPr lang="en-US" dirty="0"/>
-                <a:t>Train </a:t>
-              </a:r>
-              <a:r>
-                <a:rPr lang="en-US" dirty="0" err="1"/>
-                <a:t>Mgmt</a:t>
-              </a:r>
-              <a:r>
-                <a:rPr lang="en-US" dirty="0"/>
-                <a:t> Messaging System (Java)</a:t>
-              </a:r>
-            </a:p>
-          </p:txBody>
-        </p:sp>
-      </p:grpSp>
       <p:cxnSp>
         <p:nvCxnSpPr>
           <p:cNvPr id="9" name="Connector: Elbow 8">
@@ -4776,8 +5158,8 @@
         </p:nvSpPr>
         <p:spPr>
           <a:xfrm>
-            <a:off x="2465717" y="2838132"/>
-            <a:ext cx="1983235" cy="369332"/>
+            <a:off x="2682878" y="2979872"/>
+            <a:ext cx="1583575" cy="307777"/>
           </a:xfrm>
           <a:prstGeom prst="rect">
             <a:avLst/>
@@ -4791,15 +5173,15 @@
           <a:lstStyle/>
           <a:p>
             <a:r>
-              <a:rPr lang="en-US" b="1" dirty="0"/>
+              <a:rPr lang="en-US" sz="1400" b="1" dirty="0"/>
               <a:t>P </a:t>
             </a:r>
             <a:r>
-              <a:rPr lang="en-US" b="1" dirty="0" err="1"/>
+              <a:rPr lang="en-US" sz="1400" b="1" dirty="0" err="1"/>
               <a:t>q.breakdown</a:t>
             </a:r>
             <a:r>
-              <a:rPr lang="en-US" b="1" dirty="0"/>
+              <a:rPr lang="en-US" sz="1400" b="1" dirty="0"/>
               <a:t> (Q)</a:t>
             </a:r>
           </a:p>
@@ -4816,18 +5198,17 @@
           </p:cNvPr>
           <p:cNvCxnSpPr>
             <a:cxnSpLocks/>
+            <a:endCxn id="7" idx="2"/>
           </p:cNvCxnSpPr>
           <p:nvPr/>
         </p:nvCxnSpPr>
         <p:spPr>
           <a:xfrm rot="10800000">
-            <a:off x="1279433" y="1091546"/>
-            <a:ext cx="3808134" cy="2401682"/>
+            <a:off x="1372539" y="1025534"/>
+            <a:ext cx="3715028" cy="2467697"/>
           </a:xfrm>
-          <a:prstGeom prst="bentConnector3">
-            <a:avLst>
-              <a:gd name="adj1" fmla="val 99960"/>
-            </a:avLst>
+          <a:prstGeom prst="bentConnector2">
+            <a:avLst/>
           </a:prstGeom>
           <a:ln>
             <a:tailEnd type="triangle"/>
@@ -4862,8 +5243,8 @@
         </p:nvSpPr>
         <p:spPr>
           <a:xfrm>
-            <a:off x="2556414" y="3429002"/>
-            <a:ext cx="1788759" cy="369332"/>
+            <a:off x="2793544" y="3467773"/>
+            <a:ext cx="1433021" cy="307777"/>
           </a:xfrm>
           <a:prstGeom prst="rect">
             <a:avLst/>
@@ -4877,15 +5258,15 @@
           <a:lstStyle/>
           <a:p>
             <a:r>
-              <a:rPr lang="en-US" b="1" dirty="0"/>
+              <a:rPr lang="en-US" sz="1400" b="1" dirty="0"/>
               <a:t>C </a:t>
             </a:r>
             <a:r>
-              <a:rPr lang="en-US" b="1" dirty="0" err="1"/>
+              <a:rPr lang="en-US" sz="1400" b="1" dirty="0" err="1"/>
               <a:t>q.deployed</a:t>
             </a:r>
             <a:r>
-              <a:rPr lang="en-US" b="1" dirty="0"/>
+              <a:rPr lang="en-US" sz="1400" b="1" dirty="0"/>
               <a:t> (Q)</a:t>
             </a:r>
           </a:p>
@@ -4905,8 +5286,8 @@
         </p:nvSpPr>
         <p:spPr>
           <a:xfrm>
-            <a:off x="4128264" y="1626265"/>
-            <a:ext cx="2293513" cy="523220"/>
+            <a:off x="2431821" y="1159761"/>
+            <a:ext cx="2293513" cy="461665"/>
           </a:xfrm>
           <a:prstGeom prst="rect">
             <a:avLst/>
@@ -4921,14 +5302,14 @@
           <a:p>
             <a:pPr algn="ctr"/>
             <a:r>
-              <a:rPr lang="en-US" sz="1400" b="1" dirty="0"/>
+              <a:rPr lang="en-US" sz="1200" b="1" dirty="0"/>
               <a:t>Break down messages</a:t>
             </a:r>
           </a:p>
           <a:p>
             <a:pPr algn="ctr"/>
             <a:r>
-              <a:rPr lang="en-US" sz="1400" b="1" dirty="0"/>
+              <a:rPr lang="en-US" sz="1200" b="1" dirty="0"/>
               <a:t>Heavy Rainfall Report</a:t>
             </a:r>
           </a:p>
@@ -4991,7 +5372,7 @@
         </p:nvCxnSpPr>
         <p:spPr>
           <a:xfrm>
-            <a:off x="7066012" y="4507197"/>
+            <a:off x="7271672" y="4507328"/>
             <a:ext cx="2638679" cy="351332"/>
           </a:xfrm>
           <a:prstGeom prst="bentConnector2">
@@ -5030,8 +5411,8 @@
         </p:nvSpPr>
         <p:spPr>
           <a:xfrm>
-            <a:off x="7305136" y="4136044"/>
-            <a:ext cx="2210862" cy="369332"/>
+            <a:off x="7751161" y="4151795"/>
+            <a:ext cx="1763624" cy="307777"/>
           </a:xfrm>
           <a:prstGeom prst="rect">
             <a:avLst/>
@@ -5045,15 +5426,15 @@
           <a:lstStyle/>
           <a:p>
             <a:r>
-              <a:rPr lang="en-US" b="1" dirty="0"/>
+              <a:rPr lang="en-US" sz="1400" b="1" dirty="0"/>
               <a:t>C </a:t>
             </a:r>
             <a:r>
-              <a:rPr lang="en-US" b="1" dirty="0" err="1"/>
+              <a:rPr lang="en-US" sz="1400" b="1" dirty="0" err="1"/>
               <a:t>q.depot</a:t>
             </a:r>
             <a:r>
-              <a:rPr lang="en-US" b="1" dirty="0"/>
+              <a:rPr lang="en-US" sz="1400" b="1" dirty="0"/>
               <a:t>.&lt;dynamic&gt;</a:t>
             </a:r>
           </a:p>
@@ -5073,7 +5454,7 @@
         </p:nvGrpSpPr>
         <p:grpSpPr>
           <a:xfrm>
-            <a:off x="7499807" y="4858529"/>
+            <a:off x="7705467" y="4858660"/>
             <a:ext cx="4409768" cy="1917290"/>
             <a:chOff x="7499807" y="4165913"/>
             <a:chExt cx="4409768" cy="1917290"/>
@@ -5207,8 +5588,8 @@
             </p:nvSpPr>
             <p:spPr>
               <a:xfrm>
-                <a:off x="813508" y="6336044"/>
-                <a:ext cx="3670685" cy="369332"/>
+                <a:off x="972452" y="6353367"/>
+                <a:ext cx="3290773" cy="369332"/>
               </a:xfrm>
               <a:prstGeom prst="rect">
                 <a:avLst/>
@@ -5231,7 +5612,7 @@
                 </a:r>
                 <a:r>
                   <a:rPr lang="en-US" dirty="0"/>
-                  <a:t> System(C#)</a:t>
+                  <a:t> System</a:t>
                 </a:r>
               </a:p>
             </p:txBody>
@@ -5441,10 +5822,10 @@
         </p:nvGrpSpPr>
         <p:grpSpPr>
           <a:xfrm>
-            <a:off x="57296" y="3596217"/>
-            <a:ext cx="2552686" cy="1113076"/>
-            <a:chOff x="1406811" y="686282"/>
-            <a:chExt cx="2552686" cy="1113076"/>
+            <a:off x="0" y="3402913"/>
+            <a:ext cx="2028440" cy="1084993"/>
+            <a:chOff x="1406811" y="652810"/>
+            <a:chExt cx="2028440" cy="1084993"/>
           </a:xfrm>
         </p:grpSpPr>
         <p:pic>
@@ -5478,7 +5859,7 @@
           </p:blipFill>
           <p:spPr>
             <a:xfrm>
-              <a:off x="2137303" y="686282"/>
+              <a:off x="1879652" y="652810"/>
               <a:ext cx="914400" cy="914400"/>
             </a:xfrm>
             <a:prstGeom prst="rect">
@@ -5501,7 +5882,7 @@
           <p:spPr>
             <a:xfrm>
               <a:off x="1406811" y="1430026"/>
-              <a:ext cx="2552686" cy="369332"/>
+              <a:ext cx="2028440" cy="307777"/>
             </a:xfrm>
             <a:prstGeom prst="rect">
               <a:avLst/>
@@ -5515,7 +5896,7 @@
             <a:lstStyle/>
             <a:p>
               <a:r>
-                <a:rPr lang="en-US" dirty="0"/>
+                <a:rPr lang="en-US" sz="1400" dirty="0"/>
                 <a:t>Bus Management System</a:t>
               </a:r>
             </a:p>
@@ -5539,8 +5920,8 @@
         </p:nvCxnSpPr>
         <p:spPr>
           <a:xfrm>
-            <a:off x="1702188" y="4053417"/>
-            <a:ext cx="3419841" cy="22028"/>
+            <a:off x="1387241" y="3860113"/>
+            <a:ext cx="3728546" cy="24016"/>
           </a:xfrm>
           <a:prstGeom prst="straightConnector1">
             <a:avLst/>
@@ -5578,7 +5959,7 @@
         </p:nvSpPr>
         <p:spPr>
           <a:xfrm>
-            <a:off x="2557112" y="4057433"/>
+            <a:off x="2572299" y="3842828"/>
             <a:ext cx="1123513" cy="369332"/>
           </a:xfrm>
           <a:prstGeom prst="rect">
@@ -5604,109 +5985,6 @@
           </a:p>
         </p:txBody>
       </p:sp>
-      <p:grpSp>
-        <p:nvGrpSpPr>
-          <p:cNvPr id="64" name="Group 63">
-            <a:extLst>
-              <a:ext uri="{FF2B5EF4-FFF2-40B4-BE49-F238E27FC236}">
-                <a16:creationId xmlns:a16="http://schemas.microsoft.com/office/drawing/2014/main" id="{2267A04F-96F7-49C0-B8A3-5DC1B3F707BB}"/>
-              </a:ext>
-            </a:extLst>
-          </p:cNvPr>
-          <p:cNvGrpSpPr/>
-          <p:nvPr/>
-        </p:nvGrpSpPr>
-        <p:grpSpPr>
-          <a:xfrm>
-            <a:off x="2308861" y="5372597"/>
-            <a:ext cx="2402389" cy="1485403"/>
-            <a:chOff x="978751" y="3005762"/>
-            <a:chExt cx="2402389" cy="1485403"/>
-          </a:xfrm>
-        </p:grpSpPr>
-        <p:sp>
-          <p:nvSpPr>
-            <p:cNvPr id="65" name="TextBox 64">
-              <a:extLst>
-                <a:ext uri="{FF2B5EF4-FFF2-40B4-BE49-F238E27FC236}">
-                  <a16:creationId xmlns:a16="http://schemas.microsoft.com/office/drawing/2014/main" id="{8B3E46FF-3599-4502-857A-A9F7DAD6DB2D}"/>
-                </a:ext>
-              </a:extLst>
-            </p:cNvPr>
-            <p:cNvSpPr txBox="1"/>
-            <p:nvPr/>
-          </p:nvSpPr>
-          <p:spPr>
-            <a:xfrm>
-              <a:off x="978751" y="3844834"/>
-              <a:ext cx="2402389" cy="646331"/>
-            </a:xfrm>
-            <a:prstGeom prst="rect">
-              <a:avLst/>
-            </a:prstGeom>
-            <a:noFill/>
-          </p:spPr>
-          <p:txBody>
-            <a:bodyPr wrap="none" rtlCol="0">
-              <a:spAutoFit/>
-            </a:bodyPr>
-            <a:lstStyle/>
-            <a:p>
-              <a:pPr algn="ctr"/>
-              <a:r>
-                <a:rPr lang="en-US" dirty="0"/>
-                <a:t>Schedule Management </a:t>
-              </a:r>
-            </a:p>
-            <a:p>
-              <a:pPr algn="ctr"/>
-              <a:r>
-                <a:rPr lang="en-US" dirty="0"/>
-                <a:t>Web Service (PHP)</a:t>
-              </a:r>
-            </a:p>
-          </p:txBody>
-        </p:sp>
-        <p:pic>
-          <p:nvPicPr>
-            <p:cNvPr id="66" name="Graphic 65" descr="Earth Globe Americas">
-              <a:extLst>
-                <a:ext uri="{FF2B5EF4-FFF2-40B4-BE49-F238E27FC236}">
-                  <a16:creationId xmlns:a16="http://schemas.microsoft.com/office/drawing/2014/main" id="{7AFFB57A-AA42-4242-B9BC-4BA274D128DA}"/>
-                </a:ext>
-              </a:extLst>
-            </p:cNvPr>
-            <p:cNvPicPr>
-              <a:picLocks noChangeAspect="1"/>
-            </p:cNvPicPr>
-            <p:nvPr/>
-          </p:nvPicPr>
-          <p:blipFill>
-            <a:blip r:embed="rId5">
-              <a:extLst>
-                <a:ext uri="{28A0092B-C50C-407E-A947-70E740481C1C}">
-                  <a14:useLocalDpi xmlns:a14="http://schemas.microsoft.com/office/drawing/2010/main" val="0"/>
-                </a:ext>
-                <a:ext uri="{96DAC541-7B7A-43D3-8B79-37D633B846F1}">
-                  <asvg:svgBlip xmlns:asvg="http://schemas.microsoft.com/office/drawing/2016/SVG/main" r:embed="rId6"/>
-                </a:ext>
-              </a:extLst>
-            </a:blip>
-            <a:stretch>
-              <a:fillRect/>
-            </a:stretch>
-          </p:blipFill>
-          <p:spPr>
-            <a:xfrm>
-              <a:off x="1641987" y="3005762"/>
-              <a:ext cx="914400" cy="914400"/>
-            </a:xfrm>
-            <a:prstGeom prst="rect">
-              <a:avLst/>
-            </a:prstGeom>
-          </p:spPr>
-        </p:pic>
-      </p:grpSp>
       <p:sp>
         <p:nvSpPr>
           <p:cNvPr id="69" name="TextBox 68">
@@ -5722,7 +6000,7 @@
         <p:spPr>
           <a:xfrm>
             <a:off x="5559718" y="5139939"/>
-            <a:ext cx="684418" cy="369332"/>
+            <a:ext cx="627992" cy="338554"/>
           </a:xfrm>
           <a:prstGeom prst="rect">
             <a:avLst/>
@@ -5736,115 +6014,12 @@
           <a:lstStyle/>
           <a:p>
             <a:r>
-              <a:rPr lang="en-US" b="1" dirty="0"/>
+              <a:rPr lang="en-US" sz="1600" b="1" dirty="0"/>
               <a:t>HTTP</a:t>
             </a:r>
           </a:p>
         </p:txBody>
       </p:sp>
-      <p:grpSp>
-        <p:nvGrpSpPr>
-          <p:cNvPr id="71" name="Group 70">
-            <a:extLst>
-              <a:ext uri="{FF2B5EF4-FFF2-40B4-BE49-F238E27FC236}">
-                <a16:creationId xmlns:a16="http://schemas.microsoft.com/office/drawing/2014/main" id="{3FC55428-A528-4B9F-8C06-57C2E45E2767}"/>
-              </a:ext>
-            </a:extLst>
-          </p:cNvPr>
-          <p:cNvGrpSpPr/>
-          <p:nvPr/>
-        </p:nvGrpSpPr>
-        <p:grpSpPr>
-          <a:xfrm>
-            <a:off x="-3486" y="4807155"/>
-            <a:ext cx="2353145" cy="1529727"/>
-            <a:chOff x="921013" y="3005762"/>
-            <a:chExt cx="2353145" cy="1529727"/>
-          </a:xfrm>
-        </p:grpSpPr>
-        <p:sp>
-          <p:nvSpPr>
-            <p:cNvPr id="72" name="TextBox 71">
-              <a:extLst>
-                <a:ext uri="{FF2B5EF4-FFF2-40B4-BE49-F238E27FC236}">
-                  <a16:creationId xmlns:a16="http://schemas.microsoft.com/office/drawing/2014/main" id="{A07C89D9-E262-4A8A-9272-889371116074}"/>
-                </a:ext>
-              </a:extLst>
-            </p:cNvPr>
-            <p:cNvSpPr txBox="1"/>
-            <p:nvPr/>
-          </p:nvSpPr>
-          <p:spPr>
-            <a:xfrm>
-              <a:off x="921013" y="3889158"/>
-              <a:ext cx="2353145" cy="646331"/>
-            </a:xfrm>
-            <a:prstGeom prst="rect">
-              <a:avLst/>
-            </a:prstGeom>
-            <a:noFill/>
-          </p:spPr>
-          <p:txBody>
-            <a:bodyPr wrap="none" rtlCol="0">
-              <a:spAutoFit/>
-            </a:bodyPr>
-            <a:lstStyle/>
-            <a:p>
-              <a:pPr algn="ctr"/>
-              <a:r>
-                <a:rPr lang="en-US" dirty="0"/>
-                <a:t>Get nearest Bus Depot </a:t>
-              </a:r>
-            </a:p>
-            <a:p>
-              <a:pPr algn="ctr"/>
-              <a:r>
-                <a:rPr lang="en-US" dirty="0"/>
-                <a:t>Web Service (Java)</a:t>
-              </a:r>
-            </a:p>
-          </p:txBody>
-        </p:sp>
-        <p:pic>
-          <p:nvPicPr>
-            <p:cNvPr id="73" name="Graphic 72" descr="Earth Globe Americas">
-              <a:extLst>
-                <a:ext uri="{FF2B5EF4-FFF2-40B4-BE49-F238E27FC236}">
-                  <a16:creationId xmlns:a16="http://schemas.microsoft.com/office/drawing/2014/main" id="{FBF02C0D-873E-4CC8-B378-A2129CEFF338}"/>
-                </a:ext>
-              </a:extLst>
-            </p:cNvPr>
-            <p:cNvPicPr>
-              <a:picLocks noChangeAspect="1"/>
-            </p:cNvPicPr>
-            <p:nvPr/>
-          </p:nvPicPr>
-          <p:blipFill>
-            <a:blip r:embed="rId5">
-              <a:extLst>
-                <a:ext uri="{28A0092B-C50C-407E-A947-70E740481C1C}">
-                  <a14:useLocalDpi xmlns:a14="http://schemas.microsoft.com/office/drawing/2010/main" val="0"/>
-                </a:ext>
-                <a:ext uri="{96DAC541-7B7A-43D3-8B79-37D633B846F1}">
-                  <asvg:svgBlip xmlns:asvg="http://schemas.microsoft.com/office/drawing/2016/SVG/main" r:embed="rId6"/>
-                </a:ext>
-              </a:extLst>
-            </a:blip>
-            <a:stretch>
-              <a:fillRect/>
-            </a:stretch>
-          </p:blipFill>
-          <p:spPr>
-            <a:xfrm>
-              <a:off x="1641987" y="3005762"/>
-              <a:ext cx="914400" cy="914400"/>
-            </a:xfrm>
-            <a:prstGeom prst="rect">
-              <a:avLst/>
-            </a:prstGeom>
-          </p:spPr>
-        </p:pic>
-      </p:grpSp>
       <p:sp>
         <p:nvSpPr>
           <p:cNvPr id="77" name="TextBox 76">
@@ -5859,8 +6034,8 @@
         </p:nvSpPr>
         <p:spPr>
           <a:xfrm>
-            <a:off x="2140685" y="4913268"/>
-            <a:ext cx="684418" cy="369332"/>
+            <a:off x="1891176" y="4565129"/>
+            <a:ext cx="627992" cy="338554"/>
           </a:xfrm>
           <a:prstGeom prst="rect">
             <a:avLst/>
@@ -5874,7 +6049,7 @@
           <a:lstStyle/>
           <a:p>
             <a:r>
-              <a:rPr lang="en-US" b="1" dirty="0"/>
+              <a:rPr lang="en-US" sz="1600" b="1" dirty="0"/>
               <a:t>HTTP</a:t>
             </a:r>
           </a:p>
@@ -5894,10 +6069,10 @@
         </p:nvGrpSpPr>
         <p:grpSpPr>
           <a:xfrm>
-            <a:off x="5552919" y="5642878"/>
-            <a:ext cx="1361911" cy="1255900"/>
-            <a:chOff x="1418231" y="3005762"/>
-            <a:chExt cx="1361911" cy="1255900"/>
+            <a:off x="5000108" y="5492003"/>
+            <a:ext cx="2488053" cy="1379769"/>
+            <a:chOff x="854362" y="3005762"/>
+            <a:chExt cx="2488053" cy="1379769"/>
           </a:xfrm>
         </p:grpSpPr>
         <p:sp>
@@ -5914,8 +6089,8 @@
           </p:nvSpPr>
           <p:spPr>
             <a:xfrm>
-              <a:off x="1418231" y="3892330"/>
-              <a:ext cx="1361911" cy="369332"/>
+              <a:off x="854362" y="3800756"/>
+              <a:ext cx="2488053" cy="584775"/>
             </a:xfrm>
             <a:prstGeom prst="rect">
               <a:avLst/>
@@ -5928,9 +6103,25 @@
             </a:bodyPr>
             <a:lstStyle/>
             <a:p>
+              <a:pPr algn="ctr"/>
               <a:r>
-                <a:rPr lang="en-US" dirty="0"/>
+                <a:rPr lang="en-US" sz="1600" dirty="0"/>
                 <a:t>Weather API</a:t>
+              </a:r>
+            </a:p>
+            <a:p>
+              <a:pPr algn="ctr"/>
+              <a:r>
+                <a:rPr lang="en-US" sz="1600" dirty="0"/>
+                <a:t>(wrapped NEA </a:t>
+              </a:r>
+              <a:r>
+                <a:rPr lang="en-US" sz="1600" dirty="0" err="1"/>
+                <a:t>Api</a:t>
+              </a:r>
+              <a:r>
+                <a:rPr lang="en-US" sz="1600" dirty="0"/>
+                <a:t> w code)</a:t>
               </a:r>
             </a:p>
           </p:txBody>
@@ -5985,14 +6176,14 @@
             </a:extLst>
           </p:cNvPr>
           <p:cNvCxnSpPr>
-            <a:stCxn id="73" idx="3"/>
+            <a:cxnSpLocks/>
           </p:cNvCxnSpPr>
           <p:nvPr/>
         </p:nvCxnSpPr>
         <p:spPr>
           <a:xfrm flipV="1">
-            <a:off x="1631888" y="4472953"/>
-            <a:ext cx="3490145" cy="791402"/>
+            <a:off x="1634205" y="4329793"/>
+            <a:ext cx="3487824" cy="548535"/>
           </a:xfrm>
           <a:prstGeom prst="bentConnector3">
             <a:avLst/>
@@ -6023,14 +6214,15 @@
             </a:extLst>
           </p:cNvPr>
           <p:cNvCxnSpPr>
-            <a:stCxn id="66" idx="3"/>
+            <a:cxnSpLocks/>
+            <a:stCxn id="76" idx="3"/>
           </p:cNvCxnSpPr>
           <p:nvPr/>
         </p:nvCxnSpPr>
         <p:spPr>
           <a:xfrm flipV="1">
-            <a:off x="3886497" y="4723770"/>
-            <a:ext cx="1235536" cy="1106027"/>
+            <a:off x="3245592" y="4803698"/>
+            <a:ext cx="1870195" cy="1175448"/>
           </a:xfrm>
           <a:prstGeom prst="bentConnector3">
             <a:avLst/>
@@ -6061,14 +6253,15 @@
             </a:extLst>
           </p:cNvPr>
           <p:cNvCxnSpPr>
+            <a:cxnSpLocks/>
             <a:stCxn id="80" idx="0"/>
           </p:cNvCxnSpPr>
           <p:nvPr/>
         </p:nvCxnSpPr>
         <p:spPr>
-          <a:xfrm flipH="1" flipV="1">
-            <a:off x="6233874" y="4999703"/>
-            <a:ext cx="1" cy="643175"/>
+          <a:xfrm flipV="1">
+            <a:off x="6244933" y="4999703"/>
+            <a:ext cx="6289" cy="492300"/>
           </a:xfrm>
           <a:prstGeom prst="line">
             <a:avLst/>
@@ -6103,8 +6296,8 @@
         </p:nvSpPr>
         <p:spPr>
           <a:xfrm>
-            <a:off x="3824961" y="5463545"/>
-            <a:ext cx="684418" cy="369332"/>
+            <a:off x="3462898" y="5590045"/>
+            <a:ext cx="627992" cy="338554"/>
           </a:xfrm>
           <a:prstGeom prst="rect">
             <a:avLst/>
@@ -6118,7 +6311,7 @@
           <a:lstStyle/>
           <a:p>
             <a:r>
-              <a:rPr lang="en-US" b="1" dirty="0"/>
+              <a:rPr lang="en-US" sz="1600" b="1" dirty="0"/>
               <a:t>HTTP</a:t>
             </a:r>
           </a:p>
@@ -6181,10 +6374,10 @@
         </p:nvGrpSpPr>
         <p:grpSpPr>
           <a:xfrm>
-            <a:off x="3394433" y="160305"/>
-            <a:ext cx="1478866" cy="1300533"/>
+            <a:off x="1742242" y="983291"/>
+            <a:ext cx="1333185" cy="1098721"/>
             <a:chOff x="4559635" y="-3919"/>
-            <a:chExt cx="1478866" cy="1300533"/>
+            <a:chExt cx="1633146" cy="1345928"/>
           </a:xfrm>
         </p:grpSpPr>
         <p:sp>
@@ -6202,7 +6395,7 @@
           <p:spPr>
             <a:xfrm>
               <a:off x="4559635" y="927282"/>
-              <a:ext cx="1478866" cy="369332"/>
+              <a:ext cx="1633146" cy="414727"/>
             </a:xfrm>
             <a:prstGeom prst="rect">
               <a:avLst/>
@@ -6216,7 +6409,7 @@
             <a:lstStyle/>
             <a:p>
               <a:r>
-                <a:rPr lang="en-US" dirty="0"/>
+                <a:rPr lang="en-US" sz="1600" dirty="0"/>
                 <a:t>Twitter Plugin</a:t>
               </a:r>
             </a:p>
@@ -6317,8 +6510,8 @@
         </p:nvSpPr>
         <p:spPr>
           <a:xfrm>
-            <a:off x="10525042" y="2294144"/>
-            <a:ext cx="1326004" cy="369332"/>
+            <a:off x="10510695" y="2207399"/>
+            <a:ext cx="1200970" cy="338554"/>
           </a:xfrm>
           <a:prstGeom prst="rect">
             <a:avLst/>
@@ -6332,7 +6525,7 @@
           <a:lstStyle/>
           <a:p>
             <a:r>
-              <a:rPr lang="en-US" b="1" dirty="0"/>
+              <a:rPr lang="en-US" sz="1600" b="1" dirty="0"/>
               <a:t>Send Emails</a:t>
             </a:r>
           </a:p>
@@ -6350,19 +6543,16 @@
           <p:cNvCxnSpPr>
             <a:cxnSpLocks/>
             <a:stCxn id="4" idx="0"/>
-            <a:endCxn id="25" idx="2"/>
           </p:cNvCxnSpPr>
           <p:nvPr/>
         </p:nvCxnSpPr>
         <p:spPr>
           <a:xfrm rot="16200000" flipV="1">
-            <a:off x="4473753" y="1120951"/>
-            <a:ext cx="1282362" cy="1962135"/>
+            <a:off x="3786770" y="433968"/>
+            <a:ext cx="1138200" cy="3480263"/>
           </a:xfrm>
-          <a:prstGeom prst="bentConnector3">
-            <a:avLst>
-              <a:gd name="adj1" fmla="val 50000"/>
-            </a:avLst>
+          <a:prstGeom prst="bentConnector2">
+            <a:avLst/>
           </a:prstGeom>
           <a:ln>
             <a:tailEnd type="triangle"/>
@@ -6437,9 +6627,9 @@
         <p:grpSpPr>
           <a:xfrm>
             <a:off x="4342461" y="-4104"/>
-            <a:ext cx="5524038" cy="1595348"/>
+            <a:ext cx="5490786" cy="1595348"/>
             <a:chOff x="3550053" y="5799"/>
-            <a:chExt cx="5524038" cy="1595348"/>
+            <a:chExt cx="5490786" cy="1595348"/>
           </a:xfrm>
         </p:grpSpPr>
         <p:sp>
@@ -6493,9 +6683,9 @@
           <p:grpSpPr>
             <a:xfrm>
               <a:off x="3550053" y="5799"/>
-              <a:ext cx="5524038" cy="1539426"/>
+              <a:ext cx="5490786" cy="1539426"/>
               <a:chOff x="3550053" y="5799"/>
-              <a:chExt cx="5524038" cy="1539426"/>
+              <a:chExt cx="5490786" cy="1539426"/>
             </a:xfrm>
           </p:grpSpPr>
           <p:grpSp>
@@ -6512,10 +6702,10 @@
             </p:nvGrpSpPr>
             <p:grpSpPr>
               <a:xfrm>
-                <a:off x="4176540" y="5799"/>
-                <a:ext cx="3838920" cy="1539426"/>
-                <a:chOff x="4176540" y="5799"/>
-                <a:chExt cx="3838920" cy="1539426"/>
+                <a:off x="3704089" y="5799"/>
+                <a:ext cx="4311371" cy="1539426"/>
+                <a:chOff x="3704089" y="5799"/>
+                <a:chExt cx="4311371" cy="1539426"/>
               </a:xfrm>
             </p:grpSpPr>
             <p:sp>
@@ -6532,8 +6722,8 @@
               </p:nvSpPr>
               <p:spPr>
                 <a:xfrm>
-                  <a:off x="4461017" y="71371"/>
-                  <a:ext cx="3237293" cy="1473854"/>
+                  <a:off x="3704089" y="71371"/>
+                  <a:ext cx="3994222" cy="1473854"/>
                 </a:xfrm>
                 <a:prstGeom prst="rect">
                   <a:avLst/>
@@ -6899,7 +7089,7 @@
             </p:nvSpPr>
             <p:spPr>
               <a:xfrm>
-                <a:off x="5235171" y="281348"/>
+                <a:off x="5201919" y="281348"/>
                 <a:ext cx="3838920" cy="307777"/>
               </a:xfrm>
               <a:prstGeom prst="rect">
@@ -6939,7 +7129,7 @@
         <p:spPr>
           <a:xfrm>
             <a:off x="6692433" y="1871896"/>
-            <a:ext cx="2141355" cy="646331"/>
+            <a:ext cx="1714572" cy="523220"/>
           </a:xfrm>
           <a:prstGeom prst="rect">
             <a:avLst/>
@@ -6953,14 +7143,14 @@
           <a:lstStyle/>
           <a:p>
             <a:r>
-              <a:rPr lang="en-US" b="1" dirty="0" err="1"/>
+              <a:rPr lang="en-US" sz="1400" b="1" dirty="0" err="1"/>
               <a:t>t.weather</a:t>
             </a:r>
-            <a:endParaRPr lang="en-US" b="1" dirty="0"/>
-          </a:p>
-          <a:p>
-            <a:r>
-              <a:rPr lang="en-US" b="1" dirty="0"/>
+            <a:endParaRPr lang="en-US" sz="1400" b="1" dirty="0"/>
+          </a:p>
+          <a:p>
+            <a:r>
+              <a:rPr lang="en-US" sz="1400" b="1" dirty="0"/>
               <a:t>t.&lt;dynamic&gt;.listener</a:t>
             </a:r>
           </a:p>
@@ -7027,8 +7217,8 @@
         </p:blipFill>
         <p:spPr>
           <a:xfrm>
-            <a:off x="3106787" y="2007030"/>
-            <a:ext cx="610642" cy="610642"/>
+            <a:off x="3134056" y="2360017"/>
+            <a:ext cx="491425" cy="491425"/>
           </a:xfrm>
           <a:prstGeom prst="rect">
             <a:avLst/>
@@ -7049,8 +7239,8 @@
         </p:nvSpPr>
         <p:spPr>
           <a:xfrm>
-            <a:off x="1691824" y="2613478"/>
-            <a:ext cx="3365280" cy="338554"/>
+            <a:off x="2124825" y="2815585"/>
+            <a:ext cx="2567369" cy="276999"/>
           </a:xfrm>
           <a:prstGeom prst="rect">
             <a:avLst/>
@@ -7064,7 +7254,7 @@
           <a:lstStyle/>
           <a:p>
             <a:r>
-              <a:rPr lang="en-US" sz="1600" dirty="0"/>
+              <a:rPr lang="en-US" sz="1200" dirty="0"/>
               <a:t>breakdown.xml (new_breakdown.xsd)</a:t>
             </a:r>
           </a:p>
@@ -7123,8 +7313,8 @@
         </p:nvSpPr>
         <p:spPr>
           <a:xfrm>
-            <a:off x="7121496" y="3941688"/>
-            <a:ext cx="3431132" cy="338554"/>
+            <a:off x="7431539" y="3986244"/>
+            <a:ext cx="2620333" cy="276999"/>
           </a:xfrm>
           <a:prstGeom prst="rect">
             <a:avLst/>
@@ -7138,12 +7328,672 @@
           <a:lstStyle/>
           <a:p>
             <a:r>
-              <a:rPr lang="en-US" sz="1600" dirty="0"/>
+              <a:rPr lang="en-US" sz="1200" dirty="0"/>
               <a:t>busRequest.xml (new_busRequest.xsd)</a:t>
             </a:r>
           </a:p>
         </p:txBody>
       </p:sp>
+      <p:grpSp>
+        <p:nvGrpSpPr>
+          <p:cNvPr id="19" name="Group 18">
+            <a:extLst>
+              <a:ext uri="{FF2B5EF4-FFF2-40B4-BE49-F238E27FC236}">
+                <a16:creationId xmlns:a16="http://schemas.microsoft.com/office/drawing/2014/main" id="{0178F462-CA38-4F38-9809-B45A2C3C17C6}"/>
+              </a:ext>
+            </a:extLst>
+          </p:cNvPr>
+          <p:cNvGrpSpPr/>
+          <p:nvPr/>
+        </p:nvGrpSpPr>
+        <p:grpSpPr>
+          <a:xfrm>
+            <a:off x="57296" y="-79066"/>
+            <a:ext cx="2630486" cy="1104599"/>
+            <a:chOff x="347107" y="-14577"/>
+            <a:chExt cx="2707280" cy="1136846"/>
+          </a:xfrm>
+        </p:grpSpPr>
+        <p:sp>
+          <p:nvSpPr>
+            <p:cNvPr id="7" name="TextBox 6">
+              <a:extLst>
+                <a:ext uri="{FF2B5EF4-FFF2-40B4-BE49-F238E27FC236}">
+                  <a16:creationId xmlns:a16="http://schemas.microsoft.com/office/drawing/2014/main" id="{1F77A314-7F07-43ED-9FB3-650E3013A58B}"/>
+                </a:ext>
+              </a:extLst>
+            </p:cNvPr>
+            <p:cNvSpPr txBox="1"/>
+            <p:nvPr/>
+          </p:nvSpPr>
+          <p:spPr>
+            <a:xfrm>
+              <a:off x="347107" y="783715"/>
+              <a:ext cx="2707280" cy="338554"/>
+            </a:xfrm>
+            <a:prstGeom prst="rect">
+              <a:avLst/>
+            </a:prstGeom>
+            <a:noFill/>
+          </p:spPr>
+          <p:txBody>
+            <a:bodyPr wrap="none" rtlCol="0">
+              <a:spAutoFit/>
+            </a:bodyPr>
+            <a:lstStyle/>
+            <a:p>
+              <a:r>
+                <a:rPr lang="en-US" sz="1600" dirty="0"/>
+                <a:t>Train </a:t>
+              </a:r>
+              <a:r>
+                <a:rPr lang="en-US" sz="1600" dirty="0" err="1"/>
+                <a:t>Mgmt</a:t>
+              </a:r>
+              <a:r>
+                <a:rPr lang="en-US" sz="1600" dirty="0"/>
+                <a:t> Messaging System</a:t>
+              </a:r>
+            </a:p>
+          </p:txBody>
+        </p:sp>
+        <p:grpSp>
+          <p:nvGrpSpPr>
+            <p:cNvPr id="17" name="Group 16">
+              <a:extLst>
+                <a:ext uri="{FF2B5EF4-FFF2-40B4-BE49-F238E27FC236}">
+                  <a16:creationId xmlns:a16="http://schemas.microsoft.com/office/drawing/2014/main" id="{8808C0F9-46C2-40F8-9F98-076B86331510}"/>
+                </a:ext>
+              </a:extLst>
+            </p:cNvPr>
+            <p:cNvGrpSpPr/>
+            <p:nvPr/>
+          </p:nvGrpSpPr>
+          <p:grpSpPr>
+            <a:xfrm>
+              <a:off x="881192" y="-14577"/>
+              <a:ext cx="1645306" cy="914400"/>
+              <a:chOff x="1012604" y="13734"/>
+              <a:chExt cx="1645306" cy="914400"/>
+            </a:xfrm>
+          </p:grpSpPr>
+          <p:pic>
+            <p:nvPicPr>
+              <p:cNvPr id="6" name="Graphic 5" descr="Computer">
+                <a:extLst>
+                  <a:ext uri="{FF2B5EF4-FFF2-40B4-BE49-F238E27FC236}">
+                    <a16:creationId xmlns:a16="http://schemas.microsoft.com/office/drawing/2014/main" id="{6853ACC9-E91F-474F-A9EB-35A697F18027}"/>
+                  </a:ext>
+                </a:extLst>
+              </p:cNvPr>
+              <p:cNvPicPr>
+                <a:picLocks noChangeAspect="1"/>
+              </p:cNvPicPr>
+              <p:nvPr/>
+            </p:nvPicPr>
+            <p:blipFill>
+              <a:blip r:embed="rId3">
+                <a:extLst>
+                  <a:ext uri="{28A0092B-C50C-407E-A947-70E740481C1C}">
+                    <a14:useLocalDpi xmlns:a14="http://schemas.microsoft.com/office/drawing/2010/main" val="0"/>
+                  </a:ext>
+                  <a:ext uri="{96DAC541-7B7A-43D3-8B79-37D633B846F1}">
+                    <asvg:svgBlip xmlns:asvg="http://schemas.microsoft.com/office/drawing/2016/SVG/main" r:embed="rId4"/>
+                  </a:ext>
+                </a:extLst>
+              </a:blip>
+              <a:stretch>
+                <a:fillRect/>
+              </a:stretch>
+            </p:blipFill>
+            <p:spPr>
+              <a:xfrm>
+                <a:off x="1012604" y="13734"/>
+                <a:ext cx="914400" cy="914400"/>
+              </a:xfrm>
+              <a:prstGeom prst="rect">
+                <a:avLst/>
+              </a:prstGeom>
+            </p:spPr>
+          </p:pic>
+          <p:pic>
+            <p:nvPicPr>
+              <p:cNvPr id="15" name="Picture 14">
+                <a:extLst>
+                  <a:ext uri="{FF2B5EF4-FFF2-40B4-BE49-F238E27FC236}">
+                    <a16:creationId xmlns:a16="http://schemas.microsoft.com/office/drawing/2014/main" id="{E7CC8C3B-F989-4E63-AD36-1A2FF00F5FC6}"/>
+                  </a:ext>
+                </a:extLst>
+              </p:cNvPr>
+              <p:cNvPicPr>
+                <a:picLocks noChangeAspect="1"/>
+              </p:cNvPicPr>
+              <p:nvPr/>
+            </p:nvPicPr>
+            <p:blipFill>
+              <a:blip r:embed="rId11">
+                <a:extLst>
+                  <a:ext uri="{28A0092B-C50C-407E-A947-70E740481C1C}">
+                    <a14:useLocalDpi xmlns:a14="http://schemas.microsoft.com/office/drawing/2010/main" val="0"/>
+                  </a:ext>
+                </a:extLst>
+              </a:blip>
+              <a:stretch>
+                <a:fillRect/>
+              </a:stretch>
+            </p:blipFill>
+            <p:spPr>
+              <a:xfrm>
+                <a:off x="1831903" y="13734"/>
+                <a:ext cx="826007" cy="826007"/>
+              </a:xfrm>
+              <a:prstGeom prst="rect">
+                <a:avLst/>
+              </a:prstGeom>
+            </p:spPr>
+          </p:pic>
+        </p:grpSp>
+      </p:grpSp>
+      <p:pic>
+        <p:nvPicPr>
+          <p:cNvPr id="96" name="Picture 95">
+            <a:extLst>
+              <a:ext uri="{FF2B5EF4-FFF2-40B4-BE49-F238E27FC236}">
+                <a16:creationId xmlns:a16="http://schemas.microsoft.com/office/drawing/2014/main" id="{B83AE1BB-DE3B-494A-A3F9-7DC9099A6F3A}"/>
+              </a:ext>
+            </a:extLst>
+          </p:cNvPr>
+          <p:cNvPicPr>
+            <a:picLocks noChangeAspect="1"/>
+          </p:cNvPicPr>
+          <p:nvPr/>
+        </p:nvPicPr>
+        <p:blipFill>
+          <a:blip r:embed="rId11">
+            <a:extLst>
+              <a:ext uri="{28A0092B-C50C-407E-A947-70E740481C1C}">
+                <a14:useLocalDpi xmlns:a14="http://schemas.microsoft.com/office/drawing/2010/main" val="0"/>
+              </a:ext>
+            </a:extLst>
+          </a:blip>
+          <a:stretch>
+            <a:fillRect/>
+          </a:stretch>
+        </p:blipFill>
+        <p:spPr>
+          <a:xfrm>
+            <a:off x="4468622" y="354186"/>
+            <a:ext cx="802577" cy="802577"/>
+          </a:xfrm>
+          <a:prstGeom prst="rect">
+            <a:avLst/>
+          </a:prstGeom>
+        </p:spPr>
+      </p:pic>
+      <p:pic>
+        <p:nvPicPr>
+          <p:cNvPr id="40" name="Picture 39">
+            <a:extLst>
+              <a:ext uri="{FF2B5EF4-FFF2-40B4-BE49-F238E27FC236}">
+                <a16:creationId xmlns:a16="http://schemas.microsoft.com/office/drawing/2014/main" id="{03FCBB63-BDD0-446C-B047-E83EFCDC97A8}"/>
+              </a:ext>
+            </a:extLst>
+          </p:cNvPr>
+          <p:cNvPicPr>
+            <a:picLocks noChangeAspect="1"/>
+          </p:cNvPicPr>
+          <p:nvPr/>
+        </p:nvPicPr>
+        <p:blipFill>
+          <a:blip r:embed="rId12">
+            <a:extLst>
+              <a:ext uri="{28A0092B-C50C-407E-A947-70E740481C1C}">
+                <a14:useLocalDpi xmlns:a14="http://schemas.microsoft.com/office/drawing/2010/main" val="0"/>
+              </a:ext>
+            </a:extLst>
+          </a:blip>
+          <a:stretch>
+            <a:fillRect/>
+          </a:stretch>
+        </p:blipFill>
+        <p:spPr>
+          <a:xfrm>
+            <a:off x="6125807" y="5550465"/>
+            <a:ext cx="1671308" cy="835654"/>
+          </a:xfrm>
+          <a:prstGeom prst="rect">
+            <a:avLst/>
+          </a:prstGeom>
+        </p:spPr>
+      </p:pic>
+      <p:pic>
+        <p:nvPicPr>
+          <p:cNvPr id="48" name="Picture 47">
+            <a:extLst>
+              <a:ext uri="{FF2B5EF4-FFF2-40B4-BE49-F238E27FC236}">
+                <a16:creationId xmlns:a16="http://schemas.microsoft.com/office/drawing/2014/main" id="{566D78A6-50D9-4728-AAB1-95A89AC335C5}"/>
+              </a:ext>
+            </a:extLst>
+          </p:cNvPr>
+          <p:cNvPicPr>
+            <a:picLocks noChangeAspect="1"/>
+          </p:cNvPicPr>
+          <p:nvPr/>
+        </p:nvPicPr>
+        <p:blipFill>
+          <a:blip r:embed="rId13">
+            <a:extLst>
+              <a:ext uri="{28A0092B-C50C-407E-A947-70E740481C1C}">
+                <a14:useLocalDpi xmlns:a14="http://schemas.microsoft.com/office/drawing/2010/main" val="0"/>
+              </a:ext>
+            </a:extLst>
+          </a:blip>
+          <a:stretch>
+            <a:fillRect/>
+          </a:stretch>
+        </p:blipFill>
+        <p:spPr>
+          <a:xfrm>
+            <a:off x="11308347" y="5992795"/>
+            <a:ext cx="915411" cy="915411"/>
+          </a:xfrm>
+          <a:prstGeom prst="rect">
+            <a:avLst/>
+          </a:prstGeom>
+        </p:spPr>
+      </p:pic>
+      <p:grpSp>
+        <p:nvGrpSpPr>
+          <p:cNvPr id="68" name="Group 67">
+            <a:extLst>
+              <a:ext uri="{FF2B5EF4-FFF2-40B4-BE49-F238E27FC236}">
+                <a16:creationId xmlns:a16="http://schemas.microsoft.com/office/drawing/2014/main" id="{2ED2848E-3EEE-4C32-AAB3-285C6C487E43}"/>
+              </a:ext>
+            </a:extLst>
+          </p:cNvPr>
+          <p:cNvGrpSpPr/>
+          <p:nvPr/>
+        </p:nvGrpSpPr>
+        <p:grpSpPr>
+          <a:xfrm>
+            <a:off x="51672" y="4477040"/>
+            <a:ext cx="1872115" cy="1325797"/>
+            <a:chOff x="493627" y="4858803"/>
+            <a:chExt cx="1872115" cy="1325797"/>
+          </a:xfrm>
+        </p:grpSpPr>
+        <p:grpSp>
+          <p:nvGrpSpPr>
+            <p:cNvPr id="71" name="Group 70">
+              <a:extLst>
+                <a:ext uri="{FF2B5EF4-FFF2-40B4-BE49-F238E27FC236}">
+                  <a16:creationId xmlns:a16="http://schemas.microsoft.com/office/drawing/2014/main" id="{3FC55428-A528-4B9F-8C06-57C2E45E2767}"/>
+                </a:ext>
+              </a:extLst>
+            </p:cNvPr>
+            <p:cNvGrpSpPr/>
+            <p:nvPr/>
+          </p:nvGrpSpPr>
+          <p:grpSpPr>
+            <a:xfrm>
+              <a:off x="493627" y="4858803"/>
+              <a:ext cx="1872115" cy="1325797"/>
+              <a:chOff x="1418126" y="3057410"/>
+              <a:chExt cx="1872115" cy="1325797"/>
+            </a:xfrm>
+          </p:grpSpPr>
+          <p:sp>
+            <p:nvSpPr>
+              <p:cNvPr id="72" name="TextBox 71">
+                <a:extLst>
+                  <a:ext uri="{FF2B5EF4-FFF2-40B4-BE49-F238E27FC236}">
+                    <a16:creationId xmlns:a16="http://schemas.microsoft.com/office/drawing/2014/main" id="{A07C89D9-E262-4A8A-9272-889371116074}"/>
+                  </a:ext>
+                </a:extLst>
+              </p:cNvPr>
+              <p:cNvSpPr txBox="1"/>
+              <p:nvPr/>
+            </p:nvSpPr>
+            <p:spPr>
+              <a:xfrm>
+                <a:off x="1418126" y="3859987"/>
+                <a:ext cx="1872115" cy="523220"/>
+              </a:xfrm>
+              <a:prstGeom prst="rect">
+                <a:avLst/>
+              </a:prstGeom>
+              <a:noFill/>
+            </p:spPr>
+            <p:txBody>
+              <a:bodyPr wrap="none" rtlCol="0">
+                <a:spAutoFit/>
+              </a:bodyPr>
+              <a:lstStyle/>
+              <a:p>
+                <a:pPr algn="ctr"/>
+                <a:r>
+                  <a:rPr lang="en-US" sz="1400" dirty="0"/>
+                  <a:t>Get nearest Bus Depot </a:t>
+                </a:r>
+              </a:p>
+              <a:p>
+                <a:pPr algn="ctr"/>
+                <a:r>
+                  <a:rPr lang="en-US" sz="1400" dirty="0"/>
+                  <a:t>Web Service</a:t>
+                </a:r>
+              </a:p>
+            </p:txBody>
+          </p:sp>
+          <p:pic>
+            <p:nvPicPr>
+              <p:cNvPr id="73" name="Graphic 72" descr="Earth Globe Americas">
+                <a:extLst>
+                  <a:ext uri="{FF2B5EF4-FFF2-40B4-BE49-F238E27FC236}">
+                    <a16:creationId xmlns:a16="http://schemas.microsoft.com/office/drawing/2014/main" id="{FBF02C0D-873E-4CC8-B378-A2129CEFF338}"/>
+                  </a:ext>
+                </a:extLst>
+              </p:cNvPr>
+              <p:cNvPicPr>
+                <a:picLocks noChangeAspect="1"/>
+              </p:cNvPicPr>
+              <p:nvPr/>
+            </p:nvPicPr>
+            <p:blipFill>
+              <a:blip r:embed="rId5">
+                <a:extLst>
+                  <a:ext uri="{28A0092B-C50C-407E-A947-70E740481C1C}">
+                    <a14:useLocalDpi xmlns:a14="http://schemas.microsoft.com/office/drawing/2010/main" val="0"/>
+                  </a:ext>
+                  <a:ext uri="{96DAC541-7B7A-43D3-8B79-37D633B846F1}">
+                    <asvg:svgBlip xmlns:asvg="http://schemas.microsoft.com/office/drawing/2016/SVG/main" r:embed="rId6"/>
+                  </a:ext>
+                </a:extLst>
+              </a:blip>
+              <a:stretch>
+                <a:fillRect/>
+              </a:stretch>
+            </p:blipFill>
+            <p:spPr>
+              <a:xfrm>
+                <a:off x="1592621" y="3057410"/>
+                <a:ext cx="914400" cy="914400"/>
+              </a:xfrm>
+              <a:prstGeom prst="rect">
+                <a:avLst/>
+              </a:prstGeom>
+            </p:spPr>
+          </p:pic>
+        </p:grpSp>
+        <p:pic>
+          <p:nvPicPr>
+            <p:cNvPr id="102" name="Picture 101">
+              <a:extLst>
+                <a:ext uri="{FF2B5EF4-FFF2-40B4-BE49-F238E27FC236}">
+                  <a16:creationId xmlns:a16="http://schemas.microsoft.com/office/drawing/2014/main" id="{066242CB-1568-4176-8CE5-C8B4FC01846D}"/>
+                </a:ext>
+              </a:extLst>
+            </p:cNvPr>
+            <p:cNvPicPr>
+              <a:picLocks noChangeAspect="1"/>
+            </p:cNvPicPr>
+            <p:nvPr/>
+          </p:nvPicPr>
+          <p:blipFill>
+            <a:blip r:embed="rId11">
+              <a:extLst>
+                <a:ext uri="{28A0092B-C50C-407E-A947-70E740481C1C}">
+                  <a14:useLocalDpi xmlns:a14="http://schemas.microsoft.com/office/drawing/2010/main" val="0"/>
+                </a:ext>
+              </a:extLst>
+            </a:blip>
+            <a:stretch>
+              <a:fillRect/>
+            </a:stretch>
+          </p:blipFill>
+          <p:spPr>
+            <a:xfrm>
+              <a:off x="1403964" y="4858803"/>
+              <a:ext cx="802577" cy="802577"/>
+            </a:xfrm>
+            <a:prstGeom prst="rect">
+              <a:avLst/>
+            </a:prstGeom>
+          </p:spPr>
+        </p:pic>
+      </p:grpSp>
+      <p:pic>
+        <p:nvPicPr>
+          <p:cNvPr id="52" name="Picture 51">
+            <a:extLst>
+              <a:ext uri="{FF2B5EF4-FFF2-40B4-BE49-F238E27FC236}">
+                <a16:creationId xmlns:a16="http://schemas.microsoft.com/office/drawing/2014/main" id="{8F8FF822-BDE7-413D-B733-84070E8C3D28}"/>
+              </a:ext>
+            </a:extLst>
+          </p:cNvPr>
+          <p:cNvPicPr>
+            <a:picLocks noChangeAspect="1"/>
+          </p:cNvPicPr>
+          <p:nvPr/>
+        </p:nvPicPr>
+        <p:blipFill>
+          <a:blip r:embed="rId14">
+            <a:extLst>
+              <a:ext uri="{28A0092B-C50C-407E-A947-70E740481C1C}">
+                <a14:useLocalDpi xmlns:a14="http://schemas.microsoft.com/office/drawing/2010/main" val="0"/>
+              </a:ext>
+            </a:extLst>
+          </a:blip>
+          <a:stretch>
+            <a:fillRect/>
+          </a:stretch>
+        </p:blipFill>
+        <p:spPr>
+          <a:xfrm>
+            <a:off x="4607162" y="5719944"/>
+            <a:ext cx="1255211" cy="529542"/>
+          </a:xfrm>
+          <a:prstGeom prst="rect">
+            <a:avLst/>
+          </a:prstGeom>
+        </p:spPr>
+      </p:pic>
+      <p:grpSp>
+        <p:nvGrpSpPr>
+          <p:cNvPr id="88" name="Group 87">
+            <a:extLst>
+              <a:ext uri="{FF2B5EF4-FFF2-40B4-BE49-F238E27FC236}">
+                <a16:creationId xmlns:a16="http://schemas.microsoft.com/office/drawing/2014/main" id="{EF65BAA1-BAB8-4F7B-BA7D-9EE30D8D0E2D}"/>
+              </a:ext>
+            </a:extLst>
+          </p:cNvPr>
+          <p:cNvGrpSpPr/>
+          <p:nvPr/>
+        </p:nvGrpSpPr>
+        <p:grpSpPr>
+          <a:xfrm>
+            <a:off x="1096719" y="5555332"/>
+            <a:ext cx="2148873" cy="1355983"/>
+            <a:chOff x="1891176" y="5287108"/>
+            <a:chExt cx="2148873" cy="1355983"/>
+          </a:xfrm>
+        </p:grpSpPr>
+        <p:grpSp>
+          <p:nvGrpSpPr>
+            <p:cNvPr id="64" name="Group 63">
+              <a:extLst>
+                <a:ext uri="{FF2B5EF4-FFF2-40B4-BE49-F238E27FC236}">
+                  <a16:creationId xmlns:a16="http://schemas.microsoft.com/office/drawing/2014/main" id="{2267A04F-96F7-49C0-B8A3-5DC1B3F707BB}"/>
+                </a:ext>
+              </a:extLst>
+            </p:cNvPr>
+            <p:cNvGrpSpPr/>
+            <p:nvPr/>
+          </p:nvGrpSpPr>
+          <p:grpSpPr>
+            <a:xfrm>
+              <a:off x="1891176" y="5287108"/>
+              <a:ext cx="1907958" cy="1355983"/>
+              <a:chOff x="992602" y="3008431"/>
+              <a:chExt cx="1907958" cy="1355983"/>
+            </a:xfrm>
+          </p:grpSpPr>
+          <p:sp>
+            <p:nvSpPr>
+              <p:cNvPr id="65" name="TextBox 64">
+                <a:extLst>
+                  <a:ext uri="{FF2B5EF4-FFF2-40B4-BE49-F238E27FC236}">
+                    <a16:creationId xmlns:a16="http://schemas.microsoft.com/office/drawing/2014/main" id="{8B3E46FF-3599-4502-857A-A9F7DAD6DB2D}"/>
+                  </a:ext>
+                </a:extLst>
+              </p:cNvPr>
+              <p:cNvSpPr txBox="1"/>
+              <p:nvPr/>
+            </p:nvSpPr>
+            <p:spPr>
+              <a:xfrm>
+                <a:off x="992602" y="3841194"/>
+                <a:ext cx="1907958" cy="523220"/>
+              </a:xfrm>
+              <a:prstGeom prst="rect">
+                <a:avLst/>
+              </a:prstGeom>
+              <a:noFill/>
+            </p:spPr>
+            <p:txBody>
+              <a:bodyPr wrap="none" rtlCol="0">
+                <a:spAutoFit/>
+              </a:bodyPr>
+              <a:lstStyle/>
+              <a:p>
+                <a:pPr algn="ctr"/>
+                <a:r>
+                  <a:rPr lang="en-US" sz="1400" dirty="0"/>
+                  <a:t>Schedule Management </a:t>
+                </a:r>
+              </a:p>
+              <a:p>
+                <a:pPr algn="ctr"/>
+                <a:r>
+                  <a:rPr lang="en-US" sz="1400" dirty="0"/>
+                  <a:t>Web Service (PHP)</a:t>
+                </a:r>
+              </a:p>
+            </p:txBody>
+          </p:sp>
+          <p:pic>
+            <p:nvPicPr>
+              <p:cNvPr id="66" name="Graphic 65" descr="Earth Globe Americas">
+                <a:extLst>
+                  <a:ext uri="{FF2B5EF4-FFF2-40B4-BE49-F238E27FC236}">
+                    <a16:creationId xmlns:a16="http://schemas.microsoft.com/office/drawing/2014/main" id="{7AFFB57A-AA42-4242-B9BC-4BA274D128DA}"/>
+                  </a:ext>
+                </a:extLst>
+              </p:cNvPr>
+              <p:cNvPicPr>
+                <a:picLocks noChangeAspect="1"/>
+              </p:cNvPicPr>
+              <p:nvPr/>
+            </p:nvPicPr>
+            <p:blipFill>
+              <a:blip r:embed="rId5">
+                <a:extLst>
+                  <a:ext uri="{28A0092B-C50C-407E-A947-70E740481C1C}">
+                    <a14:useLocalDpi xmlns:a14="http://schemas.microsoft.com/office/drawing/2010/main" val="0"/>
+                  </a:ext>
+                  <a:ext uri="{96DAC541-7B7A-43D3-8B79-37D633B846F1}">
+                    <asvg:svgBlip xmlns:asvg="http://schemas.microsoft.com/office/drawing/2016/SVG/main" r:embed="rId6"/>
+                  </a:ext>
+                </a:extLst>
+              </a:blip>
+              <a:stretch>
+                <a:fillRect/>
+              </a:stretch>
+            </p:blipFill>
+            <p:spPr>
+              <a:xfrm>
+                <a:off x="1464987" y="3008431"/>
+                <a:ext cx="914400" cy="914400"/>
+              </a:xfrm>
+              <a:prstGeom prst="rect">
+                <a:avLst/>
+              </a:prstGeom>
+            </p:spPr>
+          </p:pic>
+        </p:grpSp>
+        <p:pic>
+          <p:nvPicPr>
+            <p:cNvPr id="76" name="Picture 75">
+              <a:extLst>
+                <a:ext uri="{FF2B5EF4-FFF2-40B4-BE49-F238E27FC236}">
+                  <a16:creationId xmlns:a16="http://schemas.microsoft.com/office/drawing/2014/main" id="{4E2D3EAB-DE34-446D-A72E-0E3C56587257}"/>
+                </a:ext>
+              </a:extLst>
+            </p:cNvPr>
+            <p:cNvPicPr>
+              <a:picLocks noChangeAspect="1"/>
+            </p:cNvPicPr>
+            <p:nvPr/>
+          </p:nvPicPr>
+          <p:blipFill>
+            <a:blip r:embed="rId15">
+              <a:extLst>
+                <a:ext uri="{28A0092B-C50C-407E-A947-70E740481C1C}">
+                  <a14:useLocalDpi xmlns:a14="http://schemas.microsoft.com/office/drawing/2010/main" val="0"/>
+                </a:ext>
+              </a:extLst>
+            </a:blip>
+            <a:stretch>
+              <a:fillRect/>
+            </a:stretch>
+          </p:blipFill>
+          <p:spPr>
+            <a:xfrm>
+              <a:off x="3267559" y="5446151"/>
+              <a:ext cx="772490" cy="529542"/>
+            </a:xfrm>
+            <a:prstGeom prst="rect">
+              <a:avLst/>
+            </a:prstGeom>
+          </p:spPr>
+        </p:pic>
+      </p:grpSp>
+      <p:pic>
+        <p:nvPicPr>
+          <p:cNvPr id="94" name="Picture 93">
+            <a:extLst>
+              <a:ext uri="{FF2B5EF4-FFF2-40B4-BE49-F238E27FC236}">
+                <a16:creationId xmlns:a16="http://schemas.microsoft.com/office/drawing/2014/main" id="{E0D478CB-B89A-4C86-BF92-6CA3E15B285B}"/>
+              </a:ext>
+            </a:extLst>
+          </p:cNvPr>
+          <p:cNvPicPr>
+            <a:picLocks noChangeAspect="1"/>
+          </p:cNvPicPr>
+          <p:nvPr/>
+        </p:nvPicPr>
+        <p:blipFill>
+          <a:blip r:embed="rId16">
+            <a:extLst>
+              <a:ext uri="{28A0092B-C50C-407E-A947-70E740481C1C}">
+                <a14:useLocalDpi xmlns:a14="http://schemas.microsoft.com/office/drawing/2010/main" val="0"/>
+              </a:ext>
+            </a:extLst>
+          </a:blip>
+          <a:stretch>
+            <a:fillRect/>
+          </a:stretch>
+        </p:blipFill>
+        <p:spPr>
+          <a:xfrm>
+            <a:off x="240698" y="5532649"/>
+            <a:ext cx="1343671" cy="959765"/>
+          </a:xfrm>
+          <a:prstGeom prst="rect">
+            <a:avLst/>
+          </a:prstGeom>
+        </p:spPr>
+      </p:pic>
     </p:spTree>
     <p:extLst>
       <p:ext uri="{BB962C8B-B14F-4D97-AF65-F5344CB8AC3E}">

</xml_diff>

<commit_message>
Exported SQL for busdepot and busdepotname, Removed old entry, Updated EI Report, Updated Technical Doc, Renamed TrainAsyncMsgProducer to TrainSyncMsgProducer
+ Exported SQL for busdepot and busdepotname
- Remove old SQL file for busdepot
¬ Renamed TrainMsgAsyncProducer to TrainMsgSyncProducer (It is Sync)
¬ Editted EI Report - updated diagram, added schemas, JMS Queue, Web services
¬ Editted Technical Diagram and slides
</commit_message>
<xml_diff>
--- a/EI Diagrams2.pptx
+++ b/EI Diagrams2.pptx
@@ -5,11 +5,12 @@
     <p:sldMasterId id="2147483672" r:id="rId1"/>
   </p:sldMasterIdLst>
   <p:notesMasterIdLst>
-    <p:notesMasterId r:id="rId4"/>
+    <p:notesMasterId r:id="rId5"/>
   </p:notesMasterIdLst>
   <p:sldIdLst>
     <p:sldId id="258" r:id="rId2"/>
-    <p:sldId id="257" r:id="rId3"/>
+    <p:sldId id="259" r:id="rId3"/>
+    <p:sldId id="257" r:id="rId4"/>
   </p:sldIdLst>
   <p:sldSz cx="12192000" cy="6858000"/>
   <p:notesSz cx="6858000" cy="9144000"/>
@@ -128,8 +129,8 @@
 <pc:chgInfo xmlns:a="http://schemas.openxmlformats.org/drawingml/2006/main" xmlns:r="http://schemas.openxmlformats.org/officeDocument/2006/relationships" xmlns:ac="http://schemas.microsoft.com/office/drawing/2013/main/command" xmlns:pc="http://schemas.microsoft.com/office/powerpoint/2013/main/command">
   <pc:docChgLst>
     <pc:chgData name=" " userId="f0093c6c-aad3-47c8-981f-e49faae5c851" providerId="ADAL" clId="{3552CE5B-0803-49BD-A011-F4C75B92F40C}"/>
-    <pc:docChg chg="undo custSel addSld delSld modSld sldOrd">
-      <pc:chgData name=" " userId="f0093c6c-aad3-47c8-981f-e49faae5c851" providerId="ADAL" clId="{3552CE5B-0803-49BD-A011-F4C75B92F40C}" dt="2018-03-20T15:15:15.490" v="651" actId="478"/>
+    <pc:docChg chg="undo custSel addSld delSld modSld sldOrd modMainMaster">
+      <pc:chgData name=" " userId="f0093c6c-aad3-47c8-981f-e49faae5c851" providerId="ADAL" clId="{3552CE5B-0803-49BD-A011-F4C75B92F40C}" dt="2018-03-21T13:18:13.035" v="1323" actId="1076"/>
       <pc:docMkLst>
         <pc:docMk/>
       </pc:docMkLst>
@@ -140,8 +141,8 @@
           <pc:sldMk cId="3511309819" sldId="256"/>
         </pc:sldMkLst>
       </pc:sldChg>
-      <pc:sldChg chg="addSp delSp modSp add del">
-        <pc:chgData name=" " userId="f0093c6c-aad3-47c8-981f-e49faae5c851" providerId="ADAL" clId="{3552CE5B-0803-49BD-A011-F4C75B92F40C}" dt="2018-03-20T15:15:15.490" v="651" actId="478"/>
+      <pc:sldChg chg="addSp delSp modSp add del setBg">
+        <pc:chgData name=" " userId="f0093c6c-aad3-47c8-981f-e49faae5c851" providerId="ADAL" clId="{3552CE5B-0803-49BD-A011-F4C75B92F40C}" dt="2018-03-21T13:18:13.035" v="1323" actId="1076"/>
         <pc:sldMkLst>
           <pc:docMk/>
           <pc:sldMk cId="576619051" sldId="257"/>
@@ -155,7 +156,7 @@
           </ac:spMkLst>
         </pc:spChg>
         <pc:spChg chg="add mod">
-          <ac:chgData name=" " userId="f0093c6c-aad3-47c8-981f-e49faae5c851" providerId="ADAL" clId="{3552CE5B-0803-49BD-A011-F4C75B92F40C}" dt="2018-03-20T15:09:42.765" v="638" actId="1076"/>
+          <ac:chgData name=" " userId="f0093c6c-aad3-47c8-981f-e49faae5c851" providerId="ADAL" clId="{3552CE5B-0803-49BD-A011-F4C75B92F40C}" dt="2018-03-21T12:28:17.885" v="719" actId="1035"/>
           <ac:spMkLst>
             <pc:docMk/>
             <pc:sldMk cId="576619051" sldId="257"/>
@@ -195,7 +196,31 @@
           </ac:spMkLst>
         </pc:spChg>
         <pc:spChg chg="add mod">
-          <ac:chgData name=" " userId="f0093c6c-aad3-47c8-981f-e49faae5c851" providerId="ADAL" clId="{3552CE5B-0803-49BD-A011-F4C75B92F40C}" dt="2018-03-20T15:10:17.127" v="649" actId="1076"/>
+          <ac:chgData name=" " userId="f0093c6c-aad3-47c8-981f-e49faae5c851" providerId="ADAL" clId="{3552CE5B-0803-49BD-A011-F4C75B92F40C}" dt="2018-03-21T12:31:30.068" v="722" actId="1076"/>
+          <ac:spMkLst>
+            <pc:docMk/>
+            <pc:sldMk cId="576619051" sldId="257"/>
+            <ac:spMk id="86" creationId="{67B06CD6-B30B-433F-B7F9-DFBCAB4C25B7}"/>
+          </ac:spMkLst>
+        </pc:spChg>
+        <pc:spChg chg="add mod">
+          <ac:chgData name=" " userId="f0093c6c-aad3-47c8-981f-e49faae5c851" providerId="ADAL" clId="{3552CE5B-0803-49BD-A011-F4C75B92F40C}" dt="2018-03-21T13:18:13.035" v="1323" actId="1076"/>
+          <ac:spMkLst>
+            <pc:docMk/>
+            <pc:sldMk cId="576619051" sldId="257"/>
+            <ac:spMk id="90" creationId="{A1203CBF-C39E-4F79-B3AB-E4DF753A030D}"/>
+          </ac:spMkLst>
+        </pc:spChg>
+        <pc:spChg chg="add mod">
+          <ac:chgData name=" " userId="f0093c6c-aad3-47c8-981f-e49faae5c851" providerId="ADAL" clId="{3552CE5B-0803-49BD-A011-F4C75B92F40C}" dt="2018-03-21T12:32:53.213" v="752" actId="1076"/>
+          <ac:spMkLst>
+            <pc:docMk/>
+            <pc:sldMk cId="576619051" sldId="257"/>
+            <ac:spMk id="93" creationId="{7D817DD0-38EA-49F7-824C-6B583CCF7067}"/>
+          </ac:spMkLst>
+        </pc:spChg>
+        <pc:spChg chg="add mod">
+          <ac:chgData name=" " userId="f0093c6c-aad3-47c8-981f-e49faae5c851" providerId="ADAL" clId="{3552CE5B-0803-49BD-A011-F4C75B92F40C}" dt="2018-03-21T12:31:38.176" v="724" actId="1076"/>
           <ac:spMkLst>
             <pc:docMk/>
             <pc:sldMk cId="576619051" sldId="257"/>
@@ -226,6 +251,14 @@
             <ac:spMk id="148" creationId="{CCD4D169-0F64-42FC-961F-84D2AD996A12}"/>
           </ac:spMkLst>
         </pc:spChg>
+        <pc:spChg chg="mod">
+          <ac:chgData name=" " userId="f0093c6c-aad3-47c8-981f-e49faae5c851" providerId="ADAL" clId="{3552CE5B-0803-49BD-A011-F4C75B92F40C}" dt="2018-03-21T12:32:12.250" v="740" actId="1076"/>
+          <ac:spMkLst>
+            <pc:docMk/>
+            <pc:sldMk cId="576619051" sldId="257"/>
+            <ac:spMk id="149" creationId="{0253AB35-29F0-465C-B472-8980F74A41D8}"/>
+          </ac:spMkLst>
+        </pc:spChg>
         <pc:grpChg chg="mod">
           <ac:chgData name=" " userId="f0093c6c-aad3-47c8-981f-e49faae5c851" providerId="ADAL" clId="{3552CE5B-0803-49BD-A011-F4C75B92F40C}" dt="2018-03-20T15:04:32.641" v="552" actId="1036"/>
           <ac:grpSpMkLst>
@@ -266,8 +299,16 @@
             <ac:picMk id="15" creationId="{E7CC8C3B-F989-4E63-AD36-1A2FF00F5FC6}"/>
           </ac:picMkLst>
         </pc:picChg>
+        <pc:picChg chg="mod">
+          <ac:chgData name=" " userId="f0093c6c-aad3-47c8-981f-e49faae5c851" providerId="ADAL" clId="{3552CE5B-0803-49BD-A011-F4C75B92F40C}" dt="2018-03-21T12:33:02.021" v="753" actId="1076"/>
+          <ac:picMkLst>
+            <pc:docMk/>
+            <pc:sldMk cId="576619051" sldId="257"/>
+            <ac:picMk id="40" creationId="{03FCBB63-BDD0-446C-B047-E83EFCDC97A8}"/>
+          </ac:picMkLst>
+        </pc:picChg>
         <pc:picChg chg="add del mod">
-          <ac:chgData name=" " userId="f0093c6c-aad3-47c8-981f-e49faae5c851" providerId="ADAL" clId="{3552CE5B-0803-49BD-A011-F4C75B92F40C}" dt="2018-03-20T15:02:23.031" v="482"/>
+          <ac:chgData name=" " userId="f0093c6c-aad3-47c8-981f-e49faae5c851" providerId="ADAL" clId="{3552CE5B-0803-49BD-A011-F4C75B92F40C}" dt="2018-03-20T15:02:23.031" v="482" actId="478"/>
           <ac:picMkLst>
             <pc:docMk/>
             <pc:sldMk cId="576619051" sldId="257"/>
@@ -282,6 +323,38 @@
             <ac:picMk id="94" creationId="{E0D478CB-B89A-4C86-BF92-6CA3E15B285B}"/>
           </ac:picMkLst>
         </pc:picChg>
+        <pc:picChg chg="add mod">
+          <ac:chgData name=" " userId="f0093c6c-aad3-47c8-981f-e49faae5c851" providerId="ADAL" clId="{3552CE5B-0803-49BD-A011-F4C75B92F40C}" dt="2018-03-21T12:34:34.749" v="758" actId="1076"/>
+          <ac:picMkLst>
+            <pc:docMk/>
+            <pc:sldMk cId="576619051" sldId="257"/>
+            <ac:picMk id="1026" creationId="{6F8AB6F2-8D79-4200-B32D-28344E593C12}"/>
+          </ac:picMkLst>
+        </pc:picChg>
+        <pc:cxnChg chg="add mod">
+          <ac:chgData name=" " userId="f0093c6c-aad3-47c8-981f-e49faae5c851" providerId="ADAL" clId="{3552CE5B-0803-49BD-A011-F4C75B92F40C}" dt="2018-03-21T12:28:17.885" v="719" actId="1035"/>
+          <ac:cxnSpMkLst>
+            <pc:docMk/>
+            <pc:sldMk cId="576619051" sldId="257"/>
+            <ac:cxnSpMk id="3" creationId="{6AE1184F-D094-4872-ABF6-91435FFD48EC}"/>
+          </ac:cxnSpMkLst>
+        </pc:cxnChg>
+        <pc:cxnChg chg="add del mod">
+          <ac:chgData name=" " userId="f0093c6c-aad3-47c8-981f-e49faae5c851" providerId="ADAL" clId="{3552CE5B-0803-49BD-A011-F4C75B92F40C}" dt="2018-03-21T12:32:24.449" v="742" actId="478"/>
+          <ac:cxnSpMkLst>
+            <pc:docMk/>
+            <pc:sldMk cId="576619051" sldId="257"/>
+            <ac:cxnSpMk id="8" creationId="{82A347A7-AE91-4DBB-AB64-1C781D885954}"/>
+          </ac:cxnSpMkLst>
+        </pc:cxnChg>
+        <pc:cxnChg chg="add mod">
+          <ac:chgData name=" " userId="f0093c6c-aad3-47c8-981f-e49faae5c851" providerId="ADAL" clId="{3552CE5B-0803-49BD-A011-F4C75B92F40C}" dt="2018-03-21T12:32:35.160" v="744" actId="13822"/>
+          <ac:cxnSpMkLst>
+            <pc:docMk/>
+            <pc:sldMk cId="576619051" sldId="257"/>
+            <ac:cxnSpMk id="12" creationId="{FB635486-18F7-439F-8CC2-E046A366DEAA}"/>
+          </ac:cxnSpMkLst>
+        </pc:cxnChg>
         <pc:cxnChg chg="mod">
           <ac:chgData name=" " userId="f0093c6c-aad3-47c8-981f-e49faae5c851" providerId="ADAL" clId="{3552CE5B-0803-49BD-A011-F4C75B92F40C}" dt="2018-03-20T15:04:33.580" v="556" actId="14100"/>
           <ac:cxnSpMkLst>
@@ -308,13 +381,13 @@
         </pc:cxnChg>
       </pc:sldChg>
       <pc:sldChg chg="addSp delSp modSp add ord setBg">
-        <pc:chgData name=" " userId="f0093c6c-aad3-47c8-981f-e49faae5c851" providerId="ADAL" clId="{3552CE5B-0803-49BD-A011-F4C75B92F40C}" dt="2018-03-20T15:07:00.657" v="635" actId="1076"/>
+        <pc:chgData name=" " userId="f0093c6c-aad3-47c8-981f-e49faae5c851" providerId="ADAL" clId="{3552CE5B-0803-49BD-A011-F4C75B92F40C}" dt="2018-03-21T12:38:58.515" v="1275"/>
         <pc:sldMkLst>
           <pc:docMk/>
           <pc:sldMk cId="2246420157" sldId="258"/>
         </pc:sldMkLst>
         <pc:spChg chg="del">
-          <ac:chgData name=" " userId="f0093c6c-aad3-47c8-981f-e49faae5c851" providerId="ADAL" clId="{3552CE5B-0803-49BD-A011-F4C75B92F40C}" dt="2018-03-20T14:53:30.039" v="7"/>
+          <ac:chgData name=" " userId="f0093c6c-aad3-47c8-981f-e49faae5c851" providerId="ADAL" clId="{3552CE5B-0803-49BD-A011-F4C75B92F40C}" dt="2018-03-20T14:53:30.039" v="7" actId="1076"/>
           <ac:spMkLst>
             <pc:docMk/>
             <pc:sldMk cId="2246420157" sldId="258"/>
@@ -322,7 +395,7 @@
           </ac:spMkLst>
         </pc:spChg>
         <pc:spChg chg="del">
-          <ac:chgData name=" " userId="f0093c6c-aad3-47c8-981f-e49faae5c851" providerId="ADAL" clId="{3552CE5B-0803-49BD-A011-F4C75B92F40C}" dt="2018-03-20T14:53:30.039" v="7"/>
+          <ac:chgData name=" " userId="f0093c6c-aad3-47c8-981f-e49faae5c851" providerId="ADAL" clId="{3552CE5B-0803-49BD-A011-F4C75B92F40C}" dt="2018-03-20T14:53:30.039" v="7" actId="1076"/>
           <ac:spMkLst>
             <pc:docMk/>
             <pc:sldMk cId="2246420157" sldId="258"/>
@@ -330,7 +403,7 @@
           </ac:spMkLst>
         </pc:spChg>
         <pc:spChg chg="add mod">
-          <ac:chgData name=" " userId="f0093c6c-aad3-47c8-981f-e49faae5c851" providerId="ADAL" clId="{3552CE5B-0803-49BD-A011-F4C75B92F40C}" dt="2018-03-20T15:06:22.538" v="575"/>
+          <ac:chgData name=" " userId="f0093c6c-aad3-47c8-981f-e49faae5c851" providerId="ADAL" clId="{3552CE5B-0803-49BD-A011-F4C75B92F40C}" dt="2018-03-20T15:06:22.538" v="575" actId="1076"/>
           <ac:spMkLst>
             <pc:docMk/>
             <pc:sldMk cId="2246420157" sldId="258"/>
@@ -338,7 +411,7 @@
           </ac:spMkLst>
         </pc:spChg>
         <pc:spChg chg="add mod">
-          <ac:chgData name=" " userId="f0093c6c-aad3-47c8-981f-e49faae5c851" providerId="ADAL" clId="{3552CE5B-0803-49BD-A011-F4C75B92F40C}" dt="2018-03-20T15:06:25.194" v="576"/>
+          <ac:chgData name=" " userId="f0093c6c-aad3-47c8-981f-e49faae5c851" providerId="ADAL" clId="{3552CE5B-0803-49BD-A011-F4C75B92F40C}" dt="2018-03-20T15:06:25.194" v="576" actId="1076"/>
           <ac:spMkLst>
             <pc:docMk/>
             <pc:sldMk cId="2246420157" sldId="258"/>
@@ -355,12 +428,130 @@
         </pc:spChg>
       </pc:sldChg>
       <pc:sldChg chg="add del">
-        <pc:chgData name=" " userId="f0093c6c-aad3-47c8-981f-e49faae5c851" providerId="ADAL" clId="{3552CE5B-0803-49BD-A011-F4C75B92F40C}" dt="2018-03-20T14:53:18.049" v="2"/>
+        <pc:chgData name=" " userId="f0093c6c-aad3-47c8-981f-e49faae5c851" providerId="ADAL" clId="{3552CE5B-0803-49BD-A011-F4C75B92F40C}" dt="2018-03-20T14:53:18.049" v="2" actId="478"/>
         <pc:sldMkLst>
           <pc:docMk/>
           <pc:sldMk cId="3650225110" sldId="258"/>
         </pc:sldMkLst>
       </pc:sldChg>
+      <pc:sldChg chg="modSp add setBg">
+        <pc:chgData name=" " userId="f0093c6c-aad3-47c8-981f-e49faae5c851" providerId="ADAL" clId="{3552CE5B-0803-49BD-A011-F4C75B92F40C}" dt="2018-03-21T12:39:51.831" v="1315"/>
+        <pc:sldMkLst>
+          <pc:docMk/>
+          <pc:sldMk cId="3968445112" sldId="259"/>
+        </pc:sldMkLst>
+        <pc:spChg chg="mod">
+          <ac:chgData name=" " userId="f0093c6c-aad3-47c8-981f-e49faae5c851" providerId="ADAL" clId="{3552CE5B-0803-49BD-A011-F4C75B92F40C}" dt="2018-03-21T12:36:38.887" v="766" actId="20577"/>
+          <ac:spMkLst>
+            <pc:docMk/>
+            <pc:sldMk cId="3968445112" sldId="259"/>
+            <ac:spMk id="2" creationId="{88A8A327-822B-4D99-81ED-CB23238E4D54}"/>
+          </ac:spMkLst>
+        </pc:spChg>
+        <pc:spChg chg="mod">
+          <ac:chgData name=" " userId="f0093c6c-aad3-47c8-981f-e49faae5c851" providerId="ADAL" clId="{3552CE5B-0803-49BD-A011-F4C75B92F40C}" dt="2018-03-21T12:39:36.092" v="1313" actId="403"/>
+          <ac:spMkLst>
+            <pc:docMk/>
+            <pc:sldMk cId="3968445112" sldId="259"/>
+            <ac:spMk id="3" creationId="{3A1AC5E1-BB10-48F6-8A6B-D015713626EE}"/>
+          </ac:spMkLst>
+        </pc:spChg>
+      </pc:sldChg>
+      <pc:sldMasterChg chg="setBg modSldLayout">
+        <pc:chgData name=" " userId="f0093c6c-aad3-47c8-981f-e49faae5c851" providerId="ADAL" clId="{3552CE5B-0803-49BD-A011-F4C75B92F40C}" dt="2018-03-21T12:38:58.515" v="1275"/>
+        <pc:sldMasterMkLst>
+          <pc:docMk/>
+          <pc:sldMasterMk cId="3239988813" sldId="2147483672"/>
+        </pc:sldMasterMkLst>
+        <pc:sldLayoutChg chg="setBg">
+          <pc:chgData name=" " userId="f0093c6c-aad3-47c8-981f-e49faae5c851" providerId="ADAL" clId="{3552CE5B-0803-49BD-A011-F4C75B92F40C}" dt="2018-03-21T12:38:58.515" v="1275"/>
+          <pc:sldLayoutMkLst>
+            <pc:docMk/>
+            <pc:sldMasterMk cId="3239988813" sldId="2147483672"/>
+            <pc:sldLayoutMk cId="1737400048" sldId="2147483673"/>
+          </pc:sldLayoutMkLst>
+        </pc:sldLayoutChg>
+        <pc:sldLayoutChg chg="setBg">
+          <pc:chgData name=" " userId="f0093c6c-aad3-47c8-981f-e49faae5c851" providerId="ADAL" clId="{3552CE5B-0803-49BD-A011-F4C75B92F40C}" dt="2018-03-21T12:38:58.515" v="1275"/>
+          <pc:sldLayoutMkLst>
+            <pc:docMk/>
+            <pc:sldMasterMk cId="3239988813" sldId="2147483672"/>
+            <pc:sldLayoutMk cId="3264563842" sldId="2147483674"/>
+          </pc:sldLayoutMkLst>
+        </pc:sldLayoutChg>
+        <pc:sldLayoutChg chg="setBg">
+          <pc:chgData name=" " userId="f0093c6c-aad3-47c8-981f-e49faae5c851" providerId="ADAL" clId="{3552CE5B-0803-49BD-A011-F4C75B92F40C}" dt="2018-03-21T12:38:58.515" v="1275"/>
+          <pc:sldLayoutMkLst>
+            <pc:docMk/>
+            <pc:sldMasterMk cId="3239988813" sldId="2147483672"/>
+            <pc:sldLayoutMk cId="2629879228" sldId="2147483675"/>
+          </pc:sldLayoutMkLst>
+        </pc:sldLayoutChg>
+        <pc:sldLayoutChg chg="setBg">
+          <pc:chgData name=" " userId="f0093c6c-aad3-47c8-981f-e49faae5c851" providerId="ADAL" clId="{3552CE5B-0803-49BD-A011-F4C75B92F40C}" dt="2018-03-21T12:38:58.515" v="1275"/>
+          <pc:sldLayoutMkLst>
+            <pc:docMk/>
+            <pc:sldMasterMk cId="3239988813" sldId="2147483672"/>
+            <pc:sldLayoutMk cId="1400720129" sldId="2147483676"/>
+          </pc:sldLayoutMkLst>
+        </pc:sldLayoutChg>
+        <pc:sldLayoutChg chg="setBg">
+          <pc:chgData name=" " userId="f0093c6c-aad3-47c8-981f-e49faae5c851" providerId="ADAL" clId="{3552CE5B-0803-49BD-A011-F4C75B92F40C}" dt="2018-03-21T12:38:58.515" v="1275"/>
+          <pc:sldLayoutMkLst>
+            <pc:docMk/>
+            <pc:sldMasterMk cId="3239988813" sldId="2147483672"/>
+            <pc:sldLayoutMk cId="4163103587" sldId="2147483677"/>
+          </pc:sldLayoutMkLst>
+        </pc:sldLayoutChg>
+        <pc:sldLayoutChg chg="setBg">
+          <pc:chgData name=" " userId="f0093c6c-aad3-47c8-981f-e49faae5c851" providerId="ADAL" clId="{3552CE5B-0803-49BD-A011-F4C75B92F40C}" dt="2018-03-21T12:38:58.515" v="1275"/>
+          <pc:sldLayoutMkLst>
+            <pc:docMk/>
+            <pc:sldMasterMk cId="3239988813" sldId="2147483672"/>
+            <pc:sldLayoutMk cId="3103399373" sldId="2147483678"/>
+          </pc:sldLayoutMkLst>
+        </pc:sldLayoutChg>
+        <pc:sldLayoutChg chg="setBg">
+          <pc:chgData name=" " userId="f0093c6c-aad3-47c8-981f-e49faae5c851" providerId="ADAL" clId="{3552CE5B-0803-49BD-A011-F4C75B92F40C}" dt="2018-03-21T12:38:58.515" v="1275"/>
+          <pc:sldLayoutMkLst>
+            <pc:docMk/>
+            <pc:sldMasterMk cId="3239988813" sldId="2147483672"/>
+            <pc:sldLayoutMk cId="3117875209" sldId="2147483679"/>
+          </pc:sldLayoutMkLst>
+        </pc:sldLayoutChg>
+        <pc:sldLayoutChg chg="setBg">
+          <pc:chgData name=" " userId="f0093c6c-aad3-47c8-981f-e49faae5c851" providerId="ADAL" clId="{3552CE5B-0803-49BD-A011-F4C75B92F40C}" dt="2018-03-21T12:38:58.515" v="1275"/>
+          <pc:sldLayoutMkLst>
+            <pc:docMk/>
+            <pc:sldMasterMk cId="3239988813" sldId="2147483672"/>
+            <pc:sldLayoutMk cId="1552109605" sldId="2147483680"/>
+          </pc:sldLayoutMkLst>
+        </pc:sldLayoutChg>
+        <pc:sldLayoutChg chg="setBg">
+          <pc:chgData name=" " userId="f0093c6c-aad3-47c8-981f-e49faae5c851" providerId="ADAL" clId="{3552CE5B-0803-49BD-A011-F4C75B92F40C}" dt="2018-03-21T12:38:58.515" v="1275"/>
+          <pc:sldLayoutMkLst>
+            <pc:docMk/>
+            <pc:sldMasterMk cId="3239988813" sldId="2147483672"/>
+            <pc:sldLayoutMk cId="2212630364" sldId="2147483681"/>
+          </pc:sldLayoutMkLst>
+        </pc:sldLayoutChg>
+        <pc:sldLayoutChg chg="setBg">
+          <pc:chgData name=" " userId="f0093c6c-aad3-47c8-981f-e49faae5c851" providerId="ADAL" clId="{3552CE5B-0803-49BD-A011-F4C75B92F40C}" dt="2018-03-21T12:38:58.515" v="1275"/>
+          <pc:sldLayoutMkLst>
+            <pc:docMk/>
+            <pc:sldMasterMk cId="3239988813" sldId="2147483672"/>
+            <pc:sldLayoutMk cId="1846482362" sldId="2147483682"/>
+          </pc:sldLayoutMkLst>
+        </pc:sldLayoutChg>
+        <pc:sldLayoutChg chg="setBg">
+          <pc:chgData name=" " userId="f0093c6c-aad3-47c8-981f-e49faae5c851" providerId="ADAL" clId="{3552CE5B-0803-49BD-A011-F4C75B92F40C}" dt="2018-03-21T12:38:58.515" v="1275"/>
+          <pc:sldLayoutMkLst>
+            <pc:docMk/>
+            <pc:sldMasterMk cId="3239988813" sldId="2147483672"/>
+            <pc:sldLayoutMk cId="47878846" sldId="2147483683"/>
+          </pc:sldLayoutMkLst>
+        </pc:sldLayoutChg>
+      </pc:sldMasterChg>
     </pc:docChg>
   </pc:docChgLst>
   <pc:docChgLst>
@@ -928,7 +1119,7 @@
           <a:p>
             <a:fld id="{2969D29A-BED7-4F52-827A-C7D8A439955D}" type="datetimeFigureOut">
               <a:rPr lang="en-US" smtClean="0"/>
-              <a:t>20-Mar-18</a:t>
+              <a:t>21-Mar-18</a:t>
             </a:fld>
             <a:endParaRPr lang="en-US"/>
           </a:p>
@@ -1260,7 +1451,7 @@
           <a:p>
             <a:fld id="{2ED0950B-CCD5-4407-A111-A6EE205BBF47}" type="slidenum">
               <a:rPr lang="en-US" smtClean="0"/>
-              <a:t>2</a:t>
+              <a:t>3</a:t>
             </a:fld>
             <a:endParaRPr lang="en-US"/>
           </a:p>
@@ -1426,7 +1617,7 @@
           <a:p>
             <a:fld id="{4C7F959B-C76D-4575-9470-CE5E6063DE88}" type="datetimeFigureOut">
               <a:rPr lang="en-US" smtClean="0"/>
-              <a:t>20-Mar-18</a:t>
+              <a:t>21-Mar-18</a:t>
             </a:fld>
             <a:endParaRPr lang="en-US"/>
           </a:p>
@@ -1624,7 +1815,7 @@
           <a:p>
             <a:fld id="{4C7F959B-C76D-4575-9470-CE5E6063DE88}" type="datetimeFigureOut">
               <a:rPr lang="en-US" smtClean="0"/>
-              <a:t>20-Mar-18</a:t>
+              <a:t>21-Mar-18</a:t>
             </a:fld>
             <a:endParaRPr lang="en-US"/>
           </a:p>
@@ -1832,7 +2023,7 @@
           <a:p>
             <a:fld id="{4C7F959B-C76D-4575-9470-CE5E6063DE88}" type="datetimeFigureOut">
               <a:rPr lang="en-US" smtClean="0"/>
-              <a:t>20-Mar-18</a:t>
+              <a:t>21-Mar-18</a:t>
             </a:fld>
             <a:endParaRPr lang="en-US"/>
           </a:p>
@@ -2030,7 +2221,7 @@
           <a:p>
             <a:fld id="{4C7F959B-C76D-4575-9470-CE5E6063DE88}" type="datetimeFigureOut">
               <a:rPr lang="en-US" smtClean="0"/>
-              <a:t>20-Mar-18</a:t>
+              <a:t>21-Mar-18</a:t>
             </a:fld>
             <a:endParaRPr lang="en-US"/>
           </a:p>
@@ -2305,7 +2496,7 @@
           <a:p>
             <a:fld id="{4C7F959B-C76D-4575-9470-CE5E6063DE88}" type="datetimeFigureOut">
               <a:rPr lang="en-US" smtClean="0"/>
-              <a:t>20-Mar-18</a:t>
+              <a:t>21-Mar-18</a:t>
             </a:fld>
             <a:endParaRPr lang="en-US"/>
           </a:p>
@@ -2570,7 +2761,7 @@
           <a:p>
             <a:fld id="{4C7F959B-C76D-4575-9470-CE5E6063DE88}" type="datetimeFigureOut">
               <a:rPr lang="en-US" smtClean="0"/>
-              <a:t>20-Mar-18</a:t>
+              <a:t>21-Mar-18</a:t>
             </a:fld>
             <a:endParaRPr lang="en-US"/>
           </a:p>
@@ -2982,7 +3173,7 @@
           <a:p>
             <a:fld id="{4C7F959B-C76D-4575-9470-CE5E6063DE88}" type="datetimeFigureOut">
               <a:rPr lang="en-US" smtClean="0"/>
-              <a:t>20-Mar-18</a:t>
+              <a:t>21-Mar-18</a:t>
             </a:fld>
             <a:endParaRPr lang="en-US"/>
           </a:p>
@@ -3123,7 +3314,7 @@
           <a:p>
             <a:fld id="{4C7F959B-C76D-4575-9470-CE5E6063DE88}" type="datetimeFigureOut">
               <a:rPr lang="en-US" smtClean="0"/>
-              <a:t>20-Mar-18</a:t>
+              <a:t>21-Mar-18</a:t>
             </a:fld>
             <a:endParaRPr lang="en-US"/>
           </a:p>
@@ -3236,7 +3427,7 @@
           <a:p>
             <a:fld id="{4C7F959B-C76D-4575-9470-CE5E6063DE88}" type="datetimeFigureOut">
               <a:rPr lang="en-US" smtClean="0"/>
-              <a:t>20-Mar-18</a:t>
+              <a:t>21-Mar-18</a:t>
             </a:fld>
             <a:endParaRPr lang="en-US"/>
           </a:p>
@@ -3547,7 +3738,7 @@
           <a:p>
             <a:fld id="{4C7F959B-C76D-4575-9470-CE5E6063DE88}" type="datetimeFigureOut">
               <a:rPr lang="en-US" smtClean="0"/>
-              <a:t>20-Mar-18</a:t>
+              <a:t>21-Mar-18</a:t>
             </a:fld>
             <a:endParaRPr lang="en-US"/>
           </a:p>
@@ -3835,7 +4026,7 @@
           <a:p>
             <a:fld id="{4C7F959B-C76D-4575-9470-CE5E6063DE88}" type="datetimeFigureOut">
               <a:rPr lang="en-US" smtClean="0"/>
-              <a:t>20-Mar-18</a:t>
+              <a:t>21-Mar-18</a:t>
             </a:fld>
             <a:endParaRPr lang="en-US"/>
           </a:p>
@@ -3912,9 +4103,19 @@
 <p:sldMaster xmlns:a="http://schemas.openxmlformats.org/drawingml/2006/main" xmlns:r="http://schemas.openxmlformats.org/officeDocument/2006/relationships" xmlns:p="http://schemas.openxmlformats.org/presentationml/2006/main">
   <p:cSld>
     <p:bg>
-      <p:bgRef idx="1001">
-        <a:schemeClr val="bg1"/>
-      </p:bgRef>
+      <p:bgPr>
+        <a:blipFill dpi="0" rotWithShape="1">
+          <a:blip r:embed="rId13">
+            <a:alphaModFix amt="57000"/>
+            <a:lum/>
+          </a:blip>
+          <a:srcRect/>
+          <a:stretch>
+            <a:fillRect/>
+          </a:stretch>
+        </a:blipFill>
+        <a:effectLst/>
+      </p:bgPr>
     </p:bg>
     <p:spTree>
       <p:nvGrpSpPr>
@@ -4076,7 +4277,7 @@
           <a:p>
             <a:fld id="{4C7F959B-C76D-4575-9470-CE5E6063DE88}" type="datetimeFigureOut">
               <a:rPr lang="en-US" smtClean="0"/>
-              <a:t>20-Mar-18</a:t>
+              <a:t>21-Mar-18</a:t>
             </a:fld>
             <a:endParaRPr lang="en-US"/>
           </a:p>
@@ -4473,7 +4674,7 @@
       </a:lvl9pPr>
     </p:otherStyle>
   </p:txStyles>
-  <p:extLst>
+  <p:extLst mod="1">
     <p:ext uri="{27BBF7A9-308A-43DC-89C8-2F10F3537804}">
       <p15:sldGuideLst xmlns:p15="http://schemas.microsoft.com/office/powerpoint/2012/main"/>
     </p:ext>
@@ -4484,18 +4685,232 @@
 <file path=ppt/slides/slide1.xml><?xml version="1.0" encoding="utf-8"?>
 <p:sld xmlns:a="http://schemas.openxmlformats.org/drawingml/2006/main" xmlns:r="http://schemas.openxmlformats.org/officeDocument/2006/relationships" xmlns:p="http://schemas.openxmlformats.org/presentationml/2006/main">
   <p:cSld>
+    <p:spTree>
+      <p:nvGrpSpPr>
+        <p:cNvPr id="1" name=""/>
+        <p:cNvGrpSpPr/>
+        <p:nvPr/>
+      </p:nvGrpSpPr>
+      <p:grpSpPr>
+        <a:xfrm>
+          <a:off x="0" y="0"/>
+          <a:ext cx="0" cy="0"/>
+          <a:chOff x="0" y="0"/>
+          <a:chExt cx="0" cy="0"/>
+        </a:xfrm>
+      </p:grpSpPr>
+      <p:sp>
+        <p:nvSpPr>
+          <p:cNvPr id="4" name="Title 3">
+            <a:extLst>
+              <a:ext uri="{FF2B5EF4-FFF2-40B4-BE49-F238E27FC236}">
+                <a16:creationId xmlns:a16="http://schemas.microsoft.com/office/drawing/2014/main" id="{297B266B-454F-4384-9299-CAA392AE696C}"/>
+              </a:ext>
+            </a:extLst>
+          </p:cNvPr>
+          <p:cNvSpPr>
+            <a:spLocks noGrp="1"/>
+          </p:cNvSpPr>
+          <p:nvPr>
+            <p:ph type="ctrTitle"/>
+          </p:nvPr>
+        </p:nvSpPr>
+        <p:spPr>
+          <a:xfrm>
+            <a:off x="1398104" y="1464365"/>
+            <a:ext cx="9144000" cy="1623792"/>
+          </a:xfrm>
+          <a:solidFill>
+            <a:schemeClr val="bg1">
+              <a:alpha val="58000"/>
+            </a:schemeClr>
+          </a:solidFill>
+        </p:spPr>
+        <p:txBody>
+          <a:bodyPr/>
+          <a:lstStyle/>
+          <a:p>
+            <a:r>
+              <a:rPr lang="en-US" sz="4800" dirty="0">
+                <a:latin typeface="+mn-lt"/>
+              </a:rPr>
+              <a:t>EI Project Demonstration:</a:t>
+            </a:r>
+            <a:br>
+              <a:rPr lang="en-US" sz="4800" dirty="0">
+                <a:latin typeface="+mn-lt"/>
+              </a:rPr>
+            </a:br>
+            <a:r>
+              <a:rPr lang="en-US" sz="4800" dirty="0">
+                <a:latin typeface="+mn-lt"/>
+              </a:rPr>
+              <a:t>Public Transport System</a:t>
+            </a:r>
+          </a:p>
+        </p:txBody>
+      </p:sp>
+      <p:sp>
+        <p:nvSpPr>
+          <p:cNvPr id="5" name="Subtitle 4">
+            <a:extLst>
+              <a:ext uri="{FF2B5EF4-FFF2-40B4-BE49-F238E27FC236}">
+                <a16:creationId xmlns:a16="http://schemas.microsoft.com/office/drawing/2014/main" id="{8BBE39C0-6495-4183-BFB1-9BFE1FCE1A8D}"/>
+              </a:ext>
+            </a:extLst>
+          </p:cNvPr>
+          <p:cNvSpPr>
+            <a:spLocks noGrp="1"/>
+          </p:cNvSpPr>
+          <p:nvPr>
+            <p:ph type="subTitle" idx="1"/>
+          </p:nvPr>
+        </p:nvSpPr>
+        <p:spPr>
+          <a:xfrm>
+            <a:off x="2845905" y="3230976"/>
+            <a:ext cx="6500191" cy="2361441"/>
+          </a:xfrm>
+          <a:solidFill>
+            <a:schemeClr val="bg1">
+              <a:alpha val="36000"/>
+            </a:schemeClr>
+          </a:solidFill>
+        </p:spPr>
+        <p:txBody>
+          <a:bodyPr>
+            <a:normAutofit/>
+          </a:bodyPr>
+          <a:lstStyle/>
+          <a:p>
+            <a:r>
+              <a:rPr lang="en-US" dirty="0"/>
+              <a:t>Group 3</a:t>
+            </a:r>
+          </a:p>
+          <a:p>
+            <a:r>
+              <a:rPr lang="en-US" sz="2000" dirty="0"/>
+              <a:t>Eugene Choy Wen Jia</a:t>
+            </a:r>
+            <a:br>
+              <a:rPr lang="en-US" sz="2000" dirty="0"/>
+            </a:br>
+            <a:r>
+              <a:rPr lang="en-US" sz="2000" dirty="0"/>
+              <a:t>Ho Min Kit Winston</a:t>
+            </a:r>
+            <a:br>
+              <a:rPr lang="en-US" sz="2000" dirty="0"/>
+            </a:br>
+            <a:r>
+              <a:rPr lang="en-US" sz="2000" dirty="0"/>
+              <a:t>Ho Wei Hong</a:t>
+            </a:r>
+            <a:br>
+              <a:rPr lang="en-US" sz="2000" dirty="0"/>
+            </a:br>
+            <a:r>
+              <a:rPr lang="en-US" sz="2000" dirty="0"/>
+              <a:t>Sim Li Jin</a:t>
+            </a:r>
+            <a:br>
+              <a:rPr lang="en-US" sz="2000" dirty="0"/>
+            </a:br>
+            <a:r>
+              <a:rPr lang="en-US" sz="2000" dirty="0"/>
+              <a:t>Yin Yukun</a:t>
+            </a:r>
+            <a:br>
+              <a:rPr lang="en-US" sz="2000" dirty="0"/>
+            </a:br>
+            <a:r>
+              <a:rPr lang="en-US" sz="2000" dirty="0"/>
+              <a:t>Yong Fu Xiang</a:t>
+            </a:r>
+          </a:p>
+          <a:p>
+            <a:endParaRPr lang="en-US" dirty="0"/>
+          </a:p>
+        </p:txBody>
+      </p:sp>
+      <p:sp>
+        <p:nvSpPr>
+          <p:cNvPr id="6" name="TextBox 5">
+            <a:extLst>
+              <a:ext uri="{FF2B5EF4-FFF2-40B4-BE49-F238E27FC236}">
+                <a16:creationId xmlns:a16="http://schemas.microsoft.com/office/drawing/2014/main" id="{B7A83288-CB94-4DEC-93DC-003FE99C71B6}"/>
+              </a:ext>
+            </a:extLst>
+          </p:cNvPr>
+          <p:cNvSpPr txBox="1"/>
+          <p:nvPr/>
+        </p:nvSpPr>
+        <p:spPr>
+          <a:xfrm>
+            <a:off x="0" y="6657945"/>
+            <a:ext cx="2040943" cy="200055"/>
+          </a:xfrm>
+          <a:prstGeom prst="rect">
+            <a:avLst/>
+          </a:prstGeom>
+          <a:noFill/>
+        </p:spPr>
+        <p:txBody>
+          <a:bodyPr wrap="none" rtlCol="0">
+            <a:spAutoFit/>
+          </a:bodyPr>
+          <a:lstStyle/>
+          <a:p>
+            <a:r>
+              <a:rPr lang="en-US" sz="700" dirty="0">
+                <a:solidFill>
+                  <a:schemeClr val="bg1"/>
+                </a:solidFill>
+              </a:rPr>
+              <a:t>Image retrieved from </a:t>
+            </a:r>
+            <a:r>
+              <a:rPr lang="en-US" sz="700" dirty="0">
+                <a:solidFill>
+                  <a:schemeClr val="bg1"/>
+                </a:solidFill>
+                <a:hlinkClick r:id="rId2"/>
+              </a:rPr>
+              <a:t>www.travelweekly-asia.com</a:t>
+            </a:r>
+            <a:r>
+              <a:rPr lang="en-US" sz="700" dirty="0">
+                <a:solidFill>
+                  <a:schemeClr val="bg1"/>
+                </a:solidFill>
+              </a:rPr>
+              <a:t> </a:t>
+            </a:r>
+          </a:p>
+        </p:txBody>
+      </p:sp>
+    </p:spTree>
+    <p:extLst>
+      <p:ext uri="{BB962C8B-B14F-4D97-AF65-F5344CB8AC3E}">
+        <p14:creationId xmlns:p14="http://schemas.microsoft.com/office/powerpoint/2010/main" val="2246420157"/>
+      </p:ext>
+    </p:extLst>
+  </p:cSld>
+  <p:clrMapOvr>
+    <a:masterClrMapping/>
+  </p:clrMapOvr>
+</p:sld>
+</file>
+
+<file path=ppt/slides/slide2.xml><?xml version="1.0" encoding="utf-8"?>
+<p:sld xmlns:a="http://schemas.openxmlformats.org/drawingml/2006/main" xmlns:r="http://schemas.openxmlformats.org/officeDocument/2006/relationships" xmlns:p="http://schemas.openxmlformats.org/presentationml/2006/main">
+  <p:cSld>
     <p:bg>
       <p:bgPr>
-        <a:blipFill dpi="0" rotWithShape="1">
-          <a:blip r:embed="rId2">
-            <a:alphaModFix amt="57000"/>
-            <a:lum/>
-          </a:blip>
-          <a:srcRect/>
-          <a:stretch>
-            <a:fillRect/>
-          </a:stretch>
-        </a:blipFill>
+        <a:solidFill>
+          <a:schemeClr val="bg1"/>
+        </a:solidFill>
         <a:effectLst/>
       </p:bgPr>
     </p:bg>
@@ -4515,10 +4930,10 @@
       </p:grpSpPr>
       <p:sp>
         <p:nvSpPr>
-          <p:cNvPr id="4" name="Title 3">
-            <a:extLst>
-              <a:ext uri="{FF2B5EF4-FFF2-40B4-BE49-F238E27FC236}">
-                <a16:creationId xmlns:a16="http://schemas.microsoft.com/office/drawing/2014/main" id="{297B266B-454F-4384-9299-CAA392AE696C}"/>
+          <p:cNvPr id="2" name="Title 1">
+            <a:extLst>
+              <a:ext uri="{FF2B5EF4-FFF2-40B4-BE49-F238E27FC236}">
+                <a16:creationId xmlns:a16="http://schemas.microsoft.com/office/drawing/2014/main" id="{88A8A327-822B-4D99-81ED-CB23238E4D54}"/>
               </a:ext>
             </a:extLst>
           </p:cNvPr>
@@ -4526,50 +4941,28 @@
             <a:spLocks noGrp="1"/>
           </p:cNvSpPr>
           <p:nvPr>
-            <p:ph type="ctrTitle"/>
+            <p:ph type="title"/>
           </p:nvPr>
         </p:nvSpPr>
-        <p:spPr>
-          <a:xfrm>
-            <a:off x="1398104" y="1464365"/>
-            <a:ext cx="9144000" cy="1623792"/>
-          </a:xfrm>
-          <a:solidFill>
-            <a:schemeClr val="bg1">
-              <a:alpha val="58000"/>
-            </a:schemeClr>
-          </a:solidFill>
-        </p:spPr>
+        <p:spPr/>
         <p:txBody>
           <a:bodyPr/>
           <a:lstStyle/>
           <a:p>
             <a:r>
-              <a:rPr lang="en-US" sz="4800" dirty="0">
-                <a:latin typeface="+mn-lt"/>
-              </a:rPr>
-              <a:t>EI Project Demonstration:</a:t>
-            </a:r>
-            <a:br>
-              <a:rPr lang="en-US" sz="4800" dirty="0">
-                <a:latin typeface="+mn-lt"/>
-              </a:rPr>
-            </a:br>
-            <a:r>
-              <a:rPr lang="en-US" sz="4800" dirty="0">
-                <a:latin typeface="+mn-lt"/>
-              </a:rPr>
-              <a:t>Public Transport System</a:t>
-            </a:r>
-          </a:p>
-        </p:txBody>
-      </p:sp>
-      <p:sp>
-        <p:nvSpPr>
-          <p:cNvPr id="5" name="Subtitle 4">
-            <a:extLst>
-              <a:ext uri="{FF2B5EF4-FFF2-40B4-BE49-F238E27FC236}">
-                <a16:creationId xmlns:a16="http://schemas.microsoft.com/office/drawing/2014/main" id="{8BBE39C0-6495-4183-BFB1-9BFE1FCE1A8D}"/>
+              <a:rPr lang="en-SG" dirty="0"/>
+              <a:t>Scenario</a:t>
+            </a:r>
+            <a:endParaRPr lang="en-US" dirty="0"/>
+          </a:p>
+        </p:txBody>
+      </p:sp>
+      <p:sp>
+        <p:nvSpPr>
+          <p:cNvPr id="3" name="Content Placeholder 2">
+            <a:extLst>
+              <a:ext uri="{FF2B5EF4-FFF2-40B4-BE49-F238E27FC236}">
+                <a16:creationId xmlns:a16="http://schemas.microsoft.com/office/drawing/2014/main" id="{3A1AC5E1-BB10-48F6-8A6B-D015713626EE}"/>
               </a:ext>
             </a:extLst>
           </p:cNvPr>
@@ -4577,137 +4970,49 @@
             <a:spLocks noGrp="1"/>
           </p:cNvSpPr>
           <p:nvPr>
-            <p:ph type="subTitle" idx="1"/>
+            <p:ph idx="1"/>
           </p:nvPr>
         </p:nvSpPr>
-        <p:spPr>
-          <a:xfrm>
-            <a:off x="2845905" y="3230976"/>
-            <a:ext cx="6500191" cy="2361441"/>
-          </a:xfrm>
-          <a:solidFill>
-            <a:schemeClr val="bg1">
-              <a:alpha val="36000"/>
-            </a:schemeClr>
-          </a:solidFill>
-        </p:spPr>
-        <p:txBody>
-          <a:bodyPr>
-            <a:normAutofit/>
-          </a:bodyPr>
+        <p:spPr/>
+        <p:txBody>
+          <a:bodyPr/>
           <a:lstStyle/>
           <a:p>
-            <a:r>
-              <a:rPr lang="en-US" dirty="0"/>
-              <a:t>Group 3</a:t>
-            </a:r>
-          </a:p>
-          <a:p>
-            <a:r>
-              <a:rPr lang="en-US" sz="2000" dirty="0"/>
-              <a:t>Eugene Choy Wen Jia</a:t>
-            </a:r>
-            <a:br>
-              <a:rPr lang="en-US" sz="2000" dirty="0"/>
-            </a:br>
-            <a:r>
-              <a:rPr lang="en-US" sz="2000" dirty="0"/>
-              <a:t>Ho Min Kit Winston</a:t>
-            </a:r>
-            <a:br>
-              <a:rPr lang="en-US" sz="2000" dirty="0"/>
-            </a:br>
-            <a:r>
-              <a:rPr lang="en-US" sz="2000" dirty="0"/>
-              <a:t>Ho Wei Hong</a:t>
-            </a:r>
-            <a:br>
-              <a:rPr lang="en-US" sz="2000" dirty="0"/>
-            </a:br>
-            <a:r>
-              <a:rPr lang="en-US" sz="2000" dirty="0"/>
-              <a:t>Sim Li Jin</a:t>
-            </a:r>
-            <a:br>
-              <a:rPr lang="en-US" sz="2000" dirty="0"/>
-            </a:br>
-            <a:r>
-              <a:rPr lang="en-US" sz="2000" dirty="0"/>
-              <a:t>Yin Yukun</a:t>
-            </a:r>
-            <a:br>
-              <a:rPr lang="en-US" sz="2000" dirty="0"/>
-            </a:br>
-            <a:r>
-              <a:rPr lang="en-US" sz="2000" dirty="0"/>
-              <a:t>Yong Fu Xiang</a:t>
-            </a:r>
-          </a:p>
-          <a:p>
-            <a:endParaRPr lang="en-US" dirty="0"/>
-          </a:p>
-        </p:txBody>
-      </p:sp>
-      <p:sp>
-        <p:nvSpPr>
-          <p:cNvPr id="6" name="TextBox 5">
-            <a:extLst>
-              <a:ext uri="{FF2B5EF4-FFF2-40B4-BE49-F238E27FC236}">
-                <a16:creationId xmlns:a16="http://schemas.microsoft.com/office/drawing/2014/main" id="{B7A83288-CB94-4DEC-93DC-003FE99C71B6}"/>
-              </a:ext>
-            </a:extLst>
-          </p:cNvPr>
-          <p:cNvSpPr txBox="1"/>
-          <p:nvPr/>
-        </p:nvSpPr>
-        <p:spPr>
-          <a:xfrm>
-            <a:off x="0" y="6657945"/>
-            <a:ext cx="2040943" cy="200055"/>
-          </a:xfrm>
-          <a:prstGeom prst="rect">
-            <a:avLst/>
-          </a:prstGeom>
-          <a:noFill/>
-        </p:spPr>
-        <p:txBody>
-          <a:bodyPr wrap="none" rtlCol="0">
-            <a:spAutoFit/>
-          </a:bodyPr>
-          <a:lstStyle/>
-          <a:p>
-            <a:r>
-              <a:rPr lang="en-US" sz="700" dirty="0">
-                <a:solidFill>
-                  <a:schemeClr val="bg1"/>
-                </a:solidFill>
-              </a:rPr>
-              <a:t>Image retrieved from </a:t>
-            </a:r>
-            <a:r>
-              <a:rPr lang="en-US" sz="700" dirty="0">
-                <a:solidFill>
-                  <a:schemeClr val="bg1"/>
-                </a:solidFill>
-                <a:hlinkClick r:id="rId3"/>
-              </a:rPr>
-              <a:t>www.travelweekly-asia.com</a:t>
-            </a:r>
-            <a:r>
-              <a:rPr lang="en-US" sz="700" dirty="0">
-                <a:solidFill>
-                  <a:schemeClr val="bg1"/>
-                </a:solidFill>
-              </a:rPr>
-              <a:t> </a:t>
-            </a:r>
+            <a:pPr marL="0" indent="0" algn="just">
+              <a:buNone/>
+            </a:pPr>
+            <a:r>
+              <a:rPr lang="en-SG" sz="3200" dirty="0"/>
+              <a:t>Public Transport network serves hundred of thousands of passengers everyday. Any disruption in the service would require mitigation actions to be taken to ensure minimal disruptions to the passengers.</a:t>
+            </a:r>
+          </a:p>
+          <a:p>
+            <a:pPr marL="0" indent="0" algn="just">
+              <a:buNone/>
+            </a:pPr>
+            <a:endParaRPr lang="en-SG" sz="3200" dirty="0"/>
+          </a:p>
+          <a:p>
+            <a:pPr marL="0" indent="0" algn="just">
+              <a:buNone/>
+            </a:pPr>
+            <a:r>
+              <a:rPr lang="en-SG" sz="3200" dirty="0"/>
+              <a:t>An well-integrated public transport network with the various stakeholders will help enhance the communication and automate processes when mitigation actions are required</a:t>
+            </a:r>
+          </a:p>
+          <a:p>
+            <a:pPr marL="0" indent="0">
+              <a:buNone/>
+            </a:pPr>
+            <a:endParaRPr lang="en-SG" dirty="0"/>
           </a:p>
         </p:txBody>
       </p:sp>
     </p:spTree>
     <p:extLst>
       <p:ext uri="{BB962C8B-B14F-4D97-AF65-F5344CB8AC3E}">
-        <p14:creationId xmlns:p14="http://schemas.microsoft.com/office/powerpoint/2010/main" val="2246420157"/>
+        <p14:creationId xmlns:p14="http://schemas.microsoft.com/office/powerpoint/2010/main" val="3968445112"/>
       </p:ext>
     </p:extLst>
   </p:cSld>
@@ -4717,9 +5022,17 @@
 </p:sld>
 </file>
 
-<file path=ppt/slides/slide2.xml><?xml version="1.0" encoding="utf-8"?>
+<file path=ppt/slides/slide3.xml><?xml version="1.0" encoding="utf-8"?>
 <p:sld xmlns:a="http://schemas.openxmlformats.org/drawingml/2006/main" xmlns:r="http://schemas.openxmlformats.org/officeDocument/2006/relationships" xmlns:p="http://schemas.openxmlformats.org/presentationml/2006/main">
   <p:cSld>
+    <p:bg>
+      <p:bgPr>
+        <a:solidFill>
+          <a:schemeClr val="bg1"/>
+        </a:solidFill>
+        <a:effectLst/>
+      </p:bgPr>
+    </p:bg>
     <p:spTree>
       <p:nvGrpSpPr>
         <p:cNvPr id="1" name=""/>
@@ -6913,7 +7226,7 @@
         </p:nvSpPr>
         <p:spPr>
           <a:xfrm>
-            <a:off x="6692433" y="1871896"/>
+            <a:off x="6691075" y="1694628"/>
             <a:ext cx="1714572" cy="523220"/>
           </a:xfrm>
           <a:prstGeom prst="rect">
@@ -7343,7 +7656,7 @@
         </p:blipFill>
         <p:spPr>
           <a:xfrm>
-            <a:off x="6125807" y="5550465"/>
+            <a:off x="6222628" y="5531376"/>
             <a:ext cx="1671308" cy="835654"/>
           </a:xfrm>
           <a:prstGeom prst="rect">
@@ -7793,7 +8106,7 @@
         </p:nvSpPr>
         <p:spPr>
           <a:xfrm>
-            <a:off x="1111722" y="4620989"/>
+            <a:off x="825241" y="4481858"/>
             <a:ext cx="491425" cy="564368"/>
           </a:xfrm>
           <a:prstGeom prst="flowChartMagneticDisk">
@@ -7839,7 +8152,7 @@
         </p:nvSpPr>
         <p:spPr>
           <a:xfrm>
-            <a:off x="904906" y="5168931"/>
+            <a:off x="659577" y="5046226"/>
             <a:ext cx="878767" cy="307777"/>
           </a:xfrm>
           <a:prstGeom prst="rect">
@@ -7861,6 +8174,254 @@
           </a:p>
         </p:txBody>
       </p:sp>
+      <p:cxnSp>
+        <p:nvCxnSpPr>
+          <p:cNvPr id="3" name="Straight Arrow Connector 2">
+            <a:extLst>
+              <a:ext uri="{FF2B5EF4-FFF2-40B4-BE49-F238E27FC236}">
+                <a16:creationId xmlns:a16="http://schemas.microsoft.com/office/drawing/2014/main" id="{6AE1184F-D094-4872-ABF6-91435FFD48EC}"/>
+              </a:ext>
+            </a:extLst>
+          </p:cNvPr>
+          <p:cNvCxnSpPr>
+            <a:stCxn id="73" idx="1"/>
+            <a:endCxn id="22" idx="4"/>
+          </p:cNvCxnSpPr>
+          <p:nvPr/>
+        </p:nvCxnSpPr>
+        <p:spPr>
+          <a:xfrm flipH="1" flipV="1">
+            <a:off x="1316666" y="4764042"/>
+            <a:ext cx="1038685" cy="3284"/>
+          </a:xfrm>
+          <a:prstGeom prst="straightConnector1">
+            <a:avLst/>
+          </a:prstGeom>
+          <a:ln>
+            <a:tailEnd type="triangle"/>
+          </a:ln>
+        </p:spPr>
+        <p:style>
+          <a:lnRef idx="1">
+            <a:schemeClr val="dk1"/>
+          </a:lnRef>
+          <a:fillRef idx="0">
+            <a:schemeClr val="dk1"/>
+          </a:fillRef>
+          <a:effectRef idx="0">
+            <a:schemeClr val="dk1"/>
+          </a:effectRef>
+          <a:fontRef idx="minor">
+            <a:schemeClr val="tx1"/>
+          </a:fontRef>
+        </p:style>
+      </p:cxnSp>
+      <p:sp>
+        <p:nvSpPr>
+          <p:cNvPr id="86" name="Flowchart: Magnetic Disk 85">
+            <a:extLst>
+              <a:ext uri="{FF2B5EF4-FFF2-40B4-BE49-F238E27FC236}">
+                <a16:creationId xmlns:a16="http://schemas.microsoft.com/office/drawing/2014/main" id="{67B06CD6-B30B-433F-B7F9-DFBCAB4C25B7}"/>
+              </a:ext>
+            </a:extLst>
+          </p:cNvPr>
+          <p:cNvSpPr/>
+          <p:nvPr/>
+        </p:nvSpPr>
+        <p:spPr>
+          <a:xfrm>
+            <a:off x="8884513" y="1932426"/>
+            <a:ext cx="491425" cy="564368"/>
+          </a:xfrm>
+          <a:prstGeom prst="flowChartMagneticDisk">
+            <a:avLst/>
+          </a:prstGeom>
+        </p:spPr>
+        <p:style>
+          <a:lnRef idx="2">
+            <a:schemeClr val="accent3">
+              <a:shade val="50000"/>
+            </a:schemeClr>
+          </a:lnRef>
+          <a:fillRef idx="1">
+            <a:schemeClr val="accent3"/>
+          </a:fillRef>
+          <a:effectRef idx="0">
+            <a:schemeClr val="accent3"/>
+          </a:effectRef>
+          <a:fontRef idx="minor">
+            <a:schemeClr val="lt1"/>
+          </a:fontRef>
+        </p:style>
+        <p:txBody>
+          <a:bodyPr rtlCol="0" anchor="ctr"/>
+          <a:lstStyle/>
+          <a:p>
+            <a:pPr algn="ctr"/>
+            <a:endParaRPr lang="en-US"/>
+          </a:p>
+        </p:txBody>
+      </p:sp>
+      <p:sp>
+        <p:nvSpPr>
+          <p:cNvPr id="90" name="TextBox 89">
+            <a:extLst>
+              <a:ext uri="{FF2B5EF4-FFF2-40B4-BE49-F238E27FC236}">
+                <a16:creationId xmlns:a16="http://schemas.microsoft.com/office/drawing/2014/main" id="{A1203CBF-C39E-4F79-B3AB-E4DF753A030D}"/>
+              </a:ext>
+            </a:extLst>
+          </p:cNvPr>
+          <p:cNvSpPr txBox="1"/>
+          <p:nvPr/>
+        </p:nvSpPr>
+        <p:spPr>
+          <a:xfrm>
+            <a:off x="8464302" y="2486147"/>
+            <a:ext cx="1292341" cy="307777"/>
+          </a:xfrm>
+          <a:prstGeom prst="rect">
+            <a:avLst/>
+          </a:prstGeom>
+          <a:noFill/>
+        </p:spPr>
+        <p:txBody>
+          <a:bodyPr wrap="none" rtlCol="0">
+            <a:spAutoFit/>
+          </a:bodyPr>
+          <a:lstStyle/>
+          <a:p>
+            <a:r>
+              <a:rPr lang="en-US" sz="1400" dirty="0" err="1"/>
+              <a:t>busdepotname</a:t>
+            </a:r>
+            <a:endParaRPr lang="en-US" sz="1400" dirty="0"/>
+          </a:p>
+        </p:txBody>
+      </p:sp>
+      <p:cxnSp>
+        <p:nvCxnSpPr>
+          <p:cNvPr id="12" name="Connector: Elbow 11">
+            <a:extLst>
+              <a:ext uri="{FF2B5EF4-FFF2-40B4-BE49-F238E27FC236}">
+                <a16:creationId xmlns:a16="http://schemas.microsoft.com/office/drawing/2014/main" id="{FB635486-18F7-439F-8CC2-E046A366DEAA}"/>
+              </a:ext>
+            </a:extLst>
+          </p:cNvPr>
+          <p:cNvCxnSpPr>
+            <a:stCxn id="86" idx="2"/>
+          </p:cNvCxnSpPr>
+          <p:nvPr/>
+        </p:nvCxnSpPr>
+        <p:spPr>
+          <a:xfrm rot="10800000" flipV="1">
+            <a:off x="7066013" y="2214610"/>
+            <a:ext cx="1818501" cy="599910"/>
+          </a:xfrm>
+          <a:prstGeom prst="bentConnector3">
+            <a:avLst/>
+          </a:prstGeom>
+          <a:ln>
+            <a:tailEnd type="triangle"/>
+          </a:ln>
+        </p:spPr>
+        <p:style>
+          <a:lnRef idx="1">
+            <a:schemeClr val="dk1"/>
+          </a:lnRef>
+          <a:fillRef idx="0">
+            <a:schemeClr val="dk1"/>
+          </a:fillRef>
+          <a:effectRef idx="0">
+            <a:schemeClr val="dk1"/>
+          </a:effectRef>
+          <a:fontRef idx="minor">
+            <a:schemeClr val="tx1"/>
+          </a:fontRef>
+        </p:style>
+      </p:cxnSp>
+      <p:sp>
+        <p:nvSpPr>
+          <p:cNvPr id="93" name="TextBox 92">
+            <a:extLst>
+              <a:ext uri="{FF2B5EF4-FFF2-40B4-BE49-F238E27FC236}">
+                <a16:creationId xmlns:a16="http://schemas.microsoft.com/office/drawing/2014/main" id="{7D817DD0-38EA-49F7-824C-6B583CCF7067}"/>
+              </a:ext>
+            </a:extLst>
+          </p:cNvPr>
+          <p:cNvSpPr txBox="1"/>
+          <p:nvPr/>
+        </p:nvSpPr>
+        <p:spPr>
+          <a:xfrm>
+            <a:off x="7395081" y="2537865"/>
+            <a:ext cx="498855" cy="307777"/>
+          </a:xfrm>
+          <a:prstGeom prst="rect">
+            <a:avLst/>
+          </a:prstGeom>
+          <a:noFill/>
+        </p:spPr>
+        <p:txBody>
+          <a:bodyPr wrap="none" rtlCol="0">
+            <a:spAutoFit/>
+          </a:bodyPr>
+          <a:lstStyle/>
+          <a:p>
+            <a:r>
+              <a:rPr lang="en-US" sz="1400" b="1" dirty="0" err="1"/>
+              <a:t>jdbc</a:t>
+            </a:r>
+            <a:endParaRPr lang="en-US" sz="1400" b="1" dirty="0"/>
+          </a:p>
+        </p:txBody>
+      </p:sp>
+      <p:pic>
+        <p:nvPicPr>
+          <p:cNvPr id="1026" name="Picture 2" descr="Image result for gmail logo">
+            <a:extLst>
+              <a:ext uri="{FF2B5EF4-FFF2-40B4-BE49-F238E27FC236}">
+                <a16:creationId xmlns:a16="http://schemas.microsoft.com/office/drawing/2014/main" id="{6F8AB6F2-8D79-4200-B32D-28344E593C12}"/>
+              </a:ext>
+            </a:extLst>
+          </p:cNvPr>
+          <p:cNvPicPr>
+            <a:picLocks noChangeAspect="1" noChangeArrowheads="1"/>
+          </p:cNvPicPr>
+          <p:nvPr/>
+        </p:nvPicPr>
+        <p:blipFill>
+          <a:blip r:embed="rId17">
+            <a:extLst>
+              <a:ext uri="{28A0092B-C50C-407E-A947-70E740481C1C}">
+                <a14:useLocalDpi xmlns:a14="http://schemas.microsoft.com/office/drawing/2010/main" val="0"/>
+              </a:ext>
+            </a:extLst>
+          </a:blip>
+          <a:srcRect/>
+          <a:stretch>
+            <a:fillRect/>
+          </a:stretch>
+        </p:blipFill>
+        <p:spPr bwMode="auto">
+          <a:xfrm>
+            <a:off x="11435849" y="1118490"/>
+            <a:ext cx="485501" cy="368023"/>
+          </a:xfrm>
+          <a:prstGeom prst="rect">
+            <a:avLst/>
+          </a:prstGeom>
+          <a:noFill/>
+          <a:extLst>
+            <a:ext uri="{909E8E84-426E-40DD-AFC4-6F175D3DCCD1}">
+              <a14:hiddenFill xmlns:a14="http://schemas.microsoft.com/office/drawing/2010/main">
+                <a:solidFill>
+                  <a:srgbClr val="FFFFFF"/>
+                </a:solidFill>
+              </a14:hiddenFill>
+            </a:ext>
+          </a:extLst>
+        </p:spPr>
+      </p:pic>
     </p:spTree>
     <p:extLst>
       <p:ext uri="{BB962C8B-B14F-4D97-AF65-F5344CB8AC3E}">

</xml_diff>